<commit_message>
Use ISS presentations as the starting point for ISC for most modules.
</commit_message>
<xml_diff>
--- a/overview.pptx
+++ b/overview.pptx
@@ -12,7 +12,7 @@
   </p:handoutMasterIdLst>
   <p:sldIdLst>
     <p:sldId id="318" r:id="rId5"/>
-    <p:sldId id="563" r:id="rId6"/>
+    <p:sldId id="320" r:id="rId6"/>
     <p:sldId id="1819" r:id="rId7"/>
     <p:sldId id="325" r:id="rId8"/>
     <p:sldId id="1823" r:id="rId9"/>
@@ -23,7 +23,7 @@
     <p:sldId id="1820" r:id="rId14"/>
     <p:sldId id="279" r:id="rId15"/>
     <p:sldId id="1845" r:id="rId16"/>
-    <p:sldId id="257" r:id="rId17"/>
+    <p:sldId id="259" r:id="rId17"/>
   </p:sldIdLst>
   <p:sldSz cx="12188825" cy="6858000"/>
   <p:notesSz cx="7010400" cy="9296400"/>
@@ -267,7 +267,7 @@
           <a:p>
             <a:fld id="{0B842F42-2CE9-4E35-95C1-410DC08A50B1}" type="datetimeFigureOut">
               <a:rPr lang="en-US" smtClean="0"/>
-              <a:t>10/8/2020</a:t>
+              <a:t>3/21/2021</a:t>
             </a:fld>
             <a:endParaRPr lang="en-US"/>
           </a:p>
@@ -432,7 +432,7 @@
           <a:p>
             <a:fld id="{6F282904-F315-4730-8D91-37D99E141A6F}" type="datetimeFigureOut">
               <a:rPr lang="en-US" smtClean="0"/>
-              <a:t>10/8/2020</a:t>
+              <a:t>3/21/2021</a:t>
             </a:fld>
             <a:endParaRPr lang="en-US"/>
           </a:p>
@@ -4439,8 +4439,8 @@
           </a:p>
           <a:p>
             <a:r>
-              <a:rPr lang="en-US" sz="2000" dirty="0"/>
-              <a:t>Better Scientific Software Tutorial, SC20, November 2020</a:t>
+              <a:rPr lang="en-US" dirty="0"/>
+              <a:t>Better Scientific Software Tutorial, ISS, March 2021</a:t>
             </a:r>
           </a:p>
         </p:txBody>
@@ -6299,7 +6299,7 @@
 </file>
 
 <file path=ppt/slides/slide13.xml><?xml version="1.0" encoding="utf-8"?>
-<p:sld xmlns:a="http://schemas.openxmlformats.org/drawingml/2006/main" xmlns:r="http://schemas.openxmlformats.org/officeDocument/2006/relationships" xmlns:p="http://schemas.openxmlformats.org/presentationml/2006/main" showMasterSp="0">
+<p:sld xmlns:a="http://schemas.openxmlformats.org/drawingml/2006/main" xmlns:r="http://schemas.openxmlformats.org/officeDocument/2006/relationships" xmlns:p="http://schemas.openxmlformats.org/presentationml/2006/main">
   <p:cSld>
     <p:spTree>
       <p:nvGrpSpPr>
@@ -6357,16 +6357,11 @@
           </p:cNvGraphicFramePr>
           <p:nvPr>
             <p:ph idx="1"/>
-            <p:extLst>
-              <p:ext uri="{D42A27DB-BD31-4B8C-83A1-F6EECF244321}">
-                <p14:modId xmlns:p14="http://schemas.microsoft.com/office/powerpoint/2010/main" val="312120117"/>
-              </p:ext>
-            </p:extLst>
           </p:nvPr>
         </p:nvGraphicFramePr>
         <p:xfrm>
-          <a:off x="482119" y="879117"/>
-          <a:ext cx="11224586" cy="5608320"/>
+          <a:off x="1055369" y="916940"/>
+          <a:ext cx="10078086" cy="5024120"/>
         </p:xfrm>
         <a:graphic>
           <a:graphicData uri="http://schemas.openxmlformats.org/drawingml/2006/table">
@@ -6375,38 +6370,31 @@
                 <a:tableStyleId>{5C22544A-7EE6-4342-B048-85BDC9FD1C3A}</a:tableStyleId>
               </a:tblPr>
               <a:tblGrid>
-                <a:gridCol w="1953967">
+                <a:gridCol w="1826183">
                   <a:extLst>
                     <a:ext uri="{9D8B030D-6E8A-4147-A177-3AD203B41FA5}">
                       <a16:colId xmlns:a16="http://schemas.microsoft.com/office/drawing/2014/main" val="3446576009"/>
                     </a:ext>
                   </a:extLst>
                 </a:gridCol>
-                <a:gridCol w="927012">
+                <a:gridCol w="1003610">
                   <a:extLst>
                     <a:ext uri="{9D8B030D-6E8A-4147-A177-3AD203B41FA5}">
                       <a16:colId xmlns:a16="http://schemas.microsoft.com/office/drawing/2014/main" val="339314737"/>
                     </a:ext>
                   </a:extLst>
                 </a:gridCol>
-                <a:gridCol w="4502632">
+                <a:gridCol w="4293220">
                   <a:extLst>
                     <a:ext uri="{9D8B030D-6E8A-4147-A177-3AD203B41FA5}">
                       <a16:colId xmlns:a16="http://schemas.microsoft.com/office/drawing/2014/main" val="1263998808"/>
                     </a:ext>
                   </a:extLst>
                 </a:gridCol>
-                <a:gridCol w="2566626">
+                <a:gridCol w="2955073">
                   <a:extLst>
                     <a:ext uri="{9D8B030D-6E8A-4147-A177-3AD203B41FA5}">
                       <a16:colId xmlns:a16="http://schemas.microsoft.com/office/drawing/2014/main" val="4097899022"/>
-                    </a:ext>
-                  </a:extLst>
-                </a:gridCol>
-                <a:gridCol w="1274349">
-                  <a:extLst>
-                    <a:ext uri="{9D8B030D-6E8A-4147-A177-3AD203B41FA5}">
-                      <a16:colId xmlns:a16="http://schemas.microsoft.com/office/drawing/2014/main" val="2615546019"/>
                     </a:ext>
                   </a:extLst>
                 </a:gridCol>
@@ -6423,8 +6411,10 @@
                         </a:lnSpc>
                       </a:pPr>
                       <a:r>
-                        <a:rPr lang="en-US" sz="1600" dirty="0"/>
-                        <a:t>Time (Eastern US)</a:t>
+                        <a:rPr lang="en-US" sz="1800" dirty="0">
+                          <a:latin typeface="+mn-lt"/>
+                        </a:rPr>
+                        <a:t>Time (MDT)</a:t>
                       </a:r>
                     </a:p>
                   </a:txBody>
@@ -6441,7 +6431,9 @@
                         </a:lnSpc>
                       </a:pPr>
                       <a:r>
-                        <a:rPr lang="en-US" sz="1600" dirty="0"/>
+                        <a:rPr lang="en-US" sz="1800" dirty="0">
+                          <a:latin typeface="+mn-lt"/>
+                        </a:rPr>
                         <a:t>Module</a:t>
                       </a:r>
                     </a:p>
@@ -6459,7 +6451,9 @@
                         </a:lnSpc>
                       </a:pPr>
                       <a:r>
-                        <a:rPr lang="en-US" sz="1600" dirty="0"/>
+                        <a:rPr lang="en-US" sz="1800" dirty="0">
+                          <a:latin typeface="+mn-lt"/>
+                        </a:rPr>
                         <a:t>Topic</a:t>
                       </a:r>
                     </a:p>
@@ -6477,26 +6471,10 @@
                         </a:lnSpc>
                       </a:pPr>
                       <a:r>
-                        <a:rPr lang="en-US" sz="1600" dirty="0"/>
+                        <a:rPr lang="en-US" sz="1800" dirty="0">
+                          <a:latin typeface="+mn-lt"/>
+                        </a:rPr>
                         <a:t>Speaker</a:t>
-                      </a:r>
-                    </a:p>
-                  </a:txBody>
-                  <a:tcPr/>
-                </a:tc>
-                <a:tc>
-                  <a:txBody>
-                    <a:bodyPr/>
-                    <a:lstStyle/>
-                    <a:p>
-                      <a:pPr>
-                        <a:lnSpc>
-                          <a:spcPct val="100000"/>
-                        </a:lnSpc>
-                      </a:pPr>
-                      <a:r>
-                        <a:rPr lang="en-US" sz="1600" dirty="0"/>
-                        <a:t>Time (UTC)</a:t>
                       </a:r>
                     </a:p>
                   </a:txBody>
@@ -6523,17 +6501,18 @@
                         </a:spcAft>
                       </a:pPr>
                       <a:r>
-                        <a:rPr lang="en-US" sz="1600" b="0" i="0" u="none" strike="noStrike" dirty="0">
+                        <a:rPr lang="en-US" sz="1800" b="0" i="0" u="none" strike="noStrike" dirty="0">
                           <a:solidFill>
                             <a:srgbClr val="000000"/>
                           </a:solidFill>
                           <a:effectLst/>
-                          <a:latin typeface="Arial" panose="020B0604020202020204" pitchFamily="34" charset="0"/>
+                          <a:latin typeface="+mn-lt"/>
                         </a:rPr>
-                        <a:t>2:30pm-2:35pm</a:t>
+                        <a:t>1:00pm-1:05pm</a:t>
                       </a:r>
-                      <a:endParaRPr lang="en-US" sz="3600" dirty="0">
+                      <a:endParaRPr lang="en-US" sz="1800" dirty="0">
                         <a:effectLst/>
+                        <a:latin typeface="+mn-lt"/>
                       </a:endParaRPr>
                     </a:p>
                   </a:txBody>
@@ -6550,7 +6529,9 @@
                         </a:lnSpc>
                       </a:pPr>
                       <a:r>
-                        <a:rPr lang="en-US" sz="1600" dirty="0"/>
+                        <a:rPr lang="en-US" sz="1800" dirty="0">
+                          <a:latin typeface="+mn-lt"/>
+                        </a:rPr>
                         <a:t>00</a:t>
                       </a:r>
                     </a:p>
@@ -6568,7 +6549,7 @@
                         </a:lnSpc>
                       </a:pPr>
                       <a:r>
-                        <a:rPr lang="en-US" sz="1600" b="0" i="0" u="none" strike="noStrike" kern="1200" dirty="0">
+                        <a:rPr lang="en-US" sz="1800" b="0" i="0" u="none" strike="noStrike" kern="1200" dirty="0">
                           <a:solidFill>
                             <a:schemeClr val="dk1"/>
                           </a:solidFill>
@@ -6579,7 +6560,9 @@
                         </a:rPr>
                         <a:t>Introduction</a:t>
                       </a:r>
-                      <a:endParaRPr lang="en-US" sz="1600" dirty="0"/>
+                      <a:endParaRPr lang="en-US" sz="1800" dirty="0">
+                        <a:latin typeface="+mn-lt"/>
+                      </a:endParaRPr>
                     </a:p>
                   </a:txBody>
                   <a:tcPr/>
@@ -6595,26 +6578,10 @@
                         </a:lnSpc>
                       </a:pPr>
                       <a:r>
-                        <a:rPr lang="en-US" sz="1600" dirty="0"/>
+                        <a:rPr lang="en-US" sz="1800" dirty="0">
+                          <a:latin typeface="+mn-lt"/>
+                        </a:rPr>
                         <a:t>David E. Bernholdt, ORNL</a:t>
-                      </a:r>
-                    </a:p>
-                  </a:txBody>
-                  <a:tcPr/>
-                </a:tc>
-                <a:tc>
-                  <a:txBody>
-                    <a:bodyPr/>
-                    <a:lstStyle/>
-                    <a:p>
-                      <a:pPr>
-                        <a:lnSpc>
-                          <a:spcPct val="100000"/>
-                        </a:lnSpc>
-                      </a:pPr>
-                      <a:r>
-                        <a:rPr lang="en-US" sz="1600" dirty="0"/>
-                        <a:t>19:30-19:35</a:t>
                       </a:r>
                     </a:p>
                   </a:txBody>
@@ -6641,17 +6608,18 @@
                         </a:spcAft>
                       </a:pPr>
                       <a:r>
-                        <a:rPr lang="en-US" sz="1600" b="0" i="0" u="none" strike="noStrike" dirty="0">
+                        <a:rPr lang="en-US" sz="1800" b="0" i="0" u="none" strike="noStrike" dirty="0">
                           <a:solidFill>
                             <a:srgbClr val="000000"/>
                           </a:solidFill>
                           <a:effectLst/>
-                          <a:latin typeface="Arial" panose="020B0604020202020204" pitchFamily="34" charset="0"/>
+                          <a:latin typeface="+mn-lt"/>
                         </a:rPr>
-                        <a:t>2:35pm-2:45pm</a:t>
+                        <a:t>1:05pm-1:15pm</a:t>
                       </a:r>
-                      <a:endParaRPr lang="en-US" sz="3600" dirty="0">
+                      <a:endParaRPr lang="en-US" sz="1800" dirty="0">
                         <a:effectLst/>
+                        <a:latin typeface="+mn-lt"/>
                       </a:endParaRPr>
                     </a:p>
                   </a:txBody>
@@ -6680,7 +6648,9 @@
                         <a:defRPr/>
                       </a:pPr>
                       <a:r>
-                        <a:rPr lang="en-US" sz="1600" dirty="0"/>
+                        <a:rPr lang="en-US" sz="1800" dirty="0">
+                          <a:latin typeface="+mn-lt"/>
+                        </a:rPr>
                         <a:t>01</a:t>
                       </a:r>
                     </a:p>
@@ -6710,7 +6680,7 @@
                         <a:defRPr/>
                       </a:pPr>
                       <a:r>
-                        <a:rPr lang="en-US" sz="1600" b="0" i="0" u="none" strike="noStrike" kern="1200" dirty="0">
+                        <a:rPr lang="en-US" sz="1800" b="0" i="0" u="none" strike="noStrike" kern="1200" dirty="0">
                           <a:solidFill>
                             <a:schemeClr val="dk1"/>
                           </a:solidFill>
@@ -6721,7 +6691,9 @@
                         </a:rPr>
                         <a:t>Motivation and Overview of Best Practices in HPC Software Development</a:t>
                       </a:r>
-                      <a:endParaRPr lang="en-US" sz="1600" dirty="0"/>
+                      <a:endParaRPr lang="en-US" sz="1800" dirty="0">
+                        <a:latin typeface="+mn-lt"/>
+                      </a:endParaRPr>
                     </a:p>
                   </a:txBody>
                   <a:tcPr/>
@@ -6749,38 +6721,10 @@
                         <a:defRPr/>
                       </a:pPr>
                       <a:r>
-                        <a:rPr lang="en-US" sz="1600" dirty="0"/>
+                        <a:rPr lang="en-US" sz="1800" dirty="0">
+                          <a:latin typeface="+mn-lt"/>
+                        </a:rPr>
                         <a:t>David E. Bernholdt, ORNL</a:t>
-                      </a:r>
-                    </a:p>
-                  </a:txBody>
-                  <a:tcPr/>
-                </a:tc>
-                <a:tc>
-                  <a:txBody>
-                    <a:bodyPr/>
-                    <a:lstStyle/>
-                    <a:p>
-                      <a:pPr marL="0" marR="0" lvl="0" indent="0" algn="l" defTabSz="914400" rtl="0" eaLnBrk="1" fontAlgn="auto" latinLnBrk="0" hangingPunct="1">
-                        <a:lnSpc>
-                          <a:spcPct val="100000"/>
-                        </a:lnSpc>
-                        <a:spcBef>
-                          <a:spcPts val="0"/>
-                        </a:spcBef>
-                        <a:spcAft>
-                          <a:spcPts val="0"/>
-                        </a:spcAft>
-                        <a:buClrTx/>
-                        <a:buSzTx/>
-                        <a:buFontTx/>
-                        <a:buNone/>
-                        <a:tabLst/>
-                        <a:defRPr/>
-                      </a:pPr>
-                      <a:r>
-                        <a:rPr lang="en-US" sz="1600" dirty="0"/>
-                        <a:t>19:35-19:45</a:t>
                       </a:r>
                     </a:p>
                   </a:txBody>
@@ -6807,17 +6751,18 @@
                         </a:spcAft>
                       </a:pPr>
                       <a:r>
-                        <a:rPr lang="en-US" sz="1600" b="0" i="0" u="none" strike="noStrike" dirty="0">
+                        <a:rPr lang="en-US" sz="1800" b="0" i="0" u="none" strike="noStrike" dirty="0">
                           <a:solidFill>
                             <a:srgbClr val="000000"/>
                           </a:solidFill>
                           <a:effectLst/>
-                          <a:latin typeface="Arial" panose="020B0604020202020204" pitchFamily="34" charset="0"/>
+                          <a:latin typeface="+mn-lt"/>
                         </a:rPr>
-                        <a:t>2:45pm-3:15pm</a:t>
+                        <a:t>1:15pm-1:45pm</a:t>
                       </a:r>
-                      <a:endParaRPr lang="en-US" sz="3600" dirty="0">
+                      <a:endParaRPr lang="en-US" sz="1800" dirty="0">
                         <a:effectLst/>
+                        <a:latin typeface="+mn-lt"/>
                       </a:endParaRPr>
                     </a:p>
                   </a:txBody>
@@ -6834,7 +6779,9 @@
                         </a:lnSpc>
                       </a:pPr>
                       <a:r>
-                        <a:rPr lang="en-US" sz="1600" dirty="0"/>
+                        <a:rPr lang="en-US" sz="1800" dirty="0">
+                          <a:latin typeface="+mn-lt"/>
+                        </a:rPr>
                         <a:t>02</a:t>
                       </a:r>
                     </a:p>
@@ -6852,7 +6799,9 @@
                         </a:lnSpc>
                       </a:pPr>
                       <a:r>
-                        <a:rPr lang="en-US" sz="1600" dirty="0"/>
+                        <a:rPr lang="en-US" sz="1800" dirty="0">
+                          <a:latin typeface="+mn-lt"/>
+                        </a:rPr>
                         <a:t>Agile Methodologies</a:t>
                       </a:r>
                     </a:p>
@@ -6870,26 +6819,10 @@
                         </a:lnSpc>
                       </a:pPr>
                       <a:r>
-                        <a:rPr lang="en-US" sz="1600" dirty="0"/>
-                        <a:t>Rinku Gupta, ANL</a:t>
-                      </a:r>
-                    </a:p>
-                  </a:txBody>
-                  <a:tcPr/>
-                </a:tc>
-                <a:tc>
-                  <a:txBody>
-                    <a:bodyPr/>
-                    <a:lstStyle/>
-                    <a:p>
-                      <a:pPr>
-                        <a:lnSpc>
-                          <a:spcPct val="100000"/>
-                        </a:lnSpc>
-                      </a:pPr>
-                      <a:r>
-                        <a:rPr lang="en-US" sz="1600" dirty="0"/>
-                        <a:t>19:45-20:15</a:t>
+                        <a:rPr lang="en-US" sz="1800" dirty="0">
+                          <a:latin typeface="+mn-lt"/>
+                        </a:rPr>
+                        <a:t>Rinku K. Gupta, ANL</a:t>
                       </a:r>
                     </a:p>
                   </a:txBody>
@@ -6916,10 +6849,11 @@
                         </a:spcAft>
                       </a:pPr>
                       <a:r>
-                        <a:rPr lang="en-US" sz="1600" dirty="0">
+                        <a:rPr lang="en-US" sz="1800" dirty="0">
                           <a:effectLst/>
+                          <a:latin typeface="+mn-lt"/>
                         </a:rPr>
-                        <a:t>3:15pm-3:30pm</a:t>
+                        <a:t>1:45pm-2:00pm</a:t>
                       </a:r>
                     </a:p>
                   </a:txBody>
@@ -6936,10 +6870,11 @@
                         </a:lnSpc>
                       </a:pPr>
                       <a:r>
-                        <a:rPr lang="en-US" sz="1600" i="0" dirty="0">
+                        <a:rPr lang="en-US" sz="1800" i="0" dirty="0">
                           <a:solidFill>
                             <a:schemeClr val="tx1"/>
                           </a:solidFill>
+                          <a:latin typeface="+mn-lt"/>
                         </a:rPr>
                         <a:t>03</a:t>
                       </a:r>
@@ -6970,7 +6905,7 @@
                         <a:defRPr/>
                       </a:pPr>
                       <a:r>
-                        <a:rPr lang="en-US" sz="1600" b="0" i="0" u="none" strike="noStrike" kern="1200" dirty="0">
+                        <a:rPr lang="en-US" sz="1800" b="0" i="0" u="none" strike="noStrike" kern="1200" dirty="0">
                           <a:solidFill>
                             <a:schemeClr val="dk1"/>
                           </a:solidFill>
@@ -6981,7 +6916,9 @@
                         </a:rPr>
                         <a:t>Git Workflows</a:t>
                       </a:r>
-                      <a:endParaRPr lang="en-US" sz="1600" dirty="0"/>
+                      <a:endParaRPr lang="en-US" sz="1800" dirty="0">
+                        <a:latin typeface="+mn-lt"/>
+                      </a:endParaRPr>
                     </a:p>
                   </a:txBody>
                   <a:tcPr/>
@@ -6997,26 +6934,10 @@
                         </a:lnSpc>
                       </a:pPr>
                       <a:r>
-                        <a:rPr lang="en-US" sz="1600" dirty="0"/>
-                        <a:t>Patricia Grubel, LANL</a:t>
-                      </a:r>
-                    </a:p>
-                  </a:txBody>
-                  <a:tcPr/>
-                </a:tc>
-                <a:tc>
-                  <a:txBody>
-                    <a:bodyPr/>
-                    <a:lstStyle/>
-                    <a:p>
-                      <a:pPr>
-                        <a:lnSpc>
-                          <a:spcPct val="100000"/>
-                        </a:lnSpc>
-                      </a:pPr>
-                      <a:r>
-                        <a:rPr lang="en-US" sz="1600" dirty="0"/>
-                        <a:t>20:15-20:30</a:t>
+                        <a:rPr lang="en-US" sz="1800" dirty="0">
+                          <a:latin typeface="+mn-lt"/>
+                        </a:rPr>
+                        <a:t>Rinku K. Gupta, ANL</a:t>
                       </a:r>
                     </a:p>
                   </a:txBody>
@@ -7043,20 +6964,21 @@
                         </a:spcAft>
                       </a:pPr>
                       <a:r>
-                        <a:rPr lang="en-US" sz="1600" b="0" i="0" u="none" strike="noStrike" dirty="0">
+                        <a:rPr lang="en-US" sz="1800" b="0" i="0" u="none" strike="noStrike" dirty="0">
                           <a:solidFill>
                             <a:schemeClr val="tx1"/>
                           </a:solidFill>
                           <a:effectLst/>
-                          <a:latin typeface="Arial" panose="020B0604020202020204" pitchFamily="34" charset="0"/>
+                          <a:latin typeface="+mn-lt"/>
                         </a:rPr>
-                        <a:t>3:30pm-4:00pm</a:t>
+                        <a:t>2:00pm-2:20pm</a:t>
                       </a:r>
-                      <a:endParaRPr lang="en-US" sz="3600" i="0" dirty="0">
+                      <a:endParaRPr lang="en-US" sz="1800" i="0" dirty="0">
                         <a:solidFill>
                           <a:schemeClr val="tx1"/>
                         </a:solidFill>
                         <a:effectLst/>
+                        <a:latin typeface="+mn-lt"/>
                       </a:endParaRPr>
                     </a:p>
                   </a:txBody>
@@ -7073,164 +6995,13 @@
                         </a:lnSpc>
                       </a:pPr>
                       <a:r>
-                        <a:rPr lang="en-US" sz="1600" i="0" dirty="0">
+                        <a:rPr lang="en-US" sz="1800" i="0" dirty="0">
                           <a:solidFill>
                             <a:schemeClr val="tx1"/>
                           </a:solidFill>
+                          <a:latin typeface="+mn-lt"/>
                         </a:rPr>
                         <a:t>04</a:t>
-                      </a:r>
-                    </a:p>
-                  </a:txBody>
-                  <a:tcPr/>
-                </a:tc>
-                <a:tc>
-                  <a:txBody>
-                    <a:bodyPr/>
-                    <a:lstStyle/>
-                    <a:p>
-                      <a:pPr>
-                        <a:lnSpc>
-                          <a:spcPct val="100000"/>
-                        </a:lnSpc>
-                      </a:pPr>
-                      <a:r>
-                        <a:rPr lang="en-US" sz="1600" b="0" i="0" u="none" strike="noStrike" kern="1200" dirty="0">
-                          <a:solidFill>
-                            <a:schemeClr val="tx1"/>
-                          </a:solidFill>
-                          <a:effectLst/>
-                          <a:latin typeface="+mn-lt"/>
-                          <a:ea typeface="+mn-ea"/>
-                          <a:cs typeface="+mn-cs"/>
-                        </a:rPr>
-                        <a:t>Software Design</a:t>
-                      </a:r>
-                      <a:endParaRPr lang="en-US" sz="1600" i="0" dirty="0">
-                        <a:solidFill>
-                          <a:schemeClr val="tx1"/>
-                        </a:solidFill>
-                      </a:endParaRPr>
-                    </a:p>
-                  </a:txBody>
-                  <a:tcPr/>
-                </a:tc>
-                <a:tc>
-                  <a:txBody>
-                    <a:bodyPr/>
-                    <a:lstStyle/>
-                    <a:p>
-                      <a:pPr>
-                        <a:lnSpc>
-                          <a:spcPct val="100000"/>
-                        </a:lnSpc>
-                      </a:pPr>
-                      <a:r>
-                        <a:rPr lang="en-US" sz="1600" i="0" dirty="0">
-                          <a:solidFill>
-                            <a:schemeClr val="tx1"/>
-                          </a:solidFill>
-                        </a:rPr>
-                        <a:t>Anshu Dubey, ANL</a:t>
-                      </a:r>
-                    </a:p>
-                  </a:txBody>
-                  <a:tcPr/>
-                </a:tc>
-                <a:tc>
-                  <a:txBody>
-                    <a:bodyPr/>
-                    <a:lstStyle/>
-                    <a:p>
-                      <a:pPr>
-                        <a:lnSpc>
-                          <a:spcPct val="100000"/>
-                        </a:lnSpc>
-                      </a:pPr>
-                      <a:r>
-                        <a:rPr lang="en-US" sz="1600" i="0" dirty="0">
-                          <a:solidFill>
-                            <a:schemeClr val="tx1"/>
-                          </a:solidFill>
-                        </a:rPr>
-                        <a:t>20:30-21:00</a:t>
-                      </a:r>
-                    </a:p>
-                  </a:txBody>
-                  <a:tcPr/>
-                </a:tc>
-                <a:extLst>
-                  <a:ext uri="{0D108BD9-81ED-4DB2-BD59-A6C34878D82A}">
-                    <a16:rowId xmlns:a16="http://schemas.microsoft.com/office/drawing/2014/main" val="1922613886"/>
-                  </a:ext>
-                </a:extLst>
-              </a:tr>
-              <a:tr h="370840">
-                <a:tc>
-                  <a:txBody>
-                    <a:bodyPr/>
-                    <a:lstStyle/>
-                    <a:p>
-                      <a:pPr rtl="0" fontAlgn="t">
-                        <a:spcBef>
-                          <a:spcPts val="0"/>
-                        </a:spcBef>
-                        <a:spcAft>
-                          <a:spcPts val="0"/>
-                        </a:spcAft>
-                      </a:pPr>
-                      <a:r>
-                        <a:rPr lang="en-US" sz="1600" i="0" dirty="0">
-                          <a:solidFill>
-                            <a:schemeClr val="tx1"/>
-                          </a:solidFill>
-                          <a:effectLst/>
-                        </a:rPr>
-                        <a:t>4:00pm-4:15pm</a:t>
-                      </a:r>
-                    </a:p>
-                  </a:txBody>
-                  <a:tcPr marL="63500" marR="63500" marT="63500" marB="63500"/>
-                </a:tc>
-                <a:tc>
-                  <a:txBody>
-                    <a:bodyPr/>
-                    <a:lstStyle/>
-                    <a:p>
-                      <a:pPr>
-                        <a:lnSpc>
-                          <a:spcPct val="100000"/>
-                        </a:lnSpc>
-                      </a:pPr>
-                      <a:r>
-                        <a:rPr lang="en-US" sz="1600" i="0" dirty="0">
-                          <a:solidFill>
-                            <a:schemeClr val="tx1"/>
-                          </a:solidFill>
-                        </a:rPr>
-                        <a:t>05</a:t>
-                      </a:r>
-                    </a:p>
-                  </a:txBody>
-                  <a:tcPr/>
-                </a:tc>
-                <a:tc>
-                  <a:txBody>
-                    <a:bodyPr/>
-                    <a:lstStyle/>
-                    <a:p>
-                      <a:pPr>
-                        <a:lnSpc>
-                          <a:spcPct val="100000"/>
-                        </a:lnSpc>
-                      </a:pPr>
-                      <a:r>
-                        <a:rPr lang="en-US" sz="1600" i="0" dirty="0">
-                          <a:solidFill>
-                            <a:schemeClr val="tx1"/>
-                          </a:solidFill>
-                        </a:rPr>
-                        <a:t>Software Testing 1</a:t>
                       </a:r>
                     </a:p>
                   </a:txBody>
@@ -7259,12 +7030,201 @@
                         <a:defRPr/>
                       </a:pPr>
                       <a:r>
-                        <a:rPr lang="en-US" sz="1600" i="0" dirty="0">
+                        <a:rPr lang="en-US" sz="1800" i="0" dirty="0">
                           <a:solidFill>
                             <a:schemeClr val="tx1"/>
                           </a:solidFill>
+                          <a:latin typeface="+mn-lt"/>
                         </a:rPr>
-                        <a:t>Rinku Gupta, ANL</a:t>
+                        <a:t>Software Testing 1</a:t>
+                      </a:r>
+                    </a:p>
+                  </a:txBody>
+                  <a:tcPr/>
+                </a:tc>
+                <a:tc>
+                  <a:txBody>
+                    <a:bodyPr/>
+                    <a:lstStyle/>
+                    <a:p>
+                      <a:pPr>
+                        <a:lnSpc>
+                          <a:spcPct val="100000"/>
+                        </a:lnSpc>
+                      </a:pPr>
+                      <a:r>
+                        <a:rPr lang="en-US" sz="1800" i="0" dirty="0">
+                          <a:solidFill>
+                            <a:schemeClr val="tx1"/>
+                          </a:solidFill>
+                          <a:latin typeface="+mn-lt"/>
+                        </a:rPr>
+                        <a:t>David M. Rogers, ORNL</a:t>
+                      </a:r>
+                    </a:p>
+                  </a:txBody>
+                  <a:tcPr/>
+                </a:tc>
+                <a:extLst>
+                  <a:ext uri="{0D108BD9-81ED-4DB2-BD59-A6C34878D82A}">
+                    <a16:rowId xmlns:a16="http://schemas.microsoft.com/office/drawing/2014/main" val="1922613886"/>
+                  </a:ext>
+                </a:extLst>
+              </a:tr>
+              <a:tr h="370840">
+                <a:tc>
+                  <a:txBody>
+                    <a:bodyPr/>
+                    <a:lstStyle/>
+                    <a:p>
+                      <a:pPr rtl="0" fontAlgn="t">
+                        <a:spcBef>
+                          <a:spcPts val="0"/>
+                        </a:spcBef>
+                        <a:spcAft>
+                          <a:spcPts val="0"/>
+                        </a:spcAft>
+                      </a:pPr>
+                      <a:r>
+                        <a:rPr lang="en-US" sz="1800" b="0" i="1" u="none" strike="noStrike" dirty="0">
+                          <a:solidFill>
+                            <a:schemeClr val="tx2"/>
+                          </a:solidFill>
+                          <a:effectLst/>
+                          <a:latin typeface="+mn-lt"/>
+                        </a:rPr>
+                        <a:t>2:20pm-2:40pm</a:t>
+                      </a:r>
+                      <a:endParaRPr lang="en-US" sz="1800" i="1" dirty="0">
+                        <a:solidFill>
+                          <a:schemeClr val="tx2"/>
+                        </a:solidFill>
+                        <a:effectLst/>
+                        <a:latin typeface="+mn-lt"/>
+                      </a:endParaRPr>
+                    </a:p>
+                  </a:txBody>
+                  <a:tcPr marL="63500" marR="63500" marT="63500" marB="63500"/>
+                </a:tc>
+                <a:tc>
+                  <a:txBody>
+                    <a:bodyPr/>
+                    <a:lstStyle/>
+                    <a:p>
+                      <a:pPr>
+                        <a:lnSpc>
+                          <a:spcPct val="100000"/>
+                        </a:lnSpc>
+                      </a:pPr>
+                      <a:endParaRPr lang="en-US" sz="1800" i="1" dirty="0">
+                        <a:solidFill>
+                          <a:schemeClr val="tx2"/>
+                        </a:solidFill>
+                        <a:latin typeface="+mn-lt"/>
+                      </a:endParaRPr>
+                    </a:p>
+                  </a:txBody>
+                  <a:tcPr/>
+                </a:tc>
+                <a:tc>
+                  <a:txBody>
+                    <a:bodyPr/>
+                    <a:lstStyle/>
+                    <a:p>
+                      <a:pPr>
+                        <a:lnSpc>
+                          <a:spcPct val="100000"/>
+                        </a:lnSpc>
+                      </a:pPr>
+                      <a:r>
+                        <a:rPr lang="en-US" sz="1800" i="1" dirty="0">
+                          <a:solidFill>
+                            <a:schemeClr val="tx2"/>
+                          </a:solidFill>
+                          <a:latin typeface="+mn-lt"/>
+                        </a:rPr>
+                        <a:t>Break (optional Q&amp;A)</a:t>
+                      </a:r>
+                    </a:p>
+                  </a:txBody>
+                  <a:tcPr/>
+                </a:tc>
+                <a:tc>
+                  <a:txBody>
+                    <a:bodyPr/>
+                    <a:lstStyle/>
+                    <a:p>
+                      <a:pPr>
+                        <a:lnSpc>
+                          <a:spcPct val="100000"/>
+                        </a:lnSpc>
+                      </a:pPr>
+                      <a:r>
+                        <a:rPr lang="en-US" sz="1800" i="1" dirty="0">
+                          <a:solidFill>
+                            <a:schemeClr val="tx2"/>
+                          </a:solidFill>
+                          <a:latin typeface="+mn-lt"/>
+                        </a:rPr>
+                        <a:t>All</a:t>
+                      </a:r>
+                    </a:p>
+                  </a:txBody>
+                  <a:tcPr/>
+                </a:tc>
+                <a:extLst>
+                  <a:ext uri="{0D108BD9-81ED-4DB2-BD59-A6C34878D82A}">
+                    <a16:rowId xmlns:a16="http://schemas.microsoft.com/office/drawing/2014/main" val="4193880066"/>
+                  </a:ext>
+                </a:extLst>
+              </a:tr>
+              <a:tr h="370840">
+                <a:tc>
+                  <a:txBody>
+                    <a:bodyPr/>
+                    <a:lstStyle/>
+                    <a:p>
+                      <a:pPr rtl="0" fontAlgn="t">
+                        <a:spcBef>
+                          <a:spcPts val="0"/>
+                        </a:spcBef>
+                        <a:spcAft>
+                          <a:spcPts val="0"/>
+                        </a:spcAft>
+                      </a:pPr>
+                      <a:r>
+                        <a:rPr lang="en-US" sz="1800" b="0" i="0" u="none" strike="noStrike" dirty="0">
+                          <a:solidFill>
+                            <a:srgbClr val="000000"/>
+                          </a:solidFill>
+                          <a:effectLst/>
+                          <a:latin typeface="+mn-lt"/>
+                        </a:rPr>
+                        <a:t>2:40pm-3:00pm</a:t>
+                      </a:r>
+                      <a:endParaRPr lang="en-US" sz="1800" dirty="0">
+                        <a:effectLst/>
+                        <a:latin typeface="+mn-lt"/>
+                      </a:endParaRPr>
+                    </a:p>
+                  </a:txBody>
+                  <a:tcPr marL="63500" marR="63500" marT="63500" marB="63500"/>
+                </a:tc>
+                <a:tc>
+                  <a:txBody>
+                    <a:bodyPr/>
+                    <a:lstStyle/>
+                    <a:p>
+                      <a:pPr>
+                        <a:lnSpc>
+                          <a:spcPct val="100000"/>
+                        </a:lnSpc>
+                      </a:pPr>
+                      <a:r>
+                        <a:rPr lang="en-US" sz="1800" i="0" dirty="0">
+                          <a:latin typeface="+mn-lt"/>
+                        </a:rPr>
+                        <a:t>05</a:t>
                       </a:r>
                     </a:p>
                   </a:txBody>
@@ -7293,93 +7253,16 @@
                         <a:defRPr/>
                       </a:pPr>
                       <a:r>
-                        <a:rPr lang="en-US" sz="1600" i="0" dirty="0">
+                        <a:rPr lang="en-US" sz="1800" b="0" i="0" u="none" strike="noStrike" kern="1200" dirty="0">
                           <a:solidFill>
                             <a:schemeClr val="tx1"/>
                           </a:solidFill>
+                          <a:effectLst/>
+                          <a:latin typeface="+mn-lt"/>
+                          <a:ea typeface="+mn-ea"/>
+                          <a:cs typeface="+mn-cs"/>
                         </a:rPr>
-                        <a:t>21:00-21:15</a:t>
-                      </a:r>
-                    </a:p>
-                  </a:txBody>
-                  <a:tcPr/>
-                </a:tc>
-                <a:extLst>
-                  <a:ext uri="{0D108BD9-81ED-4DB2-BD59-A6C34878D82A}">
-                    <a16:rowId xmlns:a16="http://schemas.microsoft.com/office/drawing/2014/main" val="3073672808"/>
-                  </a:ext>
-                </a:extLst>
-              </a:tr>
-              <a:tr h="370840">
-                <a:tc>
-                  <a:txBody>
-                    <a:bodyPr/>
-                    <a:lstStyle/>
-                    <a:p>
-                      <a:pPr rtl="0" fontAlgn="t">
-                        <a:spcBef>
-                          <a:spcPts val="0"/>
-                        </a:spcBef>
-                        <a:spcAft>
-                          <a:spcPts val="0"/>
-                        </a:spcAft>
-                      </a:pPr>
-                      <a:r>
-                        <a:rPr lang="en-US" sz="1600" b="0" i="1" u="none" strike="noStrike" dirty="0">
-                          <a:solidFill>
-                            <a:schemeClr val="tx2"/>
-                          </a:solidFill>
-                          <a:effectLst/>
-                          <a:latin typeface="Arial" panose="020B0604020202020204" pitchFamily="34" charset="0"/>
-                        </a:rPr>
-                        <a:t>4:15pm-4:35pm</a:t>
-                      </a:r>
-                      <a:endParaRPr lang="en-US" sz="3600" i="1" dirty="0">
-                        <a:solidFill>
-                          <a:schemeClr val="tx2"/>
-                        </a:solidFill>
-                        <a:effectLst/>
-                      </a:endParaRPr>
-                    </a:p>
-                  </a:txBody>
-                  <a:tcPr marL="63500" marR="63500" marT="63500" marB="63500"/>
-                </a:tc>
-                <a:tc>
-                  <a:txBody>
-                    <a:bodyPr/>
-                    <a:lstStyle/>
-                    <a:p>
-                      <a:pPr>
-                        <a:lnSpc>
-                          <a:spcPct val="100000"/>
-                        </a:lnSpc>
-                      </a:pPr>
-                      <a:endParaRPr lang="en-US" sz="1600" i="1" dirty="0">
-                        <a:solidFill>
-                          <a:schemeClr val="tx2"/>
-                        </a:solidFill>
-                      </a:endParaRPr>
-                    </a:p>
-                  </a:txBody>
-                  <a:tcPr/>
-                </a:tc>
-                <a:tc>
-                  <a:txBody>
-                    <a:bodyPr/>
-                    <a:lstStyle/>
-                    <a:p>
-                      <a:pPr>
-                        <a:lnSpc>
-                          <a:spcPct val="100000"/>
-                        </a:lnSpc>
-                      </a:pPr>
-                      <a:r>
-                        <a:rPr lang="en-US" sz="1600" i="1" dirty="0">
-                          <a:solidFill>
-                            <a:schemeClr val="tx2"/>
-                          </a:solidFill>
-                        </a:rPr>
-                        <a:t>Break (live Q&amp;A and demo of Kanban hands-on activities)</a:t>
+                        <a:t>Software Design</a:t>
                       </a:r>
                     </a:p>
                   </a:txBody>
@@ -7396,143 +7279,10 @@
                         </a:lnSpc>
                       </a:pPr>
                       <a:r>
-                        <a:rPr lang="en-US" sz="1600" i="1" dirty="0">
-                          <a:solidFill>
-                            <a:schemeClr val="tx2"/>
-                          </a:solidFill>
+                        <a:rPr lang="en-US" sz="1800" dirty="0">
+                          <a:latin typeface="+mn-lt"/>
                         </a:rPr>
-                        <a:t>David E. Bernholdt and All</a:t>
-                      </a:r>
-                    </a:p>
-                  </a:txBody>
-                  <a:tcPr/>
-                </a:tc>
-                <a:tc>
-                  <a:txBody>
-                    <a:bodyPr/>
-                    <a:lstStyle/>
-                    <a:p>
-                      <a:pPr>
-                        <a:lnSpc>
-                          <a:spcPct val="100000"/>
-                        </a:lnSpc>
-                      </a:pPr>
-                      <a:r>
-                        <a:rPr lang="en-US" sz="1600" i="1" dirty="0">
-                          <a:solidFill>
-                            <a:schemeClr val="tx2"/>
-                          </a:solidFill>
-                        </a:rPr>
-                        <a:t>21:15-21:35</a:t>
-                      </a:r>
-                    </a:p>
-                  </a:txBody>
-                  <a:tcPr/>
-                </a:tc>
-                <a:extLst>
-                  <a:ext uri="{0D108BD9-81ED-4DB2-BD59-A6C34878D82A}">
-                    <a16:rowId xmlns:a16="http://schemas.microsoft.com/office/drawing/2014/main" val="4193880066"/>
-                  </a:ext>
-                </a:extLst>
-              </a:tr>
-              <a:tr h="370840">
-                <a:tc>
-                  <a:txBody>
-                    <a:bodyPr/>
-                    <a:lstStyle/>
-                    <a:p>
-                      <a:pPr rtl="0" fontAlgn="t">
-                        <a:spcBef>
-                          <a:spcPts val="0"/>
-                        </a:spcBef>
-                        <a:spcAft>
-                          <a:spcPts val="0"/>
-                        </a:spcAft>
-                      </a:pPr>
-                      <a:r>
-                        <a:rPr lang="en-US" sz="1600" b="0" i="0" u="none" strike="noStrike" dirty="0">
-                          <a:solidFill>
-                            <a:srgbClr val="000000"/>
-                          </a:solidFill>
-                          <a:effectLst/>
-                          <a:latin typeface="Arial" panose="020B0604020202020204" pitchFamily="34" charset="0"/>
-                        </a:rPr>
-                        <a:t>4:35pm-4:50pm</a:t>
-                      </a:r>
-                      <a:endParaRPr lang="en-US" sz="3600" dirty="0">
-                        <a:effectLst/>
-                      </a:endParaRPr>
-                    </a:p>
-                  </a:txBody>
-                  <a:tcPr marL="63500" marR="63500" marT="63500" marB="63500"/>
-                </a:tc>
-                <a:tc>
-                  <a:txBody>
-                    <a:bodyPr/>
-                    <a:lstStyle/>
-                    <a:p>
-                      <a:pPr>
-                        <a:lnSpc>
-                          <a:spcPct val="100000"/>
-                        </a:lnSpc>
-                      </a:pPr>
-                      <a:r>
-                        <a:rPr lang="en-US" sz="1600" i="0" dirty="0"/>
-                        <a:t>06</a:t>
-                      </a:r>
-                    </a:p>
-                  </a:txBody>
-                  <a:tcPr/>
-                </a:tc>
-                <a:tc>
-                  <a:txBody>
-                    <a:bodyPr/>
-                    <a:lstStyle/>
-                    <a:p>
-                      <a:pPr>
-                        <a:lnSpc>
-                          <a:spcPct val="100000"/>
-                        </a:lnSpc>
-                      </a:pPr>
-                      <a:r>
-                        <a:rPr lang="en-US" sz="1600" i="0" dirty="0"/>
-                        <a:t>Software Testing 2</a:t>
-                      </a:r>
-                    </a:p>
-                  </a:txBody>
-                  <a:tcPr/>
-                </a:tc>
-                <a:tc>
-                  <a:txBody>
-                    <a:bodyPr/>
-                    <a:lstStyle/>
-                    <a:p>
-                      <a:pPr>
-                        <a:lnSpc>
-                          <a:spcPct val="100000"/>
-                        </a:lnSpc>
-                      </a:pPr>
-                      <a:r>
-                        <a:rPr lang="en-US" sz="1600" dirty="0"/>
                         <a:t>Anshu Dubey, ANL</a:t>
-                      </a:r>
-                    </a:p>
-                  </a:txBody>
-                  <a:tcPr/>
-                </a:tc>
-                <a:tc>
-                  <a:txBody>
-                    <a:bodyPr/>
-                    <a:lstStyle/>
-                    <a:p>
-                      <a:pPr>
-                        <a:lnSpc>
-                          <a:spcPct val="100000"/>
-                        </a:lnSpc>
-                      </a:pPr>
-                      <a:r>
-                        <a:rPr lang="en-US" sz="1600" dirty="0"/>
-                        <a:t>21:35-21:50</a:t>
                       </a:r>
                     </a:p>
                   </a:txBody>
@@ -7559,10 +7309,11 @@
                         </a:spcAft>
                       </a:pPr>
                       <a:r>
-                        <a:rPr lang="en-US" sz="1600" dirty="0">
+                        <a:rPr lang="en-US" sz="1800" dirty="0">
                           <a:effectLst/>
+                          <a:latin typeface="+mn-lt"/>
                         </a:rPr>
-                        <a:t>4:50pm-5:35pm</a:t>
+                        <a:t>3:00pm-3:15pm</a:t>
                       </a:r>
                     </a:p>
                   </a:txBody>
@@ -7579,8 +7330,10 @@
                         </a:lnSpc>
                       </a:pPr>
                       <a:r>
-                        <a:rPr lang="en-US" sz="1600" i="0" dirty="0"/>
-                        <a:t>07</a:t>
+                        <a:rPr lang="en-US" sz="1800" i="0" dirty="0">
+                          <a:latin typeface="+mn-lt"/>
+                        </a:rPr>
+                        <a:t>06</a:t>
                       </a:r>
                     </a:p>
                   </a:txBody>
@@ -7597,8 +7350,10 @@
                         </a:lnSpc>
                       </a:pPr>
                       <a:r>
-                        <a:rPr lang="en-US" sz="1600" i="0" dirty="0"/>
-                        <a:t>Refactoring</a:t>
+                        <a:rPr lang="en-US" sz="1800" i="0" dirty="0">
+                          <a:latin typeface="+mn-lt"/>
+                        </a:rPr>
+                        <a:t>Software Testing 2</a:t>
                       </a:r>
                     </a:p>
                   </a:txBody>
@@ -7627,46 +7382,13 @@
                         <a:defRPr/>
                       </a:pPr>
                       <a:r>
-                        <a:rPr lang="en-US" sz="1600" i="0" dirty="0">
+                        <a:rPr lang="en-US" sz="1800" i="0" dirty="0">
                           <a:solidFill>
                             <a:schemeClr val="tx1"/>
                           </a:solidFill>
+                          <a:latin typeface="+mn-lt"/>
                         </a:rPr>
-                        <a:t>Anshu Dubey, ANL</a:t>
-                      </a:r>
-                    </a:p>
-                  </a:txBody>
-                  <a:tcPr/>
-                </a:tc>
-                <a:tc>
-                  <a:txBody>
-                    <a:bodyPr/>
-                    <a:lstStyle/>
-                    <a:p>
-                      <a:pPr marL="0" marR="0" lvl="0" indent="0" algn="l" defTabSz="914400" rtl="0" eaLnBrk="1" fontAlgn="auto" latinLnBrk="0" hangingPunct="1">
-                        <a:lnSpc>
-                          <a:spcPct val="100000"/>
-                        </a:lnSpc>
-                        <a:spcBef>
-                          <a:spcPts val="0"/>
-                        </a:spcBef>
-                        <a:spcAft>
-                          <a:spcPts val="0"/>
-                        </a:spcAft>
-                        <a:buClrTx/>
-                        <a:buSzTx/>
-                        <a:buFontTx/>
-                        <a:buNone/>
-                        <a:tabLst/>
-                        <a:defRPr/>
-                      </a:pPr>
-                      <a:r>
-                        <a:rPr lang="en-US" sz="1600" i="0" dirty="0">
-                          <a:solidFill>
-                            <a:schemeClr val="tx1"/>
-                          </a:solidFill>
-                        </a:rPr>
-                        <a:t>21:50-22:35</a:t>
+                        <a:t>David M. Rogers</a:t>
                       </a:r>
                     </a:p>
                   </a:txBody>
@@ -7693,10 +7415,11 @@
                         </a:spcAft>
                       </a:pPr>
                       <a:r>
-                        <a:rPr lang="en-US" sz="1600" dirty="0">
+                        <a:rPr lang="en-US" sz="1800" dirty="0">
                           <a:effectLst/>
+                          <a:latin typeface="+mn-lt"/>
                         </a:rPr>
-                        <a:t>5:35pm-5:50pm</a:t>
+                        <a:t>3:15pm-3:40pm</a:t>
                       </a:r>
                     </a:p>
                   </a:txBody>
@@ -7713,8 +7436,10 @@
                         </a:lnSpc>
                       </a:pPr>
                       <a:r>
-                        <a:rPr lang="en-US" sz="1600" i="0" dirty="0"/>
-                        <a:t>08</a:t>
+                        <a:rPr lang="en-US" sz="1800" i="0" dirty="0">
+                          <a:latin typeface="+mn-lt"/>
+                        </a:rPr>
+                        <a:t>07</a:t>
                       </a:r>
                     </a:p>
                   </a:txBody>
@@ -7731,8 +7456,10 @@
                         </a:lnSpc>
                       </a:pPr>
                       <a:r>
-                        <a:rPr lang="en-US" sz="1600" i="0" dirty="0"/>
-                        <a:t>Continuous Integration</a:t>
+                        <a:rPr lang="en-US" sz="1800" i="0" dirty="0">
+                          <a:latin typeface="+mn-lt"/>
+                        </a:rPr>
+                        <a:t>Refactoring</a:t>
                       </a:r>
                     </a:p>
                   </a:txBody>
@@ -7749,26 +7476,10 @@
                         </a:lnSpc>
                       </a:pPr>
                       <a:r>
-                        <a:rPr lang="en-US" sz="1600" dirty="0"/>
-                        <a:t>David E. Bernholdt, ORNL</a:t>
-                      </a:r>
-                    </a:p>
-                  </a:txBody>
-                  <a:tcPr/>
-                </a:tc>
-                <a:tc>
-                  <a:txBody>
-                    <a:bodyPr/>
-                    <a:lstStyle/>
-                    <a:p>
-                      <a:pPr>
-                        <a:lnSpc>
-                          <a:spcPct val="100000"/>
-                        </a:lnSpc>
-                      </a:pPr>
-                      <a:r>
-                        <a:rPr lang="en-US" sz="1600" dirty="0"/>
-                        <a:t>22:35-22:50</a:t>
+                        <a:rPr lang="en-US" sz="1800" dirty="0">
+                          <a:latin typeface="+mn-lt"/>
+                        </a:rPr>
+                        <a:t>Anshu Dubey, ANL</a:t>
                       </a:r>
                     </a:p>
                   </a:txBody>
@@ -7795,10 +7506,11 @@
                         </a:spcAft>
                       </a:pPr>
                       <a:r>
-                        <a:rPr lang="en-US" sz="1600" dirty="0">
+                        <a:rPr lang="en-US" sz="1800" dirty="0">
                           <a:effectLst/>
+                          <a:latin typeface="+mn-lt"/>
                         </a:rPr>
-                        <a:t>5:50pm-6:05pm</a:t>
+                        <a:t>3:40pm-3:55pm</a:t>
                       </a:r>
                     </a:p>
                   </a:txBody>
@@ -7815,8 +7527,10 @@
                         </a:lnSpc>
                       </a:pPr>
                       <a:r>
-                        <a:rPr lang="en-US" sz="1600" i="0" dirty="0"/>
-                        <a:t>09</a:t>
+                        <a:rPr lang="en-US" sz="1800" i="0" dirty="0">
+                          <a:latin typeface="+mn-lt"/>
+                        </a:rPr>
+                        <a:t>08</a:t>
                       </a:r>
                     </a:p>
                   </a:txBody>
@@ -7833,7 +7547,9 @@
                         </a:lnSpc>
                       </a:pPr>
                       <a:r>
-                        <a:rPr lang="en-US" sz="1600" i="0" dirty="0"/>
+                        <a:rPr lang="en-US" sz="1800" i="0" dirty="0">
+                          <a:latin typeface="+mn-lt"/>
+                        </a:rPr>
                         <a:t>Reproducibility</a:t>
                       </a:r>
                     </a:p>
@@ -7851,26 +7567,10 @@
                         </a:lnSpc>
                       </a:pPr>
                       <a:r>
-                        <a:rPr lang="en-US" sz="1600" dirty="0"/>
-                        <a:t>Patricia Grubel, LANL</a:t>
-                      </a:r>
-                    </a:p>
-                  </a:txBody>
-                  <a:tcPr/>
-                </a:tc>
-                <a:tc>
-                  <a:txBody>
-                    <a:bodyPr/>
-                    <a:lstStyle/>
-                    <a:p>
-                      <a:pPr>
-                        <a:lnSpc>
-                          <a:spcPct val="100000"/>
-                        </a:lnSpc>
-                      </a:pPr>
-                      <a:r>
-                        <a:rPr lang="en-US" sz="1600" dirty="0"/>
-                        <a:t>22:50-23:05</a:t>
+                        <a:rPr lang="en-US" sz="1800" dirty="0">
+                          <a:latin typeface="+mn-lt"/>
+                        </a:rPr>
+                        <a:t>David E. Bernholdt, ORNL</a:t>
                       </a:r>
                     </a:p>
                   </a:txBody>
@@ -7897,10 +7597,11 @@
                         </a:spcAft>
                       </a:pPr>
                       <a:r>
-                        <a:rPr lang="en-US" sz="1600" dirty="0">
+                        <a:rPr lang="en-US" sz="1800" dirty="0">
                           <a:effectLst/>
+                          <a:latin typeface="+mn-lt"/>
                         </a:rPr>
-                        <a:t>6:05pm-6:10pm</a:t>
+                        <a:t>3:55pm-4:00pm</a:t>
                       </a:r>
                     </a:p>
                   </a:txBody>
@@ -7917,8 +7618,10 @@
                         </a:lnSpc>
                       </a:pPr>
                       <a:r>
-                        <a:rPr lang="en-US" sz="1600" i="0" dirty="0"/>
-                        <a:t>10</a:t>
+                        <a:rPr lang="en-US" sz="1800" i="0" dirty="0">
+                          <a:latin typeface="+mn-lt"/>
+                        </a:rPr>
+                        <a:t>09</a:t>
                       </a:r>
                     </a:p>
                   </a:txBody>
@@ -7935,7 +7638,9 @@
                         </a:lnSpc>
                       </a:pPr>
                       <a:r>
-                        <a:rPr lang="en-US" sz="1600" i="0" dirty="0"/>
+                        <a:rPr lang="en-US" sz="1800" i="0" dirty="0">
+                          <a:latin typeface="+mn-lt"/>
+                        </a:rPr>
                         <a:t>Summary</a:t>
                       </a:r>
                     </a:p>
@@ -7953,26 +7658,10 @@
                         </a:lnSpc>
                       </a:pPr>
                       <a:r>
-                        <a:rPr lang="en-US" sz="1600" dirty="0"/>
+                        <a:rPr lang="en-US" sz="1800" dirty="0">
+                          <a:latin typeface="+mn-lt"/>
+                        </a:rPr>
                         <a:t>David E. Bernholdt, ORNL</a:t>
-                      </a:r>
-                    </a:p>
-                  </a:txBody>
-                  <a:tcPr/>
-                </a:tc>
-                <a:tc>
-                  <a:txBody>
-                    <a:bodyPr/>
-                    <a:lstStyle/>
-                    <a:p>
-                      <a:pPr>
-                        <a:lnSpc>
-                          <a:spcPct val="100000"/>
-                        </a:lnSpc>
-                      </a:pPr>
-                      <a:r>
-                        <a:rPr lang="en-US" sz="1600" dirty="0"/>
-                        <a:t>23:05-23:10</a:t>
                       </a:r>
                     </a:p>
                   </a:txBody>
@@ -7984,192 +7673,16 @@
                   </a:ext>
                 </a:extLst>
               </a:tr>
-              <a:tr h="370840">
-                <a:tc>
-                  <a:txBody>
-                    <a:bodyPr/>
-                    <a:lstStyle/>
-                    <a:p>
-                      <a:pPr rtl="0" fontAlgn="t">
-                        <a:spcBef>
-                          <a:spcPts val="0"/>
-                        </a:spcBef>
-                        <a:spcAft>
-                          <a:spcPts val="0"/>
-                        </a:spcAft>
-                      </a:pPr>
-                      <a:r>
-                        <a:rPr lang="en-US" sz="1600" i="1" dirty="0">
-                          <a:solidFill>
-                            <a:schemeClr val="tx2"/>
-                          </a:solidFill>
-                          <a:effectLst/>
-                        </a:rPr>
-                        <a:t>6:10pm-6:30pm</a:t>
-                      </a:r>
-                    </a:p>
-                  </a:txBody>
-                  <a:tcPr marL="63500" marR="63500" marT="63500" marB="63500"/>
-                </a:tc>
-                <a:tc>
-                  <a:txBody>
-                    <a:bodyPr/>
-                    <a:lstStyle/>
-                    <a:p>
-                      <a:pPr>
-                        <a:lnSpc>
-                          <a:spcPct val="100000"/>
-                        </a:lnSpc>
-                      </a:pPr>
-                      <a:endParaRPr lang="en-US" sz="1600" i="1" dirty="0">
-                        <a:solidFill>
-                          <a:schemeClr val="tx2"/>
-                        </a:solidFill>
-                      </a:endParaRPr>
-                    </a:p>
-                  </a:txBody>
-                  <a:tcPr/>
-                </a:tc>
-                <a:tc>
-                  <a:txBody>
-                    <a:bodyPr/>
-                    <a:lstStyle/>
-                    <a:p>
-                      <a:pPr>
-                        <a:lnSpc>
-                          <a:spcPct val="100000"/>
-                        </a:lnSpc>
-                      </a:pPr>
-                      <a:r>
-                        <a:rPr lang="en-US" sz="1600" i="1" dirty="0">
-                          <a:solidFill>
-                            <a:schemeClr val="tx2"/>
-                          </a:solidFill>
-                        </a:rPr>
-                        <a:t>Live Q&amp;A and demo of CI hands-on activities</a:t>
-                      </a:r>
-                    </a:p>
-                  </a:txBody>
-                  <a:tcPr/>
-                </a:tc>
-                <a:tc>
-                  <a:txBody>
-                    <a:bodyPr/>
-                    <a:lstStyle/>
-                    <a:p>
-                      <a:pPr>
-                        <a:lnSpc>
-                          <a:spcPct val="100000"/>
-                        </a:lnSpc>
-                      </a:pPr>
-                      <a:r>
-                        <a:rPr lang="en-US" sz="1600" i="1" dirty="0">
-                          <a:solidFill>
-                            <a:schemeClr val="tx2"/>
-                          </a:solidFill>
-                        </a:rPr>
-                        <a:t>David E. Bernholdt and All</a:t>
-                      </a:r>
-                    </a:p>
-                  </a:txBody>
-                  <a:tcPr/>
-                </a:tc>
-                <a:tc>
-                  <a:txBody>
-                    <a:bodyPr/>
-                    <a:lstStyle/>
-                    <a:p>
-                      <a:pPr>
-                        <a:lnSpc>
-                          <a:spcPct val="100000"/>
-                        </a:lnSpc>
-                      </a:pPr>
-                      <a:r>
-                        <a:rPr lang="en-US" sz="1600" i="1" dirty="0">
-                          <a:solidFill>
-                            <a:schemeClr val="tx2"/>
-                          </a:solidFill>
-                        </a:rPr>
-                        <a:t>23:10-23:30</a:t>
-                      </a:r>
-                    </a:p>
-                  </a:txBody>
-                  <a:tcPr/>
-                </a:tc>
-                <a:extLst>
-                  <a:ext uri="{0D108BD9-81ED-4DB2-BD59-A6C34878D82A}">
-                    <a16:rowId xmlns:a16="http://schemas.microsoft.com/office/drawing/2014/main" val="2700633054"/>
-                  </a:ext>
-                </a:extLst>
-              </a:tr>
             </a:tbl>
           </a:graphicData>
         </a:graphic>
       </p:graphicFrame>
-      <p:sp>
-        <p:nvSpPr>
-          <p:cNvPr id="5" name="Rectangle 4">
+      <p:grpSp>
+        <p:nvGrpSpPr>
+          <p:cNvPr id="5" name="Group 4">
             <a:extLst>
               <a:ext uri="{FF2B5EF4-FFF2-40B4-BE49-F238E27FC236}">
-                <a16:creationId xmlns:a16="http://schemas.microsoft.com/office/drawing/2014/main" id="{E4880E9D-796B-4059-866B-77E314ECAE90}"/>
-              </a:ext>
-            </a:extLst>
-          </p:cNvPr>
-          <p:cNvSpPr/>
-          <p:nvPr/>
-        </p:nvSpPr>
-        <p:spPr>
-          <a:xfrm>
-            <a:off x="482119" y="6488668"/>
-            <a:ext cx="11224586" cy="369332"/>
-          </a:xfrm>
-          <a:prstGeom prst="rect">
-            <a:avLst/>
-          </a:prstGeom>
-        </p:spPr>
-        <p:txBody>
-          <a:bodyPr wrap="square">
-            <a:spAutoFit/>
-          </a:bodyPr>
-          <a:lstStyle/>
-          <a:p>
-            <a:r>
-              <a:rPr lang="en-US" dirty="0">
-                <a:solidFill>
-                  <a:schemeClr val="accent2"/>
-                </a:solidFill>
-              </a:rPr>
-              <a:t>Please evaluate us: </a:t>
-            </a:r>
-            <a:r>
-              <a:rPr lang="en-US" u="sng" dirty="0">
-                <a:solidFill>
-                  <a:schemeClr val="accent2"/>
-                </a:solidFill>
-                <a:hlinkClick r:id="rId2">
-                  <a:extLst>
-                    <a:ext uri="{A12FA001-AC4F-418D-AE19-62706E023703}">
-                      <ahyp:hlinkClr xmlns:ahyp="http://schemas.microsoft.com/office/drawing/2018/hyperlinkcolor" val="tx"/>
-                    </a:ext>
-                  </a:extLst>
-                </a:hlinkClick>
-              </a:rPr>
-              <a:t>https://submissions.supercomputing.org/?page=Submit&amp;id=TutorialEvaluation&amp;site=sc20</a:t>
-            </a:r>
-            <a:endParaRPr lang="en-US" u="sng" dirty="0">
-              <a:solidFill>
-                <a:schemeClr val="accent2"/>
-              </a:solidFill>
-            </a:endParaRPr>
-          </a:p>
-        </p:txBody>
-      </p:sp>
-      <p:grpSp>
-        <p:nvGrpSpPr>
-          <p:cNvPr id="6" name="Group 5">
-            <a:extLst>
-              <a:ext uri="{FF2B5EF4-FFF2-40B4-BE49-F238E27FC236}">
-                <a16:creationId xmlns:a16="http://schemas.microsoft.com/office/drawing/2014/main" id="{B9669579-8C6A-4106-9209-D9CA21E1AFAF}"/>
+                <a16:creationId xmlns:a16="http://schemas.microsoft.com/office/drawing/2014/main" id="{E481C384-B67A-4E1A-9712-8751F487059D}"/>
               </a:ext>
             </a:extLst>
           </p:cNvPr>
@@ -8178,22 +7691,24 @@
         </p:nvGrpSpPr>
         <p:grpSpPr>
           <a:xfrm>
-            <a:off x="79513" y="1990146"/>
-            <a:ext cx="12029799" cy="390939"/>
+            <a:off x="649538" y="2122582"/>
+            <a:ext cx="10909739" cy="390939"/>
             <a:chOff x="79513" y="1653208"/>
             <a:chExt cx="12029799" cy="390939"/>
           </a:xfrm>
         </p:grpSpPr>
         <p:cxnSp>
           <p:nvCxnSpPr>
-            <p:cNvPr id="7" name="Straight Connector 6">
+            <p:cNvPr id="6" name="Straight Connector 5">
               <a:extLst>
                 <a:ext uri="{FF2B5EF4-FFF2-40B4-BE49-F238E27FC236}">
-                  <a16:creationId xmlns:a16="http://schemas.microsoft.com/office/drawing/2014/main" id="{2DAE54F5-E98A-481E-9F56-46D560D76AAA}"/>
+                  <a16:creationId xmlns:a16="http://schemas.microsoft.com/office/drawing/2014/main" id="{81FDDF4F-CEBB-4DB2-B54C-DBAC5A6EF985}"/>
                 </a:ext>
               </a:extLst>
             </p:cNvPr>
-            <p:cNvCxnSpPr/>
+            <p:cNvCxnSpPr>
+              <a:cxnSpLocks/>
+            </p:cNvCxnSpPr>
             <p:nvPr/>
           </p:nvCxnSpPr>
           <p:spPr>
@@ -8227,10 +7742,10 @@
         </p:cxnSp>
         <p:sp>
           <p:nvSpPr>
-            <p:cNvPr id="8" name="Arrow: Right 7">
+            <p:cNvPr id="7" name="Arrow: Right 7">
               <a:extLst>
                 <a:ext uri="{FF2B5EF4-FFF2-40B4-BE49-F238E27FC236}">
-                  <a16:creationId xmlns:a16="http://schemas.microsoft.com/office/drawing/2014/main" id="{A82B5609-8BB6-4280-AC83-8617D3F38825}"/>
+                  <a16:creationId xmlns:a16="http://schemas.microsoft.com/office/drawing/2014/main" id="{7844F343-E894-4FE0-A6FA-018D93AF813D}"/>
                 </a:ext>
               </a:extLst>
             </p:cNvPr>
@@ -8302,10 +7817,10 @@
         </p:sp>
         <p:sp>
           <p:nvSpPr>
-            <p:cNvPr id="9" name="Arrow: Right 8">
+            <p:cNvPr id="8" name="Arrow: Right 8">
               <a:extLst>
                 <a:ext uri="{FF2B5EF4-FFF2-40B4-BE49-F238E27FC236}">
-                  <a16:creationId xmlns:a16="http://schemas.microsoft.com/office/drawing/2014/main" id="{20860F8E-7C48-4618-B27B-31F5DB7564E4}"/>
+                  <a16:creationId xmlns:a16="http://schemas.microsoft.com/office/drawing/2014/main" id="{BBFB6C66-6CBA-4D40-8622-561E8F751365}"/>
                 </a:ext>
               </a:extLst>
             </p:cNvPr>
@@ -8379,7 +7894,7 @@
     </p:spTree>
     <p:extLst>
       <p:ext uri="{BB962C8B-B14F-4D97-AF65-F5344CB8AC3E}">
-        <p14:creationId xmlns:p14="http://schemas.microsoft.com/office/powerpoint/2010/main" val="3051450763"/>
+        <p14:creationId xmlns:p14="http://schemas.microsoft.com/office/powerpoint/2010/main" val="1979244594"/>
       </p:ext>
     </p:extLst>
   </p:cSld>
@@ -8508,13 +8023,13 @@
             </a:pPr>
             <a:r>
               <a:rPr lang="en-US" sz="1600" b="1" dirty="0"/>
-              <a:t>The requested citation the overall tutorial is: David E. Bernholdt, Anshu Dubey, Patricia A. Grubel, Rinku K. Gupta, Better Scientific Software tutorial, in SC ‘20: International Conference for High Performance Computing, Networking, Storage and Analysis, online, 2020. DOI: </a:t>
+              <a:t>The requested citation the overall tutorial is: David E. Bernholdt, Anshu Dubey, Rinku K. Gupta, and David M. Rogers, Better Scientific Software tutorial, in Improving Scientific Software conference, online, 2021. DOI: </a:t>
             </a:r>
             <a:r>
               <a:rPr lang="en-US" sz="1600" b="1" dirty="0">
                 <a:hlinkClick r:id="rId4"/>
               </a:rPr>
-              <a:t>10.6084/m9.figshare.12994376</a:t>
+              <a:t>10.6084/m9.figshare.14256257</a:t>
             </a:r>
             <a:endParaRPr lang="en-US" sz="1600" b="1" dirty="0"/>
           </a:p>
@@ -8720,7 +8235,7 @@
     </p:spTree>
     <p:extLst>
       <p:ext uri="{BB962C8B-B14F-4D97-AF65-F5344CB8AC3E}">
-        <p14:creationId xmlns:p14="http://schemas.microsoft.com/office/powerpoint/2010/main" val="597306865"/>
+        <p14:creationId xmlns:p14="http://schemas.microsoft.com/office/powerpoint/2010/main" val="978726433"/>
       </p:ext>
     </p:extLst>
   </p:cSld>
@@ -11814,21 +11329,12 @@
 </file>
 
 <file path=customXml/item1.xml><?xml version="1.0" encoding="utf-8"?>
-<?mso-contentType ?>
-<FormTemplates xmlns="http://schemas.microsoft.com/sharepoint/v3/contenttype/forms">
-  <Display>DocumentLibraryForm</Display>
-  <Edit>DocumentLibraryForm</Edit>
-  <New>DocumentLibraryForm</New>
-</FormTemplates>
-</file>
-
-<file path=customXml/item2.xml><?xml version="1.0" encoding="utf-8"?>
 <p:properties xmlns:p="http://schemas.microsoft.com/office/2006/metadata/properties" xmlns:xsi="http://www.w3.org/2001/XMLSchema-instance" xmlns:pc="http://schemas.microsoft.com/office/infopath/2007/PartnerControls">
   <documentManagement/>
 </p:properties>
 </file>
 
-<file path=customXml/item3.xml><?xml version="1.0" encoding="utf-8"?>
+<file path=customXml/item2.xml><?xml version="1.0" encoding="utf-8"?>
 <ct:contentTypeSchema xmlns:ct="http://schemas.microsoft.com/office/2006/metadata/contentType" xmlns:ma="http://schemas.microsoft.com/office/2006/metadata/properties/metaAttributes" ct:_="" ma:_="" ma:contentTypeName="Document" ma:contentTypeID="0x010100565464437F680748A68B85EB6594EA7D" ma:contentTypeVersion="0" ma:contentTypeDescription="Create a new document." ma:contentTypeScope="" ma:versionID="fe3f4dd58d5914c51cfc6deaa8ad845c">
   <xsd:schema xmlns:xsd="http://www.w3.org/2001/XMLSchema" xmlns:p="http://schemas.microsoft.com/office/2006/metadata/properties" targetNamespace="http://schemas.microsoft.com/office/2006/metadata/properties" ma:root="true" ma:fieldsID="4aeb20c0e3442673af7ee10786458764">
     <xsd:element name="properties">
@@ -11877,15 +11383,16 @@
 </ct:contentTypeSchema>
 </file>
 
-<file path=customXml/itemProps1.xml><?xml version="1.0" encoding="utf-8"?>
-<ds:datastoreItem xmlns:ds="http://schemas.openxmlformats.org/officeDocument/2006/customXml" ds:itemID="{19E20559-B232-4371-8690-E3D8007EDB82}">
-  <ds:schemaRefs>
-    <ds:schemaRef ds:uri="http://schemas.microsoft.com/sharepoint/v3/contenttype/forms"/>
-  </ds:schemaRefs>
-</ds:datastoreItem>
+<file path=customXml/item3.xml><?xml version="1.0" encoding="utf-8"?>
+<?mso-contentType ?>
+<FormTemplates xmlns="http://schemas.microsoft.com/sharepoint/v3/contenttype/forms">
+  <Display>DocumentLibraryForm</Display>
+  <Edit>DocumentLibraryForm</Edit>
+  <New>DocumentLibraryForm</New>
+</FormTemplates>
 </file>
 
-<file path=customXml/itemProps2.xml><?xml version="1.0" encoding="utf-8"?>
+<file path=customXml/itemProps1.xml><?xml version="1.0" encoding="utf-8"?>
 <ds:datastoreItem xmlns:ds="http://schemas.openxmlformats.org/officeDocument/2006/customXml" ds:itemID="{A50EC660-24D0-43A0-AE5E-E274115E726B}">
   <ds:schemaRefs>
     <ds:schemaRef ds:uri="http://www.w3.org/XML/1998/namespace"/>
@@ -11900,7 +11407,7 @@
 </ds:datastoreItem>
 </file>
 
-<file path=customXml/itemProps3.xml><?xml version="1.0" encoding="utf-8"?>
+<file path=customXml/itemProps2.xml><?xml version="1.0" encoding="utf-8"?>
 <ds:datastoreItem xmlns:ds="http://schemas.openxmlformats.org/officeDocument/2006/customXml" ds:itemID="{E8DB7DEB-074E-4EE8-9B6E-FD277323109C}">
   <ds:schemaRefs>
     <ds:schemaRef ds:uri="http://schemas.microsoft.com/office/2006/metadata/contentType"/>
@@ -11913,4 +11420,12 @@
     <ds:schemaRef ds:uri="http://schemas.microsoft.com/office/internal/2005/internalDocumentation"/>
   </ds:schemaRefs>
 </ds:datastoreItem>
+</file>
+
+<file path=customXml/itemProps3.xml><?xml version="1.0" encoding="utf-8"?>
+<ds:datastoreItem xmlns:ds="http://schemas.openxmlformats.org/officeDocument/2006/customXml" ds:itemID="{19E20559-B232-4371-8690-E3D8007EDB82}">
+  <ds:schemaRefs>
+    <ds:schemaRef ds:uri="http://schemas.microsoft.com/sharepoint/v3/contenttype/forms"/>
+  </ds:schemaRefs>
+</ds:datastoreItem>
 </file>
</xml_diff>

<commit_message>
Update overview for ISC
</commit_message>
<xml_diff>
--- a/overview.pptx
+++ b/overview.pptx
@@ -5,24 +5,33 @@
     <p:sldMasterId id="2147483935" r:id="rId4"/>
   </p:sldMasterIdLst>
   <p:notesMasterIdLst>
-    <p:notesMasterId r:id="rId17"/>
+    <p:notesMasterId r:id="rId26"/>
   </p:notesMasterIdLst>
   <p:handoutMasterIdLst>
-    <p:handoutMasterId r:id="rId18"/>
+    <p:handoutMasterId r:id="rId27"/>
   </p:handoutMasterIdLst>
   <p:sldIdLst>
     <p:sldId id="318" r:id="rId5"/>
     <p:sldId id="320" r:id="rId6"/>
     <p:sldId id="1819" r:id="rId7"/>
     <p:sldId id="325" r:id="rId8"/>
-    <p:sldId id="1823" r:id="rId9"/>
+    <p:sldId id="1821" r:id="rId9"/>
     <p:sldId id="1822" r:id="rId10"/>
     <p:sldId id="1824" r:id="rId11"/>
     <p:sldId id="1846" r:id="rId12"/>
-    <p:sldId id="1821" r:id="rId13"/>
+    <p:sldId id="1823" r:id="rId13"/>
     <p:sldId id="1820" r:id="rId14"/>
-    <p:sldId id="279" r:id="rId15"/>
-    <p:sldId id="1845" r:id="rId16"/>
+    <p:sldId id="1848" r:id="rId15"/>
+    <p:sldId id="1849" r:id="rId16"/>
+    <p:sldId id="1850" r:id="rId17"/>
+    <p:sldId id="1851" r:id="rId18"/>
+    <p:sldId id="1852" r:id="rId19"/>
+    <p:sldId id="1855" r:id="rId20"/>
+    <p:sldId id="1854" r:id="rId21"/>
+    <p:sldId id="1856" r:id="rId22"/>
+    <p:sldId id="1857" r:id="rId23"/>
+    <p:sldId id="1845" r:id="rId24"/>
+    <p:sldId id="1858" r:id="rId25"/>
   </p:sldIdLst>
   <p:sldSz cx="12188825" cy="6858000"/>
   <p:notesSz cx="7010400" cy="9296400"/>
@@ -266,7 +275,7 @@
           <a:p>
             <a:fld id="{0B842F42-2CE9-4E35-95C1-410DC08A50B1}" type="datetimeFigureOut">
               <a:rPr lang="en-US" smtClean="0"/>
-              <a:t>5/21/2021</a:t>
+              <a:t>6/14/2021</a:t>
             </a:fld>
             <a:endParaRPr lang="en-US"/>
           </a:p>
@@ -431,7 +440,7 @@
           <a:p>
             <a:fld id="{6F282904-F315-4730-8D91-37D99E141A6F}" type="datetimeFigureOut">
               <a:rPr lang="en-US" smtClean="0"/>
-              <a:t>5/21/2021</a:t>
+              <a:t>6/14/2021</a:t>
             </a:fld>
             <a:endParaRPr lang="en-US"/>
           </a:p>
@@ -4778,7 +4787,112 @@
       </p:grpSpPr>
       <p:sp>
         <p:nvSpPr>
-          <p:cNvPr id="6" name="Title 1"/>
+          <p:cNvPr id="3" name="Title 2">
+            <a:extLst>
+              <a:ext uri="{FF2B5EF4-FFF2-40B4-BE49-F238E27FC236}">
+                <a16:creationId xmlns:a16="http://schemas.microsoft.com/office/drawing/2014/main" id="{B3161E7B-1B03-4C4A-87D2-F133E12924E1}"/>
+              </a:ext>
+            </a:extLst>
+          </p:cNvPr>
+          <p:cNvSpPr>
+            <a:spLocks noGrp="1"/>
+          </p:cNvSpPr>
+          <p:nvPr>
+            <p:ph type="title"/>
+          </p:nvPr>
+        </p:nvSpPr>
+        <p:spPr/>
+        <p:txBody>
+          <a:bodyPr/>
+          <a:lstStyle/>
+          <a:p>
+            <a:r>
+              <a:rPr lang="en-US" dirty="0"/>
+              <a:t>So, What Are Good Software Practices?</a:t>
+            </a:r>
+          </a:p>
+        </p:txBody>
+      </p:sp>
+      <p:sp>
+        <p:nvSpPr>
+          <p:cNvPr id="4" name="Content Placeholder 3">
+            <a:extLst>
+              <a:ext uri="{FF2B5EF4-FFF2-40B4-BE49-F238E27FC236}">
+                <a16:creationId xmlns:a16="http://schemas.microsoft.com/office/drawing/2014/main" id="{0B2BD4E6-18EC-4F8B-B51A-517FF6F77967}"/>
+              </a:ext>
+            </a:extLst>
+          </p:cNvPr>
+          <p:cNvSpPr>
+            <a:spLocks noGrp="1"/>
+          </p:cNvSpPr>
+          <p:nvPr>
+            <p:ph idx="1"/>
+          </p:nvPr>
+        </p:nvSpPr>
+        <p:spPr/>
+        <p:txBody>
+          <a:bodyPr/>
+          <a:lstStyle/>
+          <a:p>
+            <a:r>
+              <a:rPr lang="en-US" dirty="0"/>
+              <a:t>There is no fixed, universally agreed set of best practices for scientific software</a:t>
+            </a:r>
+          </a:p>
+          <a:p>
+            <a:pPr lvl="1"/>
+            <a:r>
+              <a:rPr lang="en-US" dirty="0"/>
+              <a:t>Specifics of what’s appropriate will depend on the software, how it is used, and the team</a:t>
+            </a:r>
+          </a:p>
+          <a:p>
+            <a:r>
+              <a:rPr lang="en-US" dirty="0"/>
+              <a:t>Let’s look at a few recommendations from different perspectives…</a:t>
+            </a:r>
+          </a:p>
+        </p:txBody>
+      </p:sp>
+    </p:spTree>
+    <p:extLst>
+      <p:ext uri="{BB962C8B-B14F-4D97-AF65-F5344CB8AC3E}">
+        <p14:creationId xmlns:p14="http://schemas.microsoft.com/office/powerpoint/2010/main" val="421412141"/>
+      </p:ext>
+    </p:extLst>
+  </p:cSld>
+  <p:clrMapOvr>
+    <a:masterClrMapping/>
+  </p:clrMapOvr>
+</p:sld>
+</file>
+
+<file path=ppt/slides/slide12.xml><?xml version="1.0" encoding="utf-8"?>
+<p:sld xmlns:a="http://schemas.openxmlformats.org/drawingml/2006/main" xmlns:r="http://schemas.openxmlformats.org/officeDocument/2006/relationships" xmlns:p="http://schemas.openxmlformats.org/presentationml/2006/main">
+  <p:cSld>
+    <p:spTree>
+      <p:nvGrpSpPr>
+        <p:cNvPr id="1" name=""/>
+        <p:cNvGrpSpPr/>
+        <p:nvPr/>
+      </p:nvGrpSpPr>
+      <p:grpSpPr>
+        <a:xfrm>
+          <a:off x="0" y="0"/>
+          <a:ext cx="0" cy="0"/>
+          <a:chOff x="0" y="0"/>
+          <a:chExt cx="0" cy="0"/>
+        </a:xfrm>
+      </p:grpSpPr>
+      <p:sp>
+        <p:nvSpPr>
+          <p:cNvPr id="2" name="Title 1">
+            <a:extLst>
+              <a:ext uri="{FF2B5EF4-FFF2-40B4-BE49-F238E27FC236}">
+                <a16:creationId xmlns:a16="http://schemas.microsoft.com/office/drawing/2014/main" id="{7451A221-00BB-4705-81CF-5ED483AAFA37}"/>
+              </a:ext>
+            </a:extLst>
+          </p:cNvPr>
           <p:cNvSpPr>
             <a:spLocks noGrp="1"/>
           </p:cNvSpPr>
@@ -4788,8 +4902,8 @@
         </p:nvSpPr>
         <p:spPr>
           <a:xfrm>
-            <a:off x="365760" y="410602"/>
-            <a:ext cx="11375136" cy="510909"/>
+            <a:off x="365760" y="411480"/>
+            <a:ext cx="11375136" cy="914400"/>
           </a:xfrm>
         </p:spPr>
         <p:txBody>
@@ -4798,41 +4912,20 @@
           <a:p>
             <a:r>
               <a:rPr lang="en-US" dirty="0"/>
-              <a:t>Best Practices for Scientific Software Development</a:t>
+              <a:t>Example 1: Best Practices for Scientific Computing (1/2)</a:t>
             </a:r>
           </a:p>
         </p:txBody>
       </p:sp>
       <p:sp>
         <p:nvSpPr>
-          <p:cNvPr id="2" name="Text Placeholder 1"/>
-          <p:cNvSpPr>
-            <a:spLocks noGrp="1"/>
-          </p:cNvSpPr>
-          <p:nvPr>
-            <p:ph type="body" idx="1"/>
-          </p:nvPr>
-        </p:nvSpPr>
-        <p:spPr>
-          <a:xfrm>
-            <a:off x="365760" y="996683"/>
-            <a:ext cx="5588582" cy="821190"/>
-          </a:xfrm>
-        </p:spPr>
-        <p:txBody>
-          <a:bodyPr/>
-          <a:lstStyle/>
-          <a:p>
-            <a:r>
-              <a:rPr lang="en-US" sz="2800" dirty="0"/>
-              <a:t>Baseline</a:t>
-            </a:r>
-          </a:p>
-        </p:txBody>
-      </p:sp>
-      <p:sp>
-        <p:nvSpPr>
-          <p:cNvPr id="7" name="Content Placeholder 2"/>
+          <p:cNvPr id="3" name="Content Placeholder 2">
+            <a:extLst>
+              <a:ext uri="{FF2B5EF4-FFF2-40B4-BE49-F238E27FC236}">
+                <a16:creationId xmlns:a16="http://schemas.microsoft.com/office/drawing/2014/main" id="{43B46A8C-7C71-4181-9781-536B0C68D5D4}"/>
+              </a:ext>
+            </a:extLst>
+          </p:cNvPr>
           <p:cNvSpPr>
             <a:spLocks noGrp="1"/>
           </p:cNvSpPr>
@@ -4842,98 +4935,174 @@
         </p:nvSpPr>
         <p:spPr>
           <a:xfrm>
-            <a:off x="365760" y="1918320"/>
-            <a:ext cx="5588582" cy="4185918"/>
+            <a:off x="457200" y="1417632"/>
+            <a:ext cx="5588000" cy="3373438"/>
           </a:xfrm>
+          <a:ln>
+            <a:noFill/>
+          </a:ln>
         </p:spPr>
         <p:txBody>
-          <a:bodyPr>
-            <a:noAutofit/>
-          </a:bodyPr>
+          <a:bodyPr/>
           <a:lstStyle/>
           <a:p>
-            <a:r>
-              <a:rPr lang="en-US" sz="2400" dirty="0"/>
-              <a:t>Invest in extensible code design</a:t>
-            </a:r>
-          </a:p>
-          <a:p>
-            <a:r>
-              <a:rPr lang="en-US" sz="2400" dirty="0"/>
-              <a:t>Use version control and automated testing</a:t>
-            </a:r>
-          </a:p>
-          <a:p>
-            <a:r>
-              <a:rPr lang="en-US" sz="2400" dirty="0"/>
-              <a:t>Institute a rigorous verification and validation regime</a:t>
-            </a:r>
-          </a:p>
-          <a:p>
-            <a:r>
-              <a:rPr lang="en-US" sz="2400" dirty="0"/>
-              <a:t>Define and enforce coding and testing standards</a:t>
-            </a:r>
-          </a:p>
-          <a:p>
-            <a:r>
-              <a:rPr lang="en-US" sz="2400" dirty="0"/>
-              <a:t>Clear and well-defined policies for </a:t>
-            </a:r>
-          </a:p>
-          <a:p>
-            <a:pPr lvl="1"/>
-            <a:r>
-              <a:rPr lang="en-US" sz="2000" dirty="0"/>
-              <a:t>Auditing and maintenance</a:t>
-            </a:r>
-          </a:p>
-          <a:p>
-            <a:pPr lvl="1"/>
-            <a:r>
-              <a:rPr lang="en-US" sz="2000" dirty="0"/>
-              <a:t>Distribution and contribution</a:t>
-            </a:r>
-          </a:p>
-          <a:p>
-            <a:pPr lvl="1"/>
-            <a:r>
-              <a:rPr lang="en-US" sz="2000" dirty="0"/>
-              <a:t>Documentation</a:t>
+            <a:pPr marL="457200" indent="-457200">
+              <a:buFont typeface="+mj-lt"/>
+              <a:buAutoNum type="arabicPeriod"/>
+            </a:pPr>
+            <a:r>
+              <a:rPr lang="en-US" dirty="0"/>
+              <a:t>Write programs for people, not computers.</a:t>
+            </a:r>
+          </a:p>
+          <a:p>
+            <a:pPr marL="688975" lvl="1" indent="-342900">
+              <a:spcBef>
+                <a:spcPts val="200"/>
+              </a:spcBef>
+              <a:buFont typeface="+mj-lt"/>
+              <a:buAutoNum type="alphaLcPeriod"/>
+            </a:pPr>
+            <a:r>
+              <a:rPr lang="en-US" dirty="0"/>
+              <a:t>A program should not require its readers to hold more than a handful of facts in memory at once.</a:t>
+            </a:r>
+          </a:p>
+          <a:p>
+            <a:pPr marL="688975" lvl="1" indent="-342900">
+              <a:spcBef>
+                <a:spcPts val="200"/>
+              </a:spcBef>
+              <a:buFont typeface="+mj-lt"/>
+              <a:buAutoNum type="alphaLcPeriod"/>
+            </a:pPr>
+            <a:r>
+              <a:rPr lang="en-US" dirty="0"/>
+              <a:t>Make names consistent, distinctive, and meaningful.</a:t>
+            </a:r>
+          </a:p>
+          <a:p>
+            <a:pPr marL="688975" lvl="1" indent="-342900">
+              <a:spcBef>
+                <a:spcPts val="200"/>
+              </a:spcBef>
+              <a:buFont typeface="+mj-lt"/>
+              <a:buAutoNum type="alphaLcPeriod"/>
+            </a:pPr>
+            <a:r>
+              <a:rPr lang="en-US" dirty="0"/>
+              <a:t>Make code style and formatting consistent.</a:t>
+            </a:r>
+          </a:p>
+          <a:p>
+            <a:pPr marL="457200" indent="-457200">
+              <a:buFont typeface="+mj-lt"/>
+              <a:buAutoNum type="arabicPeriod"/>
+            </a:pPr>
+            <a:r>
+              <a:rPr lang="en-US" dirty="0"/>
+              <a:t>Let the computer do the work.</a:t>
+            </a:r>
+          </a:p>
+          <a:p>
+            <a:pPr marL="688975" lvl="1" indent="-342900">
+              <a:spcBef>
+                <a:spcPts val="200"/>
+              </a:spcBef>
+              <a:buFont typeface="+mj-lt"/>
+              <a:buAutoNum type="alphaLcPeriod"/>
+            </a:pPr>
+            <a:r>
+              <a:rPr lang="en-US" dirty="0"/>
+              <a:t>Make the computer repeat tasks.</a:t>
+            </a:r>
+          </a:p>
+          <a:p>
+            <a:pPr marL="688975" lvl="1" indent="-342900">
+              <a:spcBef>
+                <a:spcPts val="200"/>
+              </a:spcBef>
+              <a:buFont typeface="+mj-lt"/>
+              <a:buAutoNum type="alphaLcPeriod"/>
+            </a:pPr>
+            <a:r>
+              <a:rPr lang="en-US" dirty="0"/>
+              <a:t>Save recent commands in a file for re-use.</a:t>
+            </a:r>
+          </a:p>
+          <a:p>
+            <a:pPr marL="688975" lvl="1" indent="-342900">
+              <a:spcBef>
+                <a:spcPts val="200"/>
+              </a:spcBef>
+              <a:buFont typeface="+mj-lt"/>
+              <a:buAutoNum type="alphaLcPeriod"/>
+            </a:pPr>
+            <a:r>
+              <a:rPr lang="en-US" dirty="0"/>
+              <a:t>Use a build tool to automate workflows.</a:t>
+            </a:r>
+          </a:p>
+          <a:p>
+            <a:pPr marL="457200" indent="-457200">
+              <a:buFont typeface="+mj-lt"/>
+              <a:buAutoNum type="arabicPeriod"/>
+            </a:pPr>
+            <a:r>
+              <a:rPr lang="en-US" dirty="0"/>
+              <a:t>Make incremental changes.</a:t>
+            </a:r>
+          </a:p>
+          <a:p>
+            <a:pPr marL="688975" lvl="1" indent="-342900">
+              <a:spcBef>
+                <a:spcPts val="200"/>
+              </a:spcBef>
+              <a:buFont typeface="+mj-lt"/>
+              <a:buAutoNum type="alphaLcPeriod"/>
+            </a:pPr>
+            <a:r>
+              <a:rPr lang="en-US" dirty="0"/>
+              <a:t>Work in small steps with frequent feedback and course correction.</a:t>
+            </a:r>
+          </a:p>
+          <a:p>
+            <a:pPr marL="688975" lvl="1" indent="-342900">
+              <a:spcBef>
+                <a:spcPts val="200"/>
+              </a:spcBef>
+              <a:buFont typeface="+mj-lt"/>
+              <a:buAutoNum type="alphaLcPeriod"/>
+            </a:pPr>
+            <a:r>
+              <a:rPr lang="en-US" dirty="0"/>
+              <a:t>Use a version control system.</a:t>
+            </a:r>
+          </a:p>
+          <a:p>
+            <a:pPr marL="688975" lvl="1" indent="-342900">
+              <a:spcBef>
+                <a:spcPts val="200"/>
+              </a:spcBef>
+              <a:buFont typeface="+mj-lt"/>
+              <a:buAutoNum type="alphaLcPeriod"/>
+            </a:pPr>
+            <a:r>
+              <a:rPr lang="en-US" dirty="0"/>
+              <a:t>Put everything that has been created manually in version control.</a:t>
             </a:r>
           </a:p>
         </p:txBody>
       </p:sp>
       <p:sp>
         <p:nvSpPr>
-          <p:cNvPr id="3" name="Text Placeholder 2"/>
-          <p:cNvSpPr>
-            <a:spLocks noGrp="1"/>
-          </p:cNvSpPr>
-          <p:nvPr>
-            <p:ph type="body" sz="quarter" idx="3"/>
-          </p:nvPr>
-        </p:nvSpPr>
-        <p:spPr>
-          <a:xfrm>
-            <a:off x="6191755" y="996683"/>
-            <a:ext cx="5531934" cy="821190"/>
-          </a:xfrm>
-        </p:spPr>
-        <p:txBody>
-          <a:bodyPr/>
-          <a:lstStyle/>
-          <a:p>
-            <a:r>
-              <a:rPr lang="en-US" sz="2800" dirty="0"/>
-              <a:t>Desirable</a:t>
-            </a:r>
-          </a:p>
-        </p:txBody>
-      </p:sp>
-      <p:sp>
-        <p:nvSpPr>
-          <p:cNvPr id="9" name="Content Placeholder 8"/>
+          <p:cNvPr id="13" name="Content Placeholder 12">
+            <a:extLst>
+              <a:ext uri="{FF2B5EF4-FFF2-40B4-BE49-F238E27FC236}">
+                <a16:creationId xmlns:a16="http://schemas.microsoft.com/office/drawing/2014/main" id="{14726AEC-7AC2-46DB-8C1C-1B1035B77052}"/>
+              </a:ext>
+            </a:extLst>
+          </p:cNvPr>
           <p:cNvSpPr>
             <a:spLocks noGrp="1"/>
           </p:cNvSpPr>
@@ -4943,39 +5112,135 @@
         </p:nvSpPr>
         <p:spPr>
           <a:xfrm>
-            <a:off x="6191755" y="1918320"/>
-            <a:ext cx="5531934" cy="4185918"/>
+            <a:off x="6218914" y="1417132"/>
+            <a:ext cx="5531934" cy="3373229"/>
           </a:xfrm>
+          <a:ln>
+            <a:noFill/>
+          </a:ln>
         </p:spPr>
         <p:txBody>
           <a:bodyPr/>
           <a:lstStyle/>
           <a:p>
-            <a:r>
-              <a:rPr lang="en-US" sz="2400" dirty="0"/>
-              <a:t>Provenance and reproducibility</a:t>
-            </a:r>
-          </a:p>
-          <a:p>
-            <a:r>
-              <a:rPr lang="en-US" sz="2400" dirty="0"/>
-              <a:t>Lifecycle management</a:t>
-            </a:r>
-          </a:p>
-          <a:p>
-            <a:r>
-              <a:rPr lang="en-US" sz="2400" dirty="0"/>
-              <a:t>Open development and frequent releases</a:t>
+            <a:pPr marL="457200" indent="-457200">
+              <a:buFont typeface="+mj-lt"/>
+              <a:buAutoNum type="arabicPeriod" startAt="4"/>
+            </a:pPr>
+            <a:r>
+              <a:rPr lang="en-US" dirty="0"/>
+              <a:t>Don't repeat yourself (or others).</a:t>
+            </a:r>
+          </a:p>
+          <a:p>
+            <a:pPr marL="688975" lvl="1" indent="-342900">
+              <a:spcBef>
+                <a:spcPts val="200"/>
+              </a:spcBef>
+              <a:buFont typeface="+mj-lt"/>
+              <a:buAutoNum type="alphaLcPeriod"/>
+            </a:pPr>
+            <a:r>
+              <a:rPr lang="en-US" dirty="0"/>
+              <a:t>Every piece of data must have a single authoritative representation in the system.</a:t>
+            </a:r>
+          </a:p>
+          <a:p>
+            <a:pPr marL="688975" lvl="1" indent="-342900">
+              <a:spcBef>
+                <a:spcPts val="200"/>
+              </a:spcBef>
+              <a:buFont typeface="+mj-lt"/>
+              <a:buAutoNum type="alphaLcPeriod"/>
+            </a:pPr>
+            <a:r>
+              <a:rPr lang="en-US" dirty="0"/>
+              <a:t>Modularize code rather than copying and pasting.</a:t>
+            </a:r>
+          </a:p>
+          <a:p>
+            <a:pPr marL="688975" lvl="1" indent="-342900">
+              <a:spcBef>
+                <a:spcPts val="200"/>
+              </a:spcBef>
+              <a:buFont typeface="+mj-lt"/>
+              <a:buAutoNum type="alphaLcPeriod"/>
+            </a:pPr>
+            <a:r>
+              <a:rPr lang="en-US" dirty="0"/>
+              <a:t>Re-use code instead of rewriting it.</a:t>
+            </a:r>
+          </a:p>
+          <a:p>
+            <a:pPr marL="457200" indent="-457200">
+              <a:buFont typeface="+mj-lt"/>
+              <a:buAutoNum type="arabicPeriod" startAt="4"/>
+            </a:pPr>
+            <a:r>
+              <a:rPr lang="en-US" dirty="0"/>
+              <a:t>Plan for mistakes.</a:t>
+            </a:r>
+          </a:p>
+          <a:p>
+            <a:pPr marL="688975" lvl="1" indent="-342900">
+              <a:spcBef>
+                <a:spcPts val="200"/>
+              </a:spcBef>
+              <a:buFont typeface="+mj-lt"/>
+              <a:buAutoNum type="alphaLcPeriod"/>
+            </a:pPr>
+            <a:r>
+              <a:rPr lang="en-US" dirty="0"/>
+              <a:t>Add assertions to programs to check their operation.</a:t>
+            </a:r>
+          </a:p>
+          <a:p>
+            <a:pPr marL="688975" lvl="1" indent="-342900">
+              <a:spcBef>
+                <a:spcPts val="200"/>
+              </a:spcBef>
+              <a:buFont typeface="+mj-lt"/>
+              <a:buAutoNum type="alphaLcPeriod"/>
+            </a:pPr>
+            <a:r>
+              <a:rPr lang="en-US" dirty="0"/>
+              <a:t>Use an off-the-shelf unit testing library.</a:t>
+            </a:r>
+          </a:p>
+          <a:p>
+            <a:pPr marL="688975" lvl="1" indent="-342900">
+              <a:spcBef>
+                <a:spcPts val="200"/>
+              </a:spcBef>
+              <a:buFont typeface="+mj-lt"/>
+              <a:buAutoNum type="alphaLcPeriod"/>
+            </a:pPr>
+            <a:r>
+              <a:rPr lang="en-US" dirty="0"/>
+              <a:t>Turn bugs into test cases.</a:t>
+            </a:r>
+          </a:p>
+          <a:p>
+            <a:pPr marL="688975" lvl="1" indent="-342900">
+              <a:spcBef>
+                <a:spcPts val="200"/>
+              </a:spcBef>
+              <a:buFont typeface="+mj-lt"/>
+              <a:buAutoNum type="alphaLcPeriod"/>
+            </a:pPr>
+            <a:r>
+              <a:rPr lang="en-US" dirty="0"/>
+              <a:t>Use a symbolic debugger.</a:t>
             </a:r>
           </a:p>
         </p:txBody>
       </p:sp>
       <p:sp>
         <p:nvSpPr>
-          <p:cNvPr id="4" name="TextBox 3">
+          <p:cNvPr id="8" name="TextBox 7">
             <a:extLst>
               <a:ext uri="{FF2B5EF4-FFF2-40B4-BE49-F238E27FC236}">
-                <a16:creationId xmlns:a16="http://schemas.microsoft.com/office/drawing/2014/main" id="{6AEB12FC-503B-4B3F-A1C9-CE40BF9C4BA1}"/>
+                <a16:creationId xmlns:a16="http://schemas.microsoft.com/office/drawing/2014/main" id="{D09C30BE-8DD1-42E6-ADDB-76D78C54E8B5}"/>
               </a:ext>
             </a:extLst>
           </p:cNvPr>
@@ -4984,8 +5249,2361 @@
         </p:nvSpPr>
         <p:spPr>
           <a:xfrm>
-            <a:off x="6208961" y="4502995"/>
-            <a:ext cx="5531935" cy="1514261"/>
+            <a:off x="2686427" y="868680"/>
+            <a:ext cx="6815970" cy="369332"/>
+          </a:xfrm>
+          <a:prstGeom prst="rect">
+            <a:avLst/>
+          </a:prstGeom>
+          <a:noFill/>
+        </p:spPr>
+        <p:txBody>
+          <a:bodyPr wrap="square">
+            <a:spAutoFit/>
+          </a:bodyPr>
+          <a:lstStyle/>
+          <a:p>
+            <a:r>
+              <a:rPr lang="en-US" dirty="0"/>
+              <a:t>Wilson, et al., (2014) </a:t>
+            </a:r>
+            <a:r>
+              <a:rPr lang="en-US" dirty="0">
+                <a:hlinkClick r:id="rId2"/>
+              </a:rPr>
+              <a:t>https://doi.org/10.1371/journal.pbio.1001745</a:t>
+            </a:r>
+            <a:endParaRPr lang="en-US" dirty="0"/>
+          </a:p>
+        </p:txBody>
+      </p:sp>
+    </p:spTree>
+    <p:extLst>
+      <p:ext uri="{BB962C8B-B14F-4D97-AF65-F5344CB8AC3E}">
+        <p14:creationId xmlns:p14="http://schemas.microsoft.com/office/powerpoint/2010/main" val="2547398329"/>
+      </p:ext>
+    </p:extLst>
+  </p:cSld>
+  <p:clrMapOvr>
+    <a:masterClrMapping/>
+  </p:clrMapOvr>
+</p:sld>
+</file>
+
+<file path=ppt/slides/slide13.xml><?xml version="1.0" encoding="utf-8"?>
+<p:sld xmlns:a="http://schemas.openxmlformats.org/drawingml/2006/main" xmlns:r="http://schemas.openxmlformats.org/officeDocument/2006/relationships" xmlns:p="http://schemas.openxmlformats.org/presentationml/2006/main">
+  <p:cSld>
+    <p:spTree>
+      <p:nvGrpSpPr>
+        <p:cNvPr id="1" name=""/>
+        <p:cNvGrpSpPr/>
+        <p:nvPr/>
+      </p:nvGrpSpPr>
+      <p:grpSpPr>
+        <a:xfrm>
+          <a:off x="0" y="0"/>
+          <a:ext cx="0" cy="0"/>
+          <a:chOff x="0" y="0"/>
+          <a:chExt cx="0" cy="0"/>
+        </a:xfrm>
+      </p:grpSpPr>
+      <p:sp>
+        <p:nvSpPr>
+          <p:cNvPr id="2" name="Title 1">
+            <a:extLst>
+              <a:ext uri="{FF2B5EF4-FFF2-40B4-BE49-F238E27FC236}">
+                <a16:creationId xmlns:a16="http://schemas.microsoft.com/office/drawing/2014/main" id="{7451A221-00BB-4705-81CF-5ED483AAFA37}"/>
+              </a:ext>
+            </a:extLst>
+          </p:cNvPr>
+          <p:cNvSpPr>
+            <a:spLocks noGrp="1"/>
+          </p:cNvSpPr>
+          <p:nvPr>
+            <p:ph type="title"/>
+          </p:nvPr>
+        </p:nvSpPr>
+        <p:spPr>
+          <a:xfrm>
+            <a:off x="365760" y="411480"/>
+            <a:ext cx="11375136" cy="914400"/>
+          </a:xfrm>
+        </p:spPr>
+        <p:txBody>
+          <a:bodyPr/>
+          <a:lstStyle/>
+          <a:p>
+            <a:r>
+              <a:rPr lang="en-US" dirty="0"/>
+              <a:t>Example 1: Best Practices for Scientific Computing (2/2)</a:t>
+            </a:r>
+          </a:p>
+        </p:txBody>
+      </p:sp>
+      <p:sp>
+        <p:nvSpPr>
+          <p:cNvPr id="3" name="Content Placeholder 2">
+            <a:extLst>
+              <a:ext uri="{FF2B5EF4-FFF2-40B4-BE49-F238E27FC236}">
+                <a16:creationId xmlns:a16="http://schemas.microsoft.com/office/drawing/2014/main" id="{43B46A8C-7C71-4181-9781-536B0C68D5D4}"/>
+              </a:ext>
+            </a:extLst>
+          </p:cNvPr>
+          <p:cNvSpPr>
+            <a:spLocks noGrp="1"/>
+          </p:cNvSpPr>
+          <p:nvPr>
+            <p:ph sz="half" idx="2"/>
+          </p:nvPr>
+        </p:nvSpPr>
+        <p:spPr>
+          <a:xfrm>
+            <a:off x="457200" y="1417632"/>
+            <a:ext cx="5588000" cy="3373438"/>
+          </a:xfrm>
+          <a:ln>
+            <a:noFill/>
+          </a:ln>
+        </p:spPr>
+        <p:txBody>
+          <a:bodyPr/>
+          <a:lstStyle/>
+          <a:p>
+            <a:pPr marL="457200" indent="-457200">
+              <a:buFont typeface="+mj-lt"/>
+              <a:buAutoNum type="arabicPeriod" startAt="6"/>
+            </a:pPr>
+            <a:r>
+              <a:rPr lang="en-US" dirty="0"/>
+              <a:t>Optimize software only after it works correctly.</a:t>
+            </a:r>
+          </a:p>
+          <a:p>
+            <a:pPr marL="688975" lvl="1" indent="-342900">
+              <a:spcBef>
+                <a:spcPts val="200"/>
+              </a:spcBef>
+              <a:buFont typeface="+mj-lt"/>
+              <a:buAutoNum type="alphaLcPeriod"/>
+            </a:pPr>
+            <a:r>
+              <a:rPr lang="en-US" dirty="0"/>
+              <a:t>Use a profiler to identify bottlenecks.</a:t>
+            </a:r>
+          </a:p>
+          <a:p>
+            <a:pPr marL="688975" lvl="1" indent="-342900">
+              <a:spcBef>
+                <a:spcPts val="200"/>
+              </a:spcBef>
+              <a:buFont typeface="+mj-lt"/>
+              <a:buAutoNum type="alphaLcPeriod"/>
+            </a:pPr>
+            <a:r>
+              <a:rPr lang="en-US" dirty="0"/>
+              <a:t>Write code in the highest-level language possible.</a:t>
+            </a:r>
+          </a:p>
+          <a:p>
+            <a:pPr marL="457200" indent="-457200">
+              <a:buFont typeface="+mj-lt"/>
+              <a:buAutoNum type="arabicPeriod" startAt="7"/>
+            </a:pPr>
+            <a:r>
+              <a:rPr lang="en-US" dirty="0"/>
+              <a:t>Document design and purpose, not mechanics.</a:t>
+            </a:r>
+          </a:p>
+          <a:p>
+            <a:pPr marL="688975" lvl="1" indent="-342900">
+              <a:spcBef>
+                <a:spcPts val="200"/>
+              </a:spcBef>
+              <a:buFont typeface="+mj-lt"/>
+              <a:buAutoNum type="alphaLcPeriod"/>
+            </a:pPr>
+            <a:r>
+              <a:rPr lang="en-US" dirty="0"/>
+              <a:t>Document interfaces and reasons, not implementations.</a:t>
+            </a:r>
+          </a:p>
+          <a:p>
+            <a:pPr marL="688975" lvl="1" indent="-342900">
+              <a:spcBef>
+                <a:spcPts val="200"/>
+              </a:spcBef>
+              <a:buFont typeface="+mj-lt"/>
+              <a:buAutoNum type="alphaLcPeriod"/>
+            </a:pPr>
+            <a:r>
+              <a:rPr lang="en-US" dirty="0"/>
+              <a:t>Refactor code in preference to explaining how it works.</a:t>
+            </a:r>
+          </a:p>
+          <a:p>
+            <a:pPr marL="688975" lvl="1" indent="-342900">
+              <a:spcBef>
+                <a:spcPts val="200"/>
+              </a:spcBef>
+              <a:buFont typeface="+mj-lt"/>
+              <a:buAutoNum type="alphaLcPeriod"/>
+            </a:pPr>
+            <a:r>
+              <a:rPr lang="en-US" dirty="0"/>
+              <a:t>Embed the documentation for a piece of software in that software.</a:t>
+            </a:r>
+          </a:p>
+          <a:p>
+            <a:pPr marL="457200" indent="-457200">
+              <a:buFont typeface="+mj-lt"/>
+              <a:buAutoNum type="arabicPeriod" startAt="7"/>
+            </a:pPr>
+            <a:endParaRPr lang="en-US" dirty="0"/>
+          </a:p>
+        </p:txBody>
+      </p:sp>
+      <p:sp>
+        <p:nvSpPr>
+          <p:cNvPr id="5" name="Content Placeholder 4">
+            <a:extLst>
+              <a:ext uri="{FF2B5EF4-FFF2-40B4-BE49-F238E27FC236}">
+                <a16:creationId xmlns:a16="http://schemas.microsoft.com/office/drawing/2014/main" id="{DDF9E6A5-AEFC-4F97-BA79-ECFE164DD474}"/>
+              </a:ext>
+            </a:extLst>
+          </p:cNvPr>
+          <p:cNvSpPr>
+            <a:spLocks noGrp="1"/>
+          </p:cNvSpPr>
+          <p:nvPr>
+            <p:ph sz="quarter" idx="4"/>
+          </p:nvPr>
+        </p:nvSpPr>
+        <p:spPr>
+          <a:xfrm>
+            <a:off x="6218914" y="1417632"/>
+            <a:ext cx="5531934" cy="3373229"/>
+          </a:xfrm>
+          <a:ln>
+            <a:noFill/>
+          </a:ln>
+        </p:spPr>
+        <p:txBody>
+          <a:bodyPr/>
+          <a:lstStyle/>
+          <a:p>
+            <a:pPr marL="457200" indent="-457200">
+              <a:buFont typeface="+mj-lt"/>
+              <a:buAutoNum type="arabicPeriod" startAt="8"/>
+            </a:pPr>
+            <a:r>
+              <a:rPr lang="en-US" dirty="0"/>
+              <a:t>Collaborate.</a:t>
+            </a:r>
+          </a:p>
+          <a:p>
+            <a:pPr marL="688975" lvl="1" indent="-342900">
+              <a:spcBef>
+                <a:spcPts val="200"/>
+              </a:spcBef>
+              <a:buFont typeface="+mj-lt"/>
+              <a:buAutoNum type="alphaLcPeriod"/>
+            </a:pPr>
+            <a:r>
+              <a:rPr lang="en-US" dirty="0"/>
+              <a:t>Use pre-merge code reviews.</a:t>
+            </a:r>
+          </a:p>
+          <a:p>
+            <a:pPr marL="688975" lvl="1" indent="-342900">
+              <a:spcBef>
+                <a:spcPts val="200"/>
+              </a:spcBef>
+              <a:buFont typeface="+mj-lt"/>
+              <a:buAutoNum type="alphaLcPeriod"/>
+            </a:pPr>
+            <a:r>
+              <a:rPr lang="en-US" dirty="0"/>
+              <a:t>Use pair programming when bringing someone new up to speed and when tackling particularly tricky problems.</a:t>
+            </a:r>
+          </a:p>
+          <a:p>
+            <a:pPr marL="688975" lvl="1" indent="-342900">
+              <a:spcBef>
+                <a:spcPts val="200"/>
+              </a:spcBef>
+              <a:buFont typeface="+mj-lt"/>
+              <a:buAutoNum type="alphaLcPeriod"/>
+            </a:pPr>
+            <a:r>
+              <a:rPr lang="en-US" dirty="0"/>
+              <a:t>Use an issue tracking tool.</a:t>
+            </a:r>
+          </a:p>
+        </p:txBody>
+      </p:sp>
+      <p:sp>
+        <p:nvSpPr>
+          <p:cNvPr id="9" name="TextBox 8">
+            <a:extLst>
+              <a:ext uri="{FF2B5EF4-FFF2-40B4-BE49-F238E27FC236}">
+                <a16:creationId xmlns:a16="http://schemas.microsoft.com/office/drawing/2014/main" id="{DB552483-BD94-4E77-AFD5-3E268DAB4A98}"/>
+              </a:ext>
+            </a:extLst>
+          </p:cNvPr>
+          <p:cNvSpPr txBox="1"/>
+          <p:nvPr/>
+        </p:nvSpPr>
+        <p:spPr>
+          <a:xfrm>
+            <a:off x="2686427" y="868680"/>
+            <a:ext cx="6815970" cy="369332"/>
+          </a:xfrm>
+          <a:prstGeom prst="rect">
+            <a:avLst/>
+          </a:prstGeom>
+          <a:noFill/>
+        </p:spPr>
+        <p:txBody>
+          <a:bodyPr wrap="square">
+            <a:spAutoFit/>
+          </a:bodyPr>
+          <a:lstStyle/>
+          <a:p>
+            <a:r>
+              <a:rPr lang="en-US" dirty="0"/>
+              <a:t>Wilson, et al., (2014) </a:t>
+            </a:r>
+            <a:r>
+              <a:rPr lang="en-US" dirty="0">
+                <a:hlinkClick r:id="rId2"/>
+              </a:rPr>
+              <a:t>https://doi.org/10.1371/journal.pbio.1001745</a:t>
+            </a:r>
+            <a:endParaRPr lang="en-US" dirty="0"/>
+          </a:p>
+        </p:txBody>
+      </p:sp>
+    </p:spTree>
+    <p:extLst>
+      <p:ext uri="{BB962C8B-B14F-4D97-AF65-F5344CB8AC3E}">
+        <p14:creationId xmlns:p14="http://schemas.microsoft.com/office/powerpoint/2010/main" val="3409460680"/>
+      </p:ext>
+    </p:extLst>
+  </p:cSld>
+  <p:clrMapOvr>
+    <a:masterClrMapping/>
+  </p:clrMapOvr>
+</p:sld>
+</file>
+
+<file path=ppt/slides/slide14.xml><?xml version="1.0" encoding="utf-8"?>
+<p:sld xmlns:a="http://schemas.openxmlformats.org/drawingml/2006/main" xmlns:r="http://schemas.openxmlformats.org/officeDocument/2006/relationships" xmlns:p="http://schemas.openxmlformats.org/presentationml/2006/main">
+  <p:cSld>
+    <p:spTree>
+      <p:nvGrpSpPr>
+        <p:cNvPr id="1" name=""/>
+        <p:cNvGrpSpPr/>
+        <p:nvPr/>
+      </p:nvGrpSpPr>
+      <p:grpSpPr>
+        <a:xfrm>
+          <a:off x="0" y="0"/>
+          <a:ext cx="0" cy="0"/>
+          <a:chOff x="0" y="0"/>
+          <a:chExt cx="0" cy="0"/>
+        </a:xfrm>
+      </p:grpSpPr>
+      <p:sp>
+        <p:nvSpPr>
+          <p:cNvPr id="2" name="Title 1">
+            <a:extLst>
+              <a:ext uri="{FF2B5EF4-FFF2-40B4-BE49-F238E27FC236}">
+                <a16:creationId xmlns:a16="http://schemas.microsoft.com/office/drawing/2014/main" id="{7451A221-00BB-4705-81CF-5ED483AAFA37}"/>
+              </a:ext>
+            </a:extLst>
+          </p:cNvPr>
+          <p:cNvSpPr>
+            <a:spLocks noGrp="1"/>
+          </p:cNvSpPr>
+          <p:nvPr>
+            <p:ph type="title"/>
+          </p:nvPr>
+        </p:nvSpPr>
+        <p:spPr>
+          <a:xfrm>
+            <a:off x="365760" y="411480"/>
+            <a:ext cx="11375136" cy="914400"/>
+          </a:xfrm>
+        </p:spPr>
+        <p:txBody>
+          <a:bodyPr/>
+          <a:lstStyle/>
+          <a:p>
+            <a:r>
+              <a:rPr lang="en-US" dirty="0"/>
+              <a:t>Example 2: Good Enough Practices in Scientific Computing (1/2)</a:t>
+            </a:r>
+          </a:p>
+        </p:txBody>
+      </p:sp>
+      <p:sp>
+        <p:nvSpPr>
+          <p:cNvPr id="3" name="Content Placeholder 2">
+            <a:extLst>
+              <a:ext uri="{FF2B5EF4-FFF2-40B4-BE49-F238E27FC236}">
+                <a16:creationId xmlns:a16="http://schemas.microsoft.com/office/drawing/2014/main" id="{43B46A8C-7C71-4181-9781-536B0C68D5D4}"/>
+              </a:ext>
+            </a:extLst>
+          </p:cNvPr>
+          <p:cNvSpPr>
+            <a:spLocks noGrp="1"/>
+          </p:cNvSpPr>
+          <p:nvPr>
+            <p:ph sz="half" idx="2"/>
+          </p:nvPr>
+        </p:nvSpPr>
+        <p:spPr>
+          <a:xfrm>
+            <a:off x="457200" y="1417632"/>
+            <a:ext cx="5588000" cy="3373438"/>
+          </a:xfrm>
+          <a:ln>
+            <a:noFill/>
+          </a:ln>
+        </p:spPr>
+        <p:txBody>
+          <a:bodyPr/>
+          <a:lstStyle/>
+          <a:p>
+            <a:pPr algn="l">
+              <a:buFont typeface="+mj-lt"/>
+              <a:buAutoNum type="arabicPeriod"/>
+            </a:pPr>
+            <a:r>
+              <a:rPr lang="en-US" b="0" i="0" dirty="0">
+                <a:solidFill>
+                  <a:srgbClr val="202020"/>
+                </a:solidFill>
+                <a:effectLst/>
+              </a:rPr>
+              <a:t>Data management</a:t>
+            </a:r>
+          </a:p>
+          <a:p>
+            <a:pPr marL="800100" lvl="1" indent="-342900" algn="l">
+              <a:spcBef>
+                <a:spcPts val="200"/>
+              </a:spcBef>
+              <a:buFont typeface="+mj-lt"/>
+              <a:buAutoNum type="alphaLcPeriod"/>
+            </a:pPr>
+            <a:r>
+              <a:rPr lang="en-US" b="0" i="0" dirty="0">
+                <a:solidFill>
+                  <a:srgbClr val="202020"/>
+                </a:solidFill>
+                <a:effectLst/>
+              </a:rPr>
+              <a:t>Save the raw data.</a:t>
+            </a:r>
+          </a:p>
+          <a:p>
+            <a:pPr marL="800100" lvl="1" indent="-342900" algn="l">
+              <a:spcBef>
+                <a:spcPts val="200"/>
+              </a:spcBef>
+              <a:buFont typeface="+mj-lt"/>
+              <a:buAutoNum type="alphaLcPeriod"/>
+            </a:pPr>
+            <a:r>
+              <a:rPr lang="en-US" b="0" i="0" dirty="0">
+                <a:solidFill>
+                  <a:srgbClr val="202020"/>
+                </a:solidFill>
+                <a:effectLst/>
+              </a:rPr>
+              <a:t>Ensure that raw data are backed up in more than one location.</a:t>
+            </a:r>
+          </a:p>
+          <a:p>
+            <a:pPr marL="800100" lvl="1" indent="-342900" algn="l">
+              <a:spcBef>
+                <a:spcPts val="200"/>
+              </a:spcBef>
+              <a:buFont typeface="+mj-lt"/>
+              <a:buAutoNum type="alphaLcPeriod"/>
+            </a:pPr>
+            <a:r>
+              <a:rPr lang="en-US" b="0" i="0" dirty="0">
+                <a:solidFill>
+                  <a:srgbClr val="202020"/>
+                </a:solidFill>
+                <a:effectLst/>
+              </a:rPr>
+              <a:t>Create the data you wish to see in the world.</a:t>
+            </a:r>
+          </a:p>
+          <a:p>
+            <a:pPr marL="800100" lvl="1" indent="-342900" algn="l">
+              <a:spcBef>
+                <a:spcPts val="200"/>
+              </a:spcBef>
+              <a:buFont typeface="+mj-lt"/>
+              <a:buAutoNum type="alphaLcPeriod"/>
+            </a:pPr>
+            <a:r>
+              <a:rPr lang="en-US" b="0" i="0" dirty="0">
+                <a:solidFill>
+                  <a:srgbClr val="202020"/>
+                </a:solidFill>
+                <a:effectLst/>
+              </a:rPr>
+              <a:t>Create analysis-friendly data.</a:t>
+            </a:r>
+          </a:p>
+          <a:p>
+            <a:pPr marL="800100" lvl="1" indent="-342900" algn="l">
+              <a:spcBef>
+                <a:spcPts val="200"/>
+              </a:spcBef>
+              <a:buFont typeface="+mj-lt"/>
+              <a:buAutoNum type="alphaLcPeriod"/>
+            </a:pPr>
+            <a:r>
+              <a:rPr lang="en-US" b="0" i="0" dirty="0">
+                <a:solidFill>
+                  <a:srgbClr val="202020"/>
+                </a:solidFill>
+                <a:effectLst/>
+              </a:rPr>
+              <a:t>Record all the steps used to process data.</a:t>
+            </a:r>
+          </a:p>
+          <a:p>
+            <a:pPr marL="800100" lvl="1" indent="-342900" algn="l">
+              <a:spcBef>
+                <a:spcPts val="200"/>
+              </a:spcBef>
+              <a:buFont typeface="+mj-lt"/>
+              <a:buAutoNum type="alphaLcPeriod"/>
+            </a:pPr>
+            <a:r>
+              <a:rPr lang="en-US" b="0" i="0" dirty="0">
+                <a:solidFill>
+                  <a:srgbClr val="202020"/>
+                </a:solidFill>
+                <a:effectLst/>
+              </a:rPr>
+              <a:t>Anticipate the need to use multiple tables, and use a unique identifier for every record.</a:t>
+            </a:r>
+          </a:p>
+          <a:p>
+            <a:pPr marL="800100" lvl="1" indent="-342900" algn="l">
+              <a:spcBef>
+                <a:spcPts val="200"/>
+              </a:spcBef>
+              <a:buFont typeface="+mj-lt"/>
+              <a:buAutoNum type="alphaLcPeriod"/>
+            </a:pPr>
+            <a:r>
+              <a:rPr lang="en-US" b="0" i="0" dirty="0">
+                <a:solidFill>
+                  <a:srgbClr val="202020"/>
+                </a:solidFill>
+                <a:effectLst/>
+              </a:rPr>
+              <a:t>Submit data to a reputable DOI-issuing repository so that others can access and cite it.</a:t>
+            </a:r>
+          </a:p>
+          <a:p>
+            <a:pPr marL="457200" indent="-457200" algn="l">
+              <a:buFont typeface="+mj-lt"/>
+              <a:buAutoNum type="arabicPeriod" startAt="6"/>
+            </a:pPr>
+            <a:r>
+              <a:rPr lang="en-US" b="0" i="0" dirty="0">
+                <a:solidFill>
+                  <a:srgbClr val="202020"/>
+                </a:solidFill>
+                <a:effectLst/>
+              </a:rPr>
+              <a:t>Manuscripts </a:t>
+            </a:r>
+            <a:r>
+              <a:rPr lang="en-US" b="0" i="0" dirty="0">
+                <a:solidFill>
+                  <a:schemeClr val="bg1">
+                    <a:lumMod val="50000"/>
+                  </a:schemeClr>
+                </a:solidFill>
+                <a:effectLst/>
+              </a:rPr>
+              <a:t>(out of order to save space)</a:t>
+            </a:r>
+          </a:p>
+          <a:p>
+            <a:pPr marL="800100" lvl="1" indent="-342900" algn="l">
+              <a:spcBef>
+                <a:spcPts val="200"/>
+              </a:spcBef>
+              <a:buFont typeface="+mj-lt"/>
+              <a:buAutoNum type="alphaLcPeriod"/>
+            </a:pPr>
+            <a:r>
+              <a:rPr lang="en-US" b="0" i="0" dirty="0">
+                <a:solidFill>
+                  <a:srgbClr val="202020"/>
+                </a:solidFill>
+                <a:effectLst/>
+              </a:rPr>
+              <a:t>Write manuscripts using online tools with rich formatting, change tracking, and reference management.</a:t>
+            </a:r>
+          </a:p>
+          <a:p>
+            <a:pPr marL="800100" lvl="1" indent="-342900" algn="l">
+              <a:spcBef>
+                <a:spcPts val="200"/>
+              </a:spcBef>
+              <a:buFont typeface="+mj-lt"/>
+              <a:buAutoNum type="alphaLcPeriod"/>
+            </a:pPr>
+            <a:r>
+              <a:rPr lang="en-US" b="0" i="0" dirty="0">
+                <a:solidFill>
+                  <a:srgbClr val="202020"/>
+                </a:solidFill>
+                <a:effectLst/>
+              </a:rPr>
+              <a:t>Write the manuscript in a plain text format that permits version control.</a:t>
+            </a:r>
+          </a:p>
+        </p:txBody>
+      </p:sp>
+      <p:sp>
+        <p:nvSpPr>
+          <p:cNvPr id="8" name="TextBox 7">
+            <a:extLst>
+              <a:ext uri="{FF2B5EF4-FFF2-40B4-BE49-F238E27FC236}">
+                <a16:creationId xmlns:a16="http://schemas.microsoft.com/office/drawing/2014/main" id="{D09C30BE-8DD1-42E6-ADDB-76D78C54E8B5}"/>
+              </a:ext>
+            </a:extLst>
+          </p:cNvPr>
+          <p:cNvSpPr txBox="1"/>
+          <p:nvPr/>
+        </p:nvSpPr>
+        <p:spPr>
+          <a:xfrm>
+            <a:off x="2689580" y="868680"/>
+            <a:ext cx="6809664" cy="369332"/>
+          </a:xfrm>
+          <a:prstGeom prst="rect">
+            <a:avLst/>
+          </a:prstGeom>
+          <a:noFill/>
+        </p:spPr>
+        <p:txBody>
+          <a:bodyPr wrap="square">
+            <a:spAutoFit/>
+          </a:bodyPr>
+          <a:lstStyle/>
+          <a:p>
+            <a:r>
+              <a:rPr lang="en-US" dirty="0"/>
+              <a:t>Wilson, et al., (2017) </a:t>
+            </a:r>
+            <a:r>
+              <a:rPr lang="en-US" dirty="0">
+                <a:hlinkClick r:id="rId2"/>
+              </a:rPr>
+              <a:t>https://doi.org/10.1371/journal.pcbi.1005510</a:t>
+            </a:r>
+            <a:endParaRPr lang="en-US" dirty="0"/>
+          </a:p>
+        </p:txBody>
+      </p:sp>
+      <p:sp>
+        <p:nvSpPr>
+          <p:cNvPr id="5" name="Content Placeholder 4">
+            <a:extLst>
+              <a:ext uri="{FF2B5EF4-FFF2-40B4-BE49-F238E27FC236}">
+                <a16:creationId xmlns:a16="http://schemas.microsoft.com/office/drawing/2014/main" id="{DDF9E6A5-AEFC-4F97-BA79-ECFE164DD474}"/>
+              </a:ext>
+            </a:extLst>
+          </p:cNvPr>
+          <p:cNvSpPr>
+            <a:spLocks noGrp="1"/>
+          </p:cNvSpPr>
+          <p:nvPr>
+            <p:ph sz="quarter" idx="4"/>
+          </p:nvPr>
+        </p:nvSpPr>
+        <p:spPr>
+          <a:xfrm>
+            <a:off x="6218914" y="1417632"/>
+            <a:ext cx="5531934" cy="3373229"/>
+          </a:xfrm>
+          <a:ln>
+            <a:noFill/>
+          </a:ln>
+        </p:spPr>
+        <p:txBody>
+          <a:bodyPr/>
+          <a:lstStyle/>
+          <a:p>
+            <a:pPr marL="457200" indent="-457200" algn="l">
+              <a:buFont typeface="+mj-lt"/>
+              <a:buAutoNum type="arabicPeriod" startAt="2"/>
+            </a:pPr>
+            <a:r>
+              <a:rPr lang="en-US" b="0" i="0" dirty="0">
+                <a:solidFill>
+                  <a:srgbClr val="202020"/>
+                </a:solidFill>
+                <a:effectLst/>
+              </a:rPr>
+              <a:t>Software</a:t>
+            </a:r>
+          </a:p>
+          <a:p>
+            <a:pPr marL="800100" lvl="1" indent="-342900" algn="l">
+              <a:spcBef>
+                <a:spcPts val="200"/>
+              </a:spcBef>
+              <a:buFont typeface="+mj-lt"/>
+              <a:buAutoNum type="alphaLcPeriod"/>
+            </a:pPr>
+            <a:r>
+              <a:rPr lang="en-US" b="0" i="0" dirty="0">
+                <a:solidFill>
+                  <a:srgbClr val="202020"/>
+                </a:solidFill>
+                <a:effectLst/>
+              </a:rPr>
+              <a:t>Place a brief explanatory comment at the start of every program.</a:t>
+            </a:r>
+          </a:p>
+          <a:p>
+            <a:pPr marL="800100" lvl="1" indent="-342900" algn="l">
+              <a:spcBef>
+                <a:spcPts val="200"/>
+              </a:spcBef>
+              <a:buFont typeface="+mj-lt"/>
+              <a:buAutoNum type="alphaLcPeriod"/>
+            </a:pPr>
+            <a:r>
+              <a:rPr lang="en-US" b="0" i="0" dirty="0">
+                <a:solidFill>
+                  <a:srgbClr val="202020"/>
+                </a:solidFill>
+                <a:effectLst/>
+              </a:rPr>
+              <a:t>Decompose programs into functions.</a:t>
+            </a:r>
+          </a:p>
+          <a:p>
+            <a:pPr marL="800100" lvl="1" indent="-342900" algn="l">
+              <a:spcBef>
+                <a:spcPts val="200"/>
+              </a:spcBef>
+              <a:buFont typeface="+mj-lt"/>
+              <a:buAutoNum type="alphaLcPeriod"/>
+            </a:pPr>
+            <a:r>
+              <a:rPr lang="en-US" b="0" i="0" dirty="0">
+                <a:solidFill>
+                  <a:srgbClr val="202020"/>
+                </a:solidFill>
+                <a:effectLst/>
+              </a:rPr>
+              <a:t>Be ruthless about eliminating duplication.</a:t>
+            </a:r>
+          </a:p>
+          <a:p>
+            <a:pPr marL="800100" lvl="1" indent="-342900" algn="l">
+              <a:spcBef>
+                <a:spcPts val="200"/>
+              </a:spcBef>
+              <a:buFont typeface="+mj-lt"/>
+              <a:buAutoNum type="alphaLcPeriod"/>
+            </a:pPr>
+            <a:r>
+              <a:rPr lang="en-US" b="0" i="0" dirty="0">
+                <a:solidFill>
+                  <a:srgbClr val="202020"/>
+                </a:solidFill>
+                <a:effectLst/>
+              </a:rPr>
+              <a:t>Always search for well-maintained software libraries that do what you need.</a:t>
+            </a:r>
+          </a:p>
+          <a:p>
+            <a:pPr marL="800100" lvl="1" indent="-342900" algn="l">
+              <a:spcBef>
+                <a:spcPts val="200"/>
+              </a:spcBef>
+              <a:buFont typeface="+mj-lt"/>
+              <a:buAutoNum type="alphaLcPeriod"/>
+            </a:pPr>
+            <a:r>
+              <a:rPr lang="en-US" b="0" i="0" dirty="0">
+                <a:solidFill>
+                  <a:srgbClr val="202020"/>
+                </a:solidFill>
+                <a:effectLst/>
+              </a:rPr>
+              <a:t>Test libraries before relying on them.</a:t>
+            </a:r>
+          </a:p>
+          <a:p>
+            <a:pPr marL="800100" lvl="1" indent="-342900" algn="l">
+              <a:spcBef>
+                <a:spcPts val="200"/>
+              </a:spcBef>
+              <a:buFont typeface="+mj-lt"/>
+              <a:buAutoNum type="alphaLcPeriod"/>
+            </a:pPr>
+            <a:r>
+              <a:rPr lang="en-US" b="0" i="0" dirty="0">
+                <a:solidFill>
+                  <a:srgbClr val="202020"/>
+                </a:solidFill>
+                <a:effectLst/>
+              </a:rPr>
+              <a:t>Give functions and variables meaningful names.</a:t>
+            </a:r>
+          </a:p>
+          <a:p>
+            <a:pPr marL="800100" lvl="1" indent="-342900" algn="l">
+              <a:spcBef>
+                <a:spcPts val="200"/>
+              </a:spcBef>
+              <a:buFont typeface="+mj-lt"/>
+              <a:buAutoNum type="alphaLcPeriod"/>
+            </a:pPr>
+            <a:r>
+              <a:rPr lang="en-US" b="0" i="0" dirty="0">
+                <a:solidFill>
+                  <a:srgbClr val="202020"/>
+                </a:solidFill>
+                <a:effectLst/>
+              </a:rPr>
+              <a:t>Make dependencies and requirements explicit.</a:t>
+            </a:r>
+          </a:p>
+          <a:p>
+            <a:pPr marL="800100" lvl="1" indent="-342900" algn="l">
+              <a:spcBef>
+                <a:spcPts val="200"/>
+              </a:spcBef>
+              <a:buFont typeface="+mj-lt"/>
+              <a:buAutoNum type="alphaLcPeriod"/>
+            </a:pPr>
+            <a:r>
+              <a:rPr lang="en-US" b="0" i="0" dirty="0">
+                <a:solidFill>
+                  <a:srgbClr val="202020"/>
+                </a:solidFill>
+                <a:effectLst/>
+              </a:rPr>
+              <a:t>Do not comment and uncomment sections of code to control a program's behavior.</a:t>
+            </a:r>
+          </a:p>
+          <a:p>
+            <a:pPr marL="800100" lvl="1" indent="-342900" algn="l">
+              <a:spcBef>
+                <a:spcPts val="200"/>
+              </a:spcBef>
+              <a:buFont typeface="+mj-lt"/>
+              <a:buAutoNum type="alphaLcPeriod"/>
+            </a:pPr>
+            <a:r>
+              <a:rPr lang="en-US" b="0" i="0" dirty="0">
+                <a:solidFill>
+                  <a:srgbClr val="202020"/>
+                </a:solidFill>
+                <a:effectLst/>
+              </a:rPr>
+              <a:t>Provide a simple example or test data set.</a:t>
+            </a:r>
+          </a:p>
+          <a:p>
+            <a:pPr marL="800100" lvl="1" indent="-342900" algn="l">
+              <a:spcBef>
+                <a:spcPts val="200"/>
+              </a:spcBef>
+              <a:buFont typeface="+mj-lt"/>
+              <a:buAutoNum type="alphaLcPeriod"/>
+            </a:pPr>
+            <a:r>
+              <a:rPr lang="en-US" b="0" i="0" dirty="0">
+                <a:solidFill>
+                  <a:srgbClr val="202020"/>
+                </a:solidFill>
+                <a:effectLst/>
+              </a:rPr>
+              <a:t>Submit code to a reputable DOI-issuing repository.</a:t>
+            </a:r>
+          </a:p>
+        </p:txBody>
+      </p:sp>
+    </p:spTree>
+    <p:extLst>
+      <p:ext uri="{BB962C8B-B14F-4D97-AF65-F5344CB8AC3E}">
+        <p14:creationId xmlns:p14="http://schemas.microsoft.com/office/powerpoint/2010/main" val="4103912482"/>
+      </p:ext>
+    </p:extLst>
+  </p:cSld>
+  <p:clrMapOvr>
+    <a:masterClrMapping/>
+  </p:clrMapOvr>
+</p:sld>
+</file>
+
+<file path=ppt/slides/slide15.xml><?xml version="1.0" encoding="utf-8"?>
+<p:sld xmlns:a="http://schemas.openxmlformats.org/drawingml/2006/main" xmlns:r="http://schemas.openxmlformats.org/officeDocument/2006/relationships" xmlns:p="http://schemas.openxmlformats.org/presentationml/2006/main">
+  <p:cSld>
+    <p:spTree>
+      <p:nvGrpSpPr>
+        <p:cNvPr id="1" name=""/>
+        <p:cNvGrpSpPr/>
+        <p:nvPr/>
+      </p:nvGrpSpPr>
+      <p:grpSpPr>
+        <a:xfrm>
+          <a:off x="0" y="0"/>
+          <a:ext cx="0" cy="0"/>
+          <a:chOff x="0" y="0"/>
+          <a:chExt cx="0" cy="0"/>
+        </a:xfrm>
+      </p:grpSpPr>
+      <p:sp>
+        <p:nvSpPr>
+          <p:cNvPr id="2" name="Title 1">
+            <a:extLst>
+              <a:ext uri="{FF2B5EF4-FFF2-40B4-BE49-F238E27FC236}">
+                <a16:creationId xmlns:a16="http://schemas.microsoft.com/office/drawing/2014/main" id="{7451A221-00BB-4705-81CF-5ED483AAFA37}"/>
+              </a:ext>
+            </a:extLst>
+          </p:cNvPr>
+          <p:cNvSpPr>
+            <a:spLocks noGrp="1"/>
+          </p:cNvSpPr>
+          <p:nvPr>
+            <p:ph type="title"/>
+          </p:nvPr>
+        </p:nvSpPr>
+        <p:spPr>
+          <a:xfrm>
+            <a:off x="365760" y="411480"/>
+            <a:ext cx="11375136" cy="914400"/>
+          </a:xfrm>
+        </p:spPr>
+        <p:txBody>
+          <a:bodyPr/>
+          <a:lstStyle/>
+          <a:p>
+            <a:r>
+              <a:rPr lang="en-US" dirty="0"/>
+              <a:t>Example 2: Good Enough Practices in Scientific Computing (2/2)</a:t>
+            </a:r>
+          </a:p>
+        </p:txBody>
+      </p:sp>
+      <p:sp>
+        <p:nvSpPr>
+          <p:cNvPr id="3" name="Content Placeholder 2">
+            <a:extLst>
+              <a:ext uri="{FF2B5EF4-FFF2-40B4-BE49-F238E27FC236}">
+                <a16:creationId xmlns:a16="http://schemas.microsoft.com/office/drawing/2014/main" id="{43B46A8C-7C71-4181-9781-536B0C68D5D4}"/>
+              </a:ext>
+            </a:extLst>
+          </p:cNvPr>
+          <p:cNvSpPr>
+            <a:spLocks noGrp="1"/>
+          </p:cNvSpPr>
+          <p:nvPr>
+            <p:ph sz="half" idx="2"/>
+          </p:nvPr>
+        </p:nvSpPr>
+        <p:spPr>
+          <a:xfrm>
+            <a:off x="457200" y="1417632"/>
+            <a:ext cx="5588000" cy="3373438"/>
+          </a:xfrm>
+          <a:ln>
+            <a:noFill/>
+          </a:ln>
+        </p:spPr>
+        <p:txBody>
+          <a:bodyPr/>
+          <a:lstStyle/>
+          <a:p>
+            <a:pPr marL="457200" indent="-457200" algn="l">
+              <a:buFont typeface="+mj-lt"/>
+              <a:buAutoNum type="arabicPeriod" startAt="3"/>
+            </a:pPr>
+            <a:r>
+              <a:rPr lang="en-US" b="0" i="0" dirty="0">
+                <a:solidFill>
+                  <a:srgbClr val="202020"/>
+                </a:solidFill>
+                <a:effectLst/>
+              </a:rPr>
+              <a:t>Collaboration</a:t>
+            </a:r>
+          </a:p>
+          <a:p>
+            <a:pPr marL="800100" lvl="1" indent="-342900" algn="l">
+              <a:spcBef>
+                <a:spcPts val="200"/>
+              </a:spcBef>
+              <a:buFont typeface="+mj-lt"/>
+              <a:buAutoNum type="alphaLcPeriod"/>
+            </a:pPr>
+            <a:r>
+              <a:rPr lang="en-US" b="0" i="0" dirty="0">
+                <a:solidFill>
+                  <a:srgbClr val="202020"/>
+                </a:solidFill>
+                <a:effectLst/>
+              </a:rPr>
+              <a:t>Create an overview of your project.</a:t>
+            </a:r>
+          </a:p>
+          <a:p>
+            <a:pPr marL="800100" lvl="1" indent="-342900" algn="l">
+              <a:spcBef>
+                <a:spcPts val="200"/>
+              </a:spcBef>
+              <a:buFont typeface="+mj-lt"/>
+              <a:buAutoNum type="alphaLcPeriod"/>
+            </a:pPr>
+            <a:r>
+              <a:rPr lang="en-US" b="0" i="0" dirty="0">
+                <a:solidFill>
+                  <a:srgbClr val="202020"/>
+                </a:solidFill>
+                <a:effectLst/>
+              </a:rPr>
+              <a:t>Create a shared "to-do" list for the project.</a:t>
+            </a:r>
+          </a:p>
+          <a:p>
+            <a:pPr marL="800100" lvl="1" indent="-342900" algn="l">
+              <a:spcBef>
+                <a:spcPts val="200"/>
+              </a:spcBef>
+              <a:buFont typeface="+mj-lt"/>
+              <a:buAutoNum type="alphaLcPeriod"/>
+            </a:pPr>
+            <a:r>
+              <a:rPr lang="en-US" b="0" i="0" dirty="0">
+                <a:solidFill>
+                  <a:srgbClr val="202020"/>
+                </a:solidFill>
+                <a:effectLst/>
+              </a:rPr>
+              <a:t>Decide on communication strategies.</a:t>
+            </a:r>
+          </a:p>
+          <a:p>
+            <a:pPr marL="800100" lvl="1" indent="-342900" algn="l">
+              <a:spcBef>
+                <a:spcPts val="200"/>
+              </a:spcBef>
+              <a:buFont typeface="+mj-lt"/>
+              <a:buAutoNum type="alphaLcPeriod"/>
+            </a:pPr>
+            <a:r>
+              <a:rPr lang="en-US" b="0" i="0" dirty="0">
+                <a:solidFill>
+                  <a:srgbClr val="202020"/>
+                </a:solidFill>
+                <a:effectLst/>
+              </a:rPr>
+              <a:t>Make the license explicit.</a:t>
+            </a:r>
+          </a:p>
+          <a:p>
+            <a:pPr marL="800100" lvl="1" indent="-342900" algn="l">
+              <a:spcBef>
+                <a:spcPts val="200"/>
+              </a:spcBef>
+              <a:buFont typeface="+mj-lt"/>
+              <a:buAutoNum type="alphaLcPeriod"/>
+            </a:pPr>
+            <a:r>
+              <a:rPr lang="en-US" b="0" i="0" dirty="0">
+                <a:solidFill>
+                  <a:srgbClr val="202020"/>
+                </a:solidFill>
+                <a:effectLst/>
+              </a:rPr>
+              <a:t>Make the project citable.</a:t>
+            </a:r>
+          </a:p>
+          <a:p>
+            <a:pPr algn="l">
+              <a:buFont typeface="+mj-lt"/>
+              <a:buAutoNum type="arabicPeriod" startAt="3"/>
+            </a:pPr>
+            <a:r>
+              <a:rPr lang="en-US" b="0" i="0" dirty="0">
+                <a:solidFill>
+                  <a:srgbClr val="202020"/>
+                </a:solidFill>
+                <a:effectLst/>
+              </a:rPr>
+              <a:t>Project organization</a:t>
+            </a:r>
+          </a:p>
+          <a:p>
+            <a:pPr marL="800100" lvl="1" indent="-342900" algn="l">
+              <a:spcBef>
+                <a:spcPts val="200"/>
+              </a:spcBef>
+              <a:buFont typeface="+mj-lt"/>
+              <a:buAutoNum type="alphaLcPeriod"/>
+            </a:pPr>
+            <a:r>
+              <a:rPr lang="en-US" b="0" i="0" dirty="0">
+                <a:solidFill>
+                  <a:srgbClr val="202020"/>
+                </a:solidFill>
+                <a:effectLst/>
+              </a:rPr>
+              <a:t>Put each project in its own directory, which is named after the project.</a:t>
+            </a:r>
+          </a:p>
+          <a:p>
+            <a:pPr marL="800100" lvl="1" indent="-342900" algn="l">
+              <a:spcBef>
+                <a:spcPts val="200"/>
+              </a:spcBef>
+              <a:buFont typeface="+mj-lt"/>
+              <a:buAutoNum type="alphaLcPeriod"/>
+            </a:pPr>
+            <a:r>
+              <a:rPr lang="en-US" b="0" i="0" dirty="0">
+                <a:solidFill>
+                  <a:srgbClr val="202020"/>
+                </a:solidFill>
+                <a:effectLst/>
+              </a:rPr>
+              <a:t>Put text documents associated with the project in the doc directory.</a:t>
+            </a:r>
+          </a:p>
+          <a:p>
+            <a:pPr marL="800100" lvl="1" indent="-342900" algn="l">
+              <a:spcBef>
+                <a:spcPts val="200"/>
+              </a:spcBef>
+              <a:buFont typeface="+mj-lt"/>
+              <a:buAutoNum type="alphaLcPeriod"/>
+            </a:pPr>
+            <a:r>
+              <a:rPr lang="en-US" b="0" i="0" dirty="0">
+                <a:solidFill>
+                  <a:srgbClr val="202020"/>
+                </a:solidFill>
+                <a:effectLst/>
+              </a:rPr>
+              <a:t>Put raw data and metadata in a data directory and files generated during cleanup and analysis in a results directory.</a:t>
+            </a:r>
+          </a:p>
+          <a:p>
+            <a:pPr marL="800100" lvl="1" indent="-342900" algn="l">
+              <a:spcBef>
+                <a:spcPts val="200"/>
+              </a:spcBef>
+              <a:buFont typeface="+mj-lt"/>
+              <a:buAutoNum type="alphaLcPeriod"/>
+            </a:pPr>
+            <a:r>
+              <a:rPr lang="en-US" b="0" i="0" dirty="0">
+                <a:solidFill>
+                  <a:srgbClr val="202020"/>
+                </a:solidFill>
+                <a:effectLst/>
+              </a:rPr>
+              <a:t>Put project source code in the </a:t>
+            </a:r>
+            <a:r>
+              <a:rPr lang="en-US" b="0" i="0" dirty="0" err="1">
+                <a:solidFill>
+                  <a:srgbClr val="202020"/>
+                </a:solidFill>
+                <a:effectLst/>
+              </a:rPr>
+              <a:t>src</a:t>
+            </a:r>
+            <a:r>
+              <a:rPr lang="en-US" b="0" i="0" dirty="0">
+                <a:solidFill>
+                  <a:srgbClr val="202020"/>
+                </a:solidFill>
+                <a:effectLst/>
+              </a:rPr>
+              <a:t> directory.</a:t>
+            </a:r>
+          </a:p>
+          <a:p>
+            <a:pPr marL="800100" lvl="1" indent="-342900" algn="l">
+              <a:spcBef>
+                <a:spcPts val="200"/>
+              </a:spcBef>
+              <a:buFont typeface="+mj-lt"/>
+              <a:buAutoNum type="alphaLcPeriod"/>
+            </a:pPr>
+            <a:r>
+              <a:rPr lang="en-US" b="0" i="0" dirty="0">
+                <a:solidFill>
+                  <a:srgbClr val="202020"/>
+                </a:solidFill>
+                <a:effectLst/>
+              </a:rPr>
+              <a:t>Put external scripts or compiled programs in the bin directory.</a:t>
+            </a:r>
+          </a:p>
+          <a:p>
+            <a:pPr marL="800100" lvl="1" indent="-342900" algn="l">
+              <a:spcBef>
+                <a:spcPts val="200"/>
+              </a:spcBef>
+              <a:buFont typeface="+mj-lt"/>
+              <a:buAutoNum type="alphaLcPeriod"/>
+            </a:pPr>
+            <a:r>
+              <a:rPr lang="en-US" b="0" i="0" dirty="0">
+                <a:solidFill>
+                  <a:srgbClr val="202020"/>
+                </a:solidFill>
+                <a:effectLst/>
+              </a:rPr>
+              <a:t>Name all files to reflect their content or function.</a:t>
+            </a:r>
+          </a:p>
+        </p:txBody>
+      </p:sp>
+      <p:sp>
+        <p:nvSpPr>
+          <p:cNvPr id="8" name="TextBox 7">
+            <a:extLst>
+              <a:ext uri="{FF2B5EF4-FFF2-40B4-BE49-F238E27FC236}">
+                <a16:creationId xmlns:a16="http://schemas.microsoft.com/office/drawing/2014/main" id="{D09C30BE-8DD1-42E6-ADDB-76D78C54E8B5}"/>
+              </a:ext>
+            </a:extLst>
+          </p:cNvPr>
+          <p:cNvSpPr txBox="1"/>
+          <p:nvPr/>
+        </p:nvSpPr>
+        <p:spPr>
+          <a:xfrm>
+            <a:off x="2689580" y="868680"/>
+            <a:ext cx="6809664" cy="369332"/>
+          </a:xfrm>
+          <a:prstGeom prst="rect">
+            <a:avLst/>
+          </a:prstGeom>
+          <a:noFill/>
+        </p:spPr>
+        <p:txBody>
+          <a:bodyPr wrap="square">
+            <a:spAutoFit/>
+          </a:bodyPr>
+          <a:lstStyle/>
+          <a:p>
+            <a:r>
+              <a:rPr lang="en-US" dirty="0"/>
+              <a:t>Wilson, et al., (2017) </a:t>
+            </a:r>
+            <a:r>
+              <a:rPr lang="en-US" dirty="0">
+                <a:hlinkClick r:id="rId2"/>
+              </a:rPr>
+              <a:t>https://doi.org/10.1371/journal.pcbi.1005510</a:t>
+            </a:r>
+            <a:endParaRPr lang="en-US" dirty="0"/>
+          </a:p>
+        </p:txBody>
+      </p:sp>
+      <p:sp>
+        <p:nvSpPr>
+          <p:cNvPr id="5" name="Content Placeholder 4">
+            <a:extLst>
+              <a:ext uri="{FF2B5EF4-FFF2-40B4-BE49-F238E27FC236}">
+                <a16:creationId xmlns:a16="http://schemas.microsoft.com/office/drawing/2014/main" id="{DDF9E6A5-AEFC-4F97-BA79-ECFE164DD474}"/>
+              </a:ext>
+            </a:extLst>
+          </p:cNvPr>
+          <p:cNvSpPr>
+            <a:spLocks noGrp="1"/>
+          </p:cNvSpPr>
+          <p:nvPr>
+            <p:ph sz="quarter" idx="4"/>
+          </p:nvPr>
+        </p:nvSpPr>
+        <p:spPr>
+          <a:xfrm>
+            <a:off x="6218914" y="1417632"/>
+            <a:ext cx="5531934" cy="3373229"/>
+          </a:xfrm>
+          <a:ln>
+            <a:noFill/>
+          </a:ln>
+        </p:spPr>
+        <p:txBody>
+          <a:bodyPr/>
+          <a:lstStyle/>
+          <a:p>
+            <a:pPr marL="457200" indent="-457200" algn="l">
+              <a:buFont typeface="+mj-lt"/>
+              <a:buAutoNum type="arabicPeriod" startAt="5"/>
+            </a:pPr>
+            <a:r>
+              <a:rPr lang="en-US" b="0" i="0" dirty="0">
+                <a:solidFill>
+                  <a:srgbClr val="202020"/>
+                </a:solidFill>
+                <a:effectLst/>
+              </a:rPr>
+              <a:t>Keeping track of changes</a:t>
+            </a:r>
+          </a:p>
+          <a:p>
+            <a:pPr marL="800100" lvl="1" indent="-342900" algn="l">
+              <a:spcBef>
+                <a:spcPts val="200"/>
+              </a:spcBef>
+              <a:buFont typeface="+mj-lt"/>
+              <a:buAutoNum type="alphaLcPeriod"/>
+            </a:pPr>
+            <a:r>
+              <a:rPr lang="en-US" b="0" i="0" dirty="0">
+                <a:solidFill>
+                  <a:srgbClr val="202020"/>
+                </a:solidFill>
+                <a:effectLst/>
+              </a:rPr>
+              <a:t>Back up (almost) everything created by a human being as soon as it is created.</a:t>
+            </a:r>
+          </a:p>
+          <a:p>
+            <a:pPr marL="800100" lvl="1" indent="-342900" algn="l">
+              <a:spcBef>
+                <a:spcPts val="200"/>
+              </a:spcBef>
+              <a:buFont typeface="+mj-lt"/>
+              <a:buAutoNum type="alphaLcPeriod"/>
+            </a:pPr>
+            <a:r>
+              <a:rPr lang="en-US" b="0" i="0" dirty="0">
+                <a:solidFill>
+                  <a:srgbClr val="202020"/>
+                </a:solidFill>
+                <a:effectLst/>
+              </a:rPr>
+              <a:t>Keep changes small.</a:t>
+            </a:r>
+          </a:p>
+          <a:p>
+            <a:pPr marL="800100" lvl="1" indent="-342900" algn="l">
+              <a:spcBef>
+                <a:spcPts val="200"/>
+              </a:spcBef>
+              <a:buFont typeface="+mj-lt"/>
+              <a:buAutoNum type="alphaLcPeriod"/>
+            </a:pPr>
+            <a:r>
+              <a:rPr lang="en-US" b="0" i="0" dirty="0">
+                <a:solidFill>
+                  <a:srgbClr val="202020"/>
+                </a:solidFill>
+                <a:effectLst/>
+              </a:rPr>
+              <a:t>Share changes frequently.</a:t>
+            </a:r>
+          </a:p>
+          <a:p>
+            <a:pPr marL="800100" lvl="1" indent="-342900" algn="l">
+              <a:spcBef>
+                <a:spcPts val="200"/>
+              </a:spcBef>
+              <a:buFont typeface="+mj-lt"/>
+              <a:buAutoNum type="alphaLcPeriod"/>
+            </a:pPr>
+            <a:r>
+              <a:rPr lang="en-US" b="0" i="0" dirty="0">
+                <a:solidFill>
+                  <a:srgbClr val="202020"/>
+                </a:solidFill>
+                <a:effectLst/>
+              </a:rPr>
+              <a:t>Create, maintain, and use a checklist for saving and sharing changes to the project.</a:t>
+            </a:r>
+          </a:p>
+          <a:p>
+            <a:pPr marL="800100" lvl="1" indent="-342900" algn="l">
+              <a:spcBef>
+                <a:spcPts val="200"/>
+              </a:spcBef>
+              <a:buFont typeface="+mj-lt"/>
+              <a:buAutoNum type="alphaLcPeriod"/>
+            </a:pPr>
+            <a:r>
+              <a:rPr lang="en-US" b="0" i="0" dirty="0">
+                <a:solidFill>
+                  <a:srgbClr val="202020"/>
+                </a:solidFill>
+                <a:effectLst/>
+              </a:rPr>
+              <a:t>Store each project in a folder that is mirrored off the researcher's working machine.</a:t>
+            </a:r>
+          </a:p>
+          <a:p>
+            <a:pPr marL="800100" lvl="1" indent="-342900" algn="l">
+              <a:spcBef>
+                <a:spcPts val="200"/>
+              </a:spcBef>
+              <a:buFont typeface="+mj-lt"/>
+              <a:buAutoNum type="alphaLcPeriod"/>
+            </a:pPr>
+            <a:r>
+              <a:rPr lang="en-US" b="0" i="0" dirty="0">
+                <a:solidFill>
+                  <a:srgbClr val="202020"/>
+                </a:solidFill>
+                <a:effectLst/>
+              </a:rPr>
+              <a:t>Add a file called CHANGELOG.txt to the project's docs subfolder.</a:t>
+            </a:r>
+          </a:p>
+          <a:p>
+            <a:pPr marL="800100" lvl="1" indent="-342900" algn="l">
+              <a:spcBef>
+                <a:spcPts val="200"/>
+              </a:spcBef>
+              <a:buFont typeface="+mj-lt"/>
+              <a:buAutoNum type="alphaLcPeriod"/>
+            </a:pPr>
+            <a:r>
+              <a:rPr lang="en-US" b="0" i="0" dirty="0">
+                <a:solidFill>
+                  <a:srgbClr val="202020"/>
+                </a:solidFill>
+                <a:effectLst/>
+              </a:rPr>
+              <a:t>Copy the entire project whenever a significant change has been made.</a:t>
+            </a:r>
+          </a:p>
+          <a:p>
+            <a:pPr marL="800100" lvl="1" indent="-342900" algn="l">
+              <a:spcBef>
+                <a:spcPts val="200"/>
+              </a:spcBef>
+              <a:buFont typeface="+mj-lt"/>
+              <a:buAutoNum type="alphaLcPeriod"/>
+            </a:pPr>
+            <a:r>
+              <a:rPr lang="en-US" b="0" i="0" dirty="0">
+                <a:solidFill>
+                  <a:srgbClr val="202020"/>
+                </a:solidFill>
+                <a:effectLst/>
+              </a:rPr>
+              <a:t>Use a version control system.</a:t>
+            </a:r>
+          </a:p>
+        </p:txBody>
+      </p:sp>
+    </p:spTree>
+    <p:extLst>
+      <p:ext uri="{BB962C8B-B14F-4D97-AF65-F5344CB8AC3E}">
+        <p14:creationId xmlns:p14="http://schemas.microsoft.com/office/powerpoint/2010/main" val="1285243281"/>
+      </p:ext>
+    </p:extLst>
+  </p:cSld>
+  <p:clrMapOvr>
+    <a:masterClrMapping/>
+  </p:clrMapOvr>
+</p:sld>
+</file>
+
+<file path=ppt/slides/slide16.xml><?xml version="1.0" encoding="utf-8"?>
+<p:sld xmlns:a="http://schemas.openxmlformats.org/drawingml/2006/main" xmlns:r="http://schemas.openxmlformats.org/officeDocument/2006/relationships" xmlns:p="http://schemas.openxmlformats.org/presentationml/2006/main">
+  <p:cSld>
+    <p:spTree>
+      <p:nvGrpSpPr>
+        <p:cNvPr id="1" name=""/>
+        <p:cNvGrpSpPr/>
+        <p:nvPr/>
+      </p:nvGrpSpPr>
+      <p:grpSpPr>
+        <a:xfrm>
+          <a:off x="0" y="0"/>
+          <a:ext cx="0" cy="0"/>
+          <a:chOff x="0" y="0"/>
+          <a:chExt cx="0" cy="0"/>
+        </a:xfrm>
+      </p:grpSpPr>
+      <p:sp>
+        <p:nvSpPr>
+          <p:cNvPr id="7" name="Title 6">
+            <a:extLst>
+              <a:ext uri="{FF2B5EF4-FFF2-40B4-BE49-F238E27FC236}">
+                <a16:creationId xmlns:a16="http://schemas.microsoft.com/office/drawing/2014/main" id="{7E4A6F5A-1431-47E0-B414-98D6A3C81AD8}"/>
+              </a:ext>
+            </a:extLst>
+          </p:cNvPr>
+          <p:cNvSpPr>
+            <a:spLocks noGrp="1"/>
+          </p:cNvSpPr>
+          <p:nvPr>
+            <p:ph type="title"/>
+          </p:nvPr>
+        </p:nvSpPr>
+        <p:spPr/>
+        <p:txBody>
+          <a:bodyPr/>
+          <a:lstStyle/>
+          <a:p>
+            <a:r>
+              <a:rPr lang="en-US" dirty="0"/>
+              <a:t>Example 3: Linux Foundation Core Infrastructure Initiative (CII) Best Practices Badging Program</a:t>
+            </a:r>
+          </a:p>
+        </p:txBody>
+      </p:sp>
+      <p:sp>
+        <p:nvSpPr>
+          <p:cNvPr id="8" name="Content Placeholder 7">
+            <a:extLst>
+              <a:ext uri="{FF2B5EF4-FFF2-40B4-BE49-F238E27FC236}">
+                <a16:creationId xmlns:a16="http://schemas.microsoft.com/office/drawing/2014/main" id="{E569C241-BE37-4775-B3BA-0625446206C1}"/>
+              </a:ext>
+            </a:extLst>
+          </p:cNvPr>
+          <p:cNvSpPr>
+            <a:spLocks noGrp="1"/>
+          </p:cNvSpPr>
+          <p:nvPr>
+            <p:ph idx="1"/>
+          </p:nvPr>
+        </p:nvSpPr>
+        <p:spPr/>
+        <p:txBody>
+          <a:bodyPr/>
+          <a:lstStyle/>
+          <a:p>
+            <a:r>
+              <a:rPr lang="en-US" dirty="0"/>
+              <a:t>Not specifically intended for scientific software</a:t>
+            </a:r>
+          </a:p>
+          <a:p>
+            <a:r>
+              <a:rPr lang="en-US" dirty="0"/>
+              <a:t>Three levels</a:t>
+            </a:r>
+          </a:p>
+          <a:p>
+            <a:pPr lvl="1">
+              <a:buFont typeface="Arial" panose="020B0604020202020204" pitchFamily="34" charset="0"/>
+              <a:buChar char="•"/>
+            </a:pPr>
+            <a:r>
+              <a:rPr lang="en-US" b="1" i="0" dirty="0">
+                <a:solidFill>
+                  <a:srgbClr val="333333"/>
+                </a:solidFill>
+                <a:effectLst/>
+              </a:rPr>
+              <a:t>Passing</a:t>
+            </a:r>
+            <a:r>
+              <a:rPr lang="en-US" b="0" i="0" dirty="0">
+                <a:solidFill>
+                  <a:srgbClr val="333333"/>
+                </a:solidFill>
+                <a:effectLst/>
+              </a:rPr>
+              <a:t> focuses on best practices that well-run FLOSS projects typically already follow. </a:t>
+            </a:r>
+            <a:r>
+              <a:rPr lang="en-US" b="0" i="0" u="sng" dirty="0">
+                <a:solidFill>
+                  <a:srgbClr val="333333"/>
+                </a:solidFill>
+                <a:effectLst/>
+              </a:rPr>
+              <a:t>Getting the passing badge is an achievement</a:t>
+            </a:r>
+            <a:r>
+              <a:rPr lang="en-US" b="0" i="0" dirty="0">
+                <a:solidFill>
+                  <a:srgbClr val="333333"/>
+                </a:solidFill>
+                <a:effectLst/>
+              </a:rPr>
+              <a:t>; at any one time only about 10% of projects pursuing a badge achieve the passing level.</a:t>
+            </a:r>
+          </a:p>
+          <a:p>
+            <a:pPr lvl="1">
+              <a:buFont typeface="Arial" panose="020B0604020202020204" pitchFamily="34" charset="0"/>
+              <a:buChar char="•"/>
+            </a:pPr>
+            <a:r>
+              <a:rPr lang="en-US" b="1" i="0" dirty="0">
+                <a:solidFill>
+                  <a:srgbClr val="333333"/>
+                </a:solidFill>
+                <a:effectLst/>
+              </a:rPr>
+              <a:t>Silver</a:t>
+            </a:r>
+            <a:r>
+              <a:rPr lang="en-US" b="0" i="0" dirty="0">
+                <a:solidFill>
+                  <a:srgbClr val="333333"/>
+                </a:solidFill>
+                <a:effectLst/>
+              </a:rPr>
+              <a:t> is a more stringent set of criteria than passing but is </a:t>
+            </a:r>
+            <a:r>
+              <a:rPr lang="en-US" b="0" i="0" u="sng" dirty="0">
+                <a:solidFill>
+                  <a:srgbClr val="333333"/>
+                </a:solidFill>
+                <a:effectLst/>
+              </a:rPr>
+              <a:t>expected to be achievable by small and single-organization projects</a:t>
+            </a:r>
+            <a:r>
+              <a:rPr lang="en-US" b="0" i="0" dirty="0">
+                <a:solidFill>
+                  <a:srgbClr val="333333"/>
+                </a:solidFill>
+                <a:effectLst/>
+              </a:rPr>
+              <a:t>.</a:t>
+            </a:r>
+          </a:p>
+          <a:p>
+            <a:pPr lvl="1">
+              <a:buFont typeface="Arial" panose="020B0604020202020204" pitchFamily="34" charset="0"/>
+              <a:buChar char="•"/>
+            </a:pPr>
+            <a:r>
+              <a:rPr lang="en-US" b="1" i="0" dirty="0">
+                <a:solidFill>
+                  <a:srgbClr val="333333"/>
+                </a:solidFill>
+                <a:effectLst/>
+              </a:rPr>
+              <a:t>Gold</a:t>
+            </a:r>
+            <a:r>
+              <a:rPr lang="en-US" b="0" i="0" dirty="0">
+                <a:solidFill>
+                  <a:srgbClr val="333333"/>
+                </a:solidFill>
+                <a:effectLst/>
+              </a:rPr>
+              <a:t> is even more stringent than silver and includes criteria that are </a:t>
+            </a:r>
+            <a:r>
+              <a:rPr lang="en-US" b="0" i="0" u="sng" dirty="0">
+                <a:solidFill>
+                  <a:srgbClr val="333333"/>
+                </a:solidFill>
+                <a:effectLst/>
+              </a:rPr>
+              <a:t>not achievable by small or single-organization projects</a:t>
+            </a:r>
+            <a:r>
+              <a:rPr lang="en-US" b="0" i="0" dirty="0">
+                <a:solidFill>
+                  <a:srgbClr val="333333"/>
+                </a:solidFill>
+                <a:effectLst/>
+              </a:rPr>
+              <a:t>.</a:t>
+            </a:r>
+          </a:p>
+          <a:p>
+            <a:pPr>
+              <a:buFont typeface="Arial" panose="020B0604020202020204" pitchFamily="34" charset="0"/>
+              <a:buChar char="•"/>
+            </a:pPr>
+            <a:r>
+              <a:rPr lang="en-US" dirty="0">
+                <a:solidFill>
+                  <a:srgbClr val="333333"/>
+                </a:solidFill>
+              </a:rPr>
+              <a:t>Combination of MUST and SHOULD criteria</a:t>
+            </a:r>
+            <a:endParaRPr lang="en-US" dirty="0"/>
+          </a:p>
+        </p:txBody>
+      </p:sp>
+      <p:sp>
+        <p:nvSpPr>
+          <p:cNvPr id="9" name="TextBox 8">
+            <a:extLst>
+              <a:ext uri="{FF2B5EF4-FFF2-40B4-BE49-F238E27FC236}">
+                <a16:creationId xmlns:a16="http://schemas.microsoft.com/office/drawing/2014/main" id="{A8307BE4-783D-4D3F-A96B-AD68FD9D8C67}"/>
+              </a:ext>
+            </a:extLst>
+          </p:cNvPr>
+          <p:cNvSpPr txBox="1"/>
+          <p:nvPr/>
+        </p:nvSpPr>
+        <p:spPr>
+          <a:xfrm>
+            <a:off x="3691456" y="1253149"/>
+            <a:ext cx="4805912" cy="369332"/>
+          </a:xfrm>
+          <a:prstGeom prst="rect">
+            <a:avLst/>
+          </a:prstGeom>
+          <a:noFill/>
+        </p:spPr>
+        <p:txBody>
+          <a:bodyPr wrap="square">
+            <a:spAutoFit/>
+          </a:bodyPr>
+          <a:lstStyle/>
+          <a:p>
+            <a:r>
+              <a:rPr lang="en-US" dirty="0">
+                <a:hlinkClick r:id="rId2"/>
+              </a:rPr>
+              <a:t>https://bestpractices.coreinfrastructure.org/en</a:t>
+            </a:r>
+            <a:endParaRPr lang="en-US" dirty="0"/>
+          </a:p>
+        </p:txBody>
+      </p:sp>
+    </p:spTree>
+    <p:extLst>
+      <p:ext uri="{BB962C8B-B14F-4D97-AF65-F5344CB8AC3E}">
+        <p14:creationId xmlns:p14="http://schemas.microsoft.com/office/powerpoint/2010/main" val="3500682226"/>
+      </p:ext>
+    </p:extLst>
+  </p:cSld>
+  <p:clrMapOvr>
+    <a:masterClrMapping/>
+  </p:clrMapOvr>
+</p:sld>
+</file>
+
+<file path=ppt/slides/slide17.xml><?xml version="1.0" encoding="utf-8"?>
+<p:sld xmlns:a="http://schemas.openxmlformats.org/drawingml/2006/main" xmlns:r="http://schemas.openxmlformats.org/officeDocument/2006/relationships" xmlns:p="http://schemas.openxmlformats.org/presentationml/2006/main">
+  <p:cSld>
+    <p:spTree>
+      <p:nvGrpSpPr>
+        <p:cNvPr id="1" name=""/>
+        <p:cNvGrpSpPr/>
+        <p:nvPr/>
+      </p:nvGrpSpPr>
+      <p:grpSpPr>
+        <a:xfrm>
+          <a:off x="0" y="0"/>
+          <a:ext cx="0" cy="0"/>
+          <a:chOff x="0" y="0"/>
+          <a:chExt cx="0" cy="0"/>
+        </a:xfrm>
+      </p:grpSpPr>
+      <p:sp>
+        <p:nvSpPr>
+          <p:cNvPr id="2" name="Title 1">
+            <a:extLst>
+              <a:ext uri="{FF2B5EF4-FFF2-40B4-BE49-F238E27FC236}">
+                <a16:creationId xmlns:a16="http://schemas.microsoft.com/office/drawing/2014/main" id="{7451A221-00BB-4705-81CF-5ED483AAFA37}"/>
+              </a:ext>
+            </a:extLst>
+          </p:cNvPr>
+          <p:cNvSpPr>
+            <a:spLocks noGrp="1"/>
+          </p:cNvSpPr>
+          <p:nvPr>
+            <p:ph type="title"/>
+          </p:nvPr>
+        </p:nvSpPr>
+        <p:spPr>
+          <a:xfrm>
+            <a:off x="365760" y="411480"/>
+            <a:ext cx="11375136" cy="914400"/>
+          </a:xfrm>
+        </p:spPr>
+        <p:txBody>
+          <a:bodyPr/>
+          <a:lstStyle/>
+          <a:p>
+            <a:r>
+              <a:rPr lang="en-US" dirty="0"/>
+              <a:t>CII Best Practices Criteria Summary</a:t>
+            </a:r>
+          </a:p>
+        </p:txBody>
+      </p:sp>
+      <p:sp>
+        <p:nvSpPr>
+          <p:cNvPr id="3" name="Content Placeholder 2">
+            <a:extLst>
+              <a:ext uri="{FF2B5EF4-FFF2-40B4-BE49-F238E27FC236}">
+                <a16:creationId xmlns:a16="http://schemas.microsoft.com/office/drawing/2014/main" id="{43B46A8C-7C71-4181-9781-536B0C68D5D4}"/>
+              </a:ext>
+            </a:extLst>
+          </p:cNvPr>
+          <p:cNvSpPr>
+            <a:spLocks noGrp="1"/>
+          </p:cNvSpPr>
+          <p:nvPr>
+            <p:ph sz="half" idx="2"/>
+          </p:nvPr>
+        </p:nvSpPr>
+        <p:spPr>
+          <a:xfrm>
+            <a:off x="457200" y="993891"/>
+            <a:ext cx="5588000" cy="3373438"/>
+          </a:xfrm>
+          <a:ln>
+            <a:noFill/>
+          </a:ln>
+        </p:spPr>
+        <p:txBody>
+          <a:bodyPr/>
+          <a:lstStyle/>
+          <a:p>
+            <a:r>
+              <a:rPr lang="en-US" dirty="0"/>
+              <a:t>Basics</a:t>
+            </a:r>
+          </a:p>
+          <a:p>
+            <a:pPr lvl="1">
+              <a:spcBef>
+                <a:spcPts val="200"/>
+              </a:spcBef>
+            </a:pPr>
+            <a:r>
+              <a:rPr lang="en-US" dirty="0"/>
+              <a:t>Basic project website content (P, S)</a:t>
+            </a:r>
+          </a:p>
+          <a:p>
+            <a:pPr lvl="1">
+              <a:spcBef>
+                <a:spcPts val="200"/>
+              </a:spcBef>
+            </a:pPr>
+            <a:r>
+              <a:rPr lang="en-US" dirty="0"/>
+              <a:t>FLOSS license (P)</a:t>
+            </a:r>
+          </a:p>
+          <a:p>
+            <a:pPr lvl="1">
+              <a:spcBef>
+                <a:spcPts val="200"/>
+              </a:spcBef>
+            </a:pPr>
+            <a:r>
+              <a:rPr lang="en-US" dirty="0"/>
+              <a:t>Documentation (P, S)</a:t>
+            </a:r>
+          </a:p>
+          <a:p>
+            <a:pPr lvl="1">
+              <a:spcBef>
+                <a:spcPts val="200"/>
+              </a:spcBef>
+            </a:pPr>
+            <a:r>
+              <a:rPr lang="en-US" dirty="0"/>
+              <a:t>Project oversight (S, G)</a:t>
+            </a:r>
+          </a:p>
+          <a:p>
+            <a:pPr lvl="1">
+              <a:spcBef>
+                <a:spcPts val="200"/>
+              </a:spcBef>
+            </a:pPr>
+            <a:r>
+              <a:rPr lang="en-US" dirty="0"/>
+              <a:t>Accessibility and internationalization (S)</a:t>
+            </a:r>
+          </a:p>
+          <a:p>
+            <a:r>
+              <a:rPr lang="en-US" dirty="0"/>
+              <a:t>Change control</a:t>
+            </a:r>
+          </a:p>
+          <a:p>
+            <a:pPr lvl="1">
+              <a:spcBef>
+                <a:spcPts val="200"/>
+              </a:spcBef>
+            </a:pPr>
+            <a:r>
+              <a:rPr lang="en-US" dirty="0"/>
+              <a:t>Public version controlled source repo. (P, G)</a:t>
+            </a:r>
+          </a:p>
+          <a:p>
+            <a:pPr lvl="1">
+              <a:spcBef>
+                <a:spcPts val="200"/>
+              </a:spcBef>
+            </a:pPr>
+            <a:r>
+              <a:rPr lang="en-US" dirty="0"/>
+              <a:t>Unique version numbering (P)</a:t>
+            </a:r>
+          </a:p>
+          <a:p>
+            <a:pPr lvl="1">
+              <a:spcBef>
+                <a:spcPts val="200"/>
+              </a:spcBef>
+            </a:pPr>
+            <a:r>
+              <a:rPr lang="en-US" dirty="0"/>
+              <a:t>Release notes (P)</a:t>
+            </a:r>
+          </a:p>
+          <a:p>
+            <a:pPr lvl="1">
+              <a:spcBef>
+                <a:spcPts val="200"/>
+              </a:spcBef>
+            </a:pPr>
+            <a:r>
+              <a:rPr lang="en-US" dirty="0"/>
+              <a:t>Previous versions (S)</a:t>
+            </a:r>
+          </a:p>
+          <a:p>
+            <a:r>
+              <a:rPr lang="en-US" dirty="0"/>
+              <a:t>Reporting</a:t>
+            </a:r>
+          </a:p>
+          <a:p>
+            <a:pPr lvl="1">
+              <a:spcBef>
+                <a:spcPts val="200"/>
+              </a:spcBef>
+            </a:pPr>
+            <a:r>
+              <a:rPr lang="en-US" dirty="0"/>
+              <a:t>Bug-reporting process (P, S)</a:t>
+            </a:r>
+          </a:p>
+          <a:p>
+            <a:pPr lvl="1">
+              <a:spcBef>
+                <a:spcPts val="200"/>
+              </a:spcBef>
+            </a:pPr>
+            <a:r>
+              <a:rPr lang="en-US" dirty="0"/>
+              <a:t>Vulnerability reporting process (P, S)</a:t>
+            </a:r>
+          </a:p>
+        </p:txBody>
+      </p:sp>
+      <p:sp>
+        <p:nvSpPr>
+          <p:cNvPr id="5" name="Content Placeholder 4">
+            <a:extLst>
+              <a:ext uri="{FF2B5EF4-FFF2-40B4-BE49-F238E27FC236}">
+                <a16:creationId xmlns:a16="http://schemas.microsoft.com/office/drawing/2014/main" id="{DDF9E6A5-AEFC-4F97-BA79-ECFE164DD474}"/>
+              </a:ext>
+            </a:extLst>
+          </p:cNvPr>
+          <p:cNvSpPr>
+            <a:spLocks noGrp="1"/>
+          </p:cNvSpPr>
+          <p:nvPr>
+            <p:ph sz="quarter" idx="4"/>
+          </p:nvPr>
+        </p:nvSpPr>
+        <p:spPr>
+          <a:xfrm>
+            <a:off x="6218914" y="993891"/>
+            <a:ext cx="5531934" cy="3373229"/>
+          </a:xfrm>
+          <a:ln>
+            <a:noFill/>
+          </a:ln>
+        </p:spPr>
+        <p:txBody>
+          <a:bodyPr/>
+          <a:lstStyle/>
+          <a:p>
+            <a:r>
+              <a:rPr lang="en-US" b="0" i="0" dirty="0">
+                <a:solidFill>
+                  <a:srgbClr val="202020"/>
+                </a:solidFill>
+                <a:effectLst/>
+              </a:rPr>
+              <a:t>Quality</a:t>
+            </a:r>
+          </a:p>
+          <a:p>
+            <a:pPr lvl="1">
+              <a:spcBef>
+                <a:spcPts val="200"/>
+              </a:spcBef>
+            </a:pPr>
+            <a:r>
+              <a:rPr lang="en-US" dirty="0">
+                <a:solidFill>
+                  <a:srgbClr val="202020"/>
+                </a:solidFill>
+              </a:rPr>
+              <a:t>Working build system </a:t>
+            </a:r>
+            <a:r>
+              <a:rPr lang="en-US" dirty="0"/>
+              <a:t>(P, S, G)</a:t>
+            </a:r>
+            <a:endParaRPr lang="en-US" dirty="0">
+              <a:solidFill>
+                <a:srgbClr val="202020"/>
+              </a:solidFill>
+            </a:endParaRPr>
+          </a:p>
+          <a:p>
+            <a:pPr lvl="1">
+              <a:spcBef>
+                <a:spcPts val="200"/>
+              </a:spcBef>
+            </a:pPr>
+            <a:r>
+              <a:rPr lang="en-US" b="0" i="0" dirty="0">
+                <a:solidFill>
+                  <a:srgbClr val="202020"/>
+                </a:solidFill>
+                <a:effectLst/>
+              </a:rPr>
+              <a:t>Automated test suite </a:t>
+            </a:r>
+            <a:r>
+              <a:rPr lang="en-US" dirty="0"/>
+              <a:t>(P, S, G)</a:t>
+            </a:r>
+            <a:endParaRPr lang="en-US" b="0" i="0" dirty="0">
+              <a:solidFill>
+                <a:srgbClr val="202020"/>
+              </a:solidFill>
+              <a:effectLst/>
+            </a:endParaRPr>
+          </a:p>
+          <a:p>
+            <a:pPr lvl="1">
+              <a:spcBef>
+                <a:spcPts val="200"/>
+              </a:spcBef>
+            </a:pPr>
+            <a:r>
+              <a:rPr lang="en-US" dirty="0">
+                <a:solidFill>
+                  <a:srgbClr val="202020"/>
+                </a:solidFill>
+              </a:rPr>
+              <a:t>New functionality testing </a:t>
+            </a:r>
+            <a:r>
+              <a:rPr lang="en-US" dirty="0"/>
+              <a:t>(P, S)</a:t>
+            </a:r>
+            <a:endParaRPr lang="en-US" dirty="0">
+              <a:solidFill>
+                <a:srgbClr val="202020"/>
+              </a:solidFill>
+            </a:endParaRPr>
+          </a:p>
+          <a:p>
+            <a:pPr lvl="1">
+              <a:spcBef>
+                <a:spcPts val="200"/>
+              </a:spcBef>
+            </a:pPr>
+            <a:r>
+              <a:rPr lang="en-US" b="0" i="0" dirty="0">
+                <a:solidFill>
+                  <a:srgbClr val="202020"/>
+                </a:solidFill>
+                <a:effectLst/>
+              </a:rPr>
+              <a:t>Warning flags </a:t>
+            </a:r>
+            <a:r>
+              <a:rPr lang="en-US" dirty="0"/>
+              <a:t>(P, S)</a:t>
+            </a:r>
+          </a:p>
+          <a:p>
+            <a:pPr lvl="1">
+              <a:spcBef>
+                <a:spcPts val="200"/>
+              </a:spcBef>
+            </a:pPr>
+            <a:r>
+              <a:rPr lang="en-US" b="0" i="0" dirty="0">
+                <a:solidFill>
+                  <a:srgbClr val="202020"/>
+                </a:solidFill>
+                <a:effectLst/>
+              </a:rPr>
+              <a:t>Coding standards (S, G)</a:t>
+            </a:r>
+          </a:p>
+          <a:p>
+            <a:pPr lvl="1">
+              <a:spcBef>
+                <a:spcPts val="200"/>
+              </a:spcBef>
+            </a:pPr>
+            <a:r>
+              <a:rPr lang="en-US" dirty="0">
+                <a:solidFill>
+                  <a:srgbClr val="202020"/>
+                </a:solidFill>
+              </a:rPr>
+              <a:t>Installation system (S)</a:t>
+            </a:r>
+          </a:p>
+          <a:p>
+            <a:pPr lvl="1">
+              <a:spcBef>
+                <a:spcPts val="200"/>
+              </a:spcBef>
+            </a:pPr>
+            <a:r>
+              <a:rPr lang="en-US" b="0" i="0" dirty="0">
+                <a:solidFill>
+                  <a:srgbClr val="202020"/>
+                </a:solidFill>
+                <a:effectLst/>
+              </a:rPr>
+              <a:t>Externally-maintained components (S)</a:t>
+            </a:r>
+          </a:p>
+          <a:p>
+            <a:r>
+              <a:rPr lang="en-US" dirty="0">
+                <a:solidFill>
+                  <a:srgbClr val="202020"/>
+                </a:solidFill>
+              </a:rPr>
+              <a:t>Security</a:t>
+            </a:r>
+          </a:p>
+          <a:p>
+            <a:pPr lvl="1">
+              <a:spcBef>
+                <a:spcPts val="200"/>
+              </a:spcBef>
+            </a:pPr>
+            <a:r>
+              <a:rPr lang="en-US" b="0" i="0" dirty="0">
+                <a:solidFill>
+                  <a:srgbClr val="202020"/>
+                </a:solidFill>
+                <a:effectLst/>
+              </a:rPr>
+              <a:t>Secure development knowledge </a:t>
+            </a:r>
+            <a:r>
+              <a:rPr lang="en-US" dirty="0"/>
+              <a:t>(P, S)</a:t>
+            </a:r>
+            <a:endParaRPr lang="en-US" b="0" i="0" dirty="0">
+              <a:solidFill>
+                <a:srgbClr val="202020"/>
+              </a:solidFill>
+              <a:effectLst/>
+            </a:endParaRPr>
+          </a:p>
+          <a:p>
+            <a:pPr lvl="1">
+              <a:spcBef>
+                <a:spcPts val="200"/>
+              </a:spcBef>
+            </a:pPr>
+            <a:r>
+              <a:rPr lang="en-US" dirty="0">
+                <a:solidFill>
+                  <a:srgbClr val="202020"/>
+                </a:solidFill>
+              </a:rPr>
+              <a:t>Use basic good crypto. practices </a:t>
+            </a:r>
+            <a:r>
+              <a:rPr lang="en-US" dirty="0"/>
+              <a:t>(P, S, G)</a:t>
+            </a:r>
+            <a:endParaRPr lang="en-US" dirty="0">
+              <a:solidFill>
+                <a:srgbClr val="202020"/>
+              </a:solidFill>
+            </a:endParaRPr>
+          </a:p>
+          <a:p>
+            <a:pPr lvl="1">
+              <a:spcBef>
+                <a:spcPts val="200"/>
+              </a:spcBef>
+            </a:pPr>
+            <a:r>
+              <a:rPr lang="en-US" b="0" i="0" dirty="0">
+                <a:solidFill>
+                  <a:srgbClr val="202020"/>
+                </a:solidFill>
+                <a:effectLst/>
+              </a:rPr>
+              <a:t>Secured delivery against MITM attacks </a:t>
+            </a:r>
+            <a:r>
+              <a:rPr lang="en-US" dirty="0"/>
+              <a:t>(P, G)</a:t>
+            </a:r>
+            <a:endParaRPr lang="en-US" b="0" i="0" dirty="0">
+              <a:solidFill>
+                <a:srgbClr val="202020"/>
+              </a:solidFill>
+              <a:effectLst/>
+            </a:endParaRPr>
+          </a:p>
+          <a:p>
+            <a:pPr lvl="1">
+              <a:spcBef>
+                <a:spcPts val="200"/>
+              </a:spcBef>
+            </a:pPr>
+            <a:r>
+              <a:rPr lang="en-US" dirty="0">
+                <a:solidFill>
+                  <a:srgbClr val="202020"/>
+                </a:solidFill>
+              </a:rPr>
+              <a:t>Publicly known vulnerabilities fixed </a:t>
+            </a:r>
+            <a:r>
+              <a:rPr lang="en-US" dirty="0"/>
+              <a:t>(P)</a:t>
+            </a:r>
+            <a:endParaRPr lang="en-US" dirty="0">
+              <a:solidFill>
+                <a:srgbClr val="202020"/>
+              </a:solidFill>
+            </a:endParaRPr>
+          </a:p>
+          <a:p>
+            <a:pPr lvl="1">
+              <a:spcBef>
+                <a:spcPts val="200"/>
+              </a:spcBef>
+            </a:pPr>
+            <a:r>
+              <a:rPr lang="en-US" b="0" i="0" dirty="0">
+                <a:solidFill>
+                  <a:srgbClr val="202020"/>
+                </a:solidFill>
+                <a:effectLst/>
+              </a:rPr>
+              <a:t>Secure release (S)</a:t>
+            </a:r>
+          </a:p>
+          <a:p>
+            <a:r>
+              <a:rPr lang="en-US" dirty="0">
+                <a:solidFill>
+                  <a:srgbClr val="202020"/>
+                </a:solidFill>
+              </a:rPr>
+              <a:t>Analysis</a:t>
+            </a:r>
+          </a:p>
+          <a:p>
+            <a:pPr lvl="1">
+              <a:spcBef>
+                <a:spcPts val="200"/>
+              </a:spcBef>
+            </a:pPr>
+            <a:r>
+              <a:rPr lang="en-US" b="0" i="0" dirty="0">
+                <a:solidFill>
+                  <a:srgbClr val="202020"/>
+                </a:solidFill>
+                <a:effectLst/>
+              </a:rPr>
+              <a:t>Static code analysis </a:t>
+            </a:r>
+            <a:r>
+              <a:rPr lang="en-US" dirty="0"/>
+              <a:t>(P, S)</a:t>
+            </a:r>
+            <a:endParaRPr lang="en-US" b="0" i="0" dirty="0">
+              <a:solidFill>
+                <a:srgbClr val="202020"/>
+              </a:solidFill>
+              <a:effectLst/>
+            </a:endParaRPr>
+          </a:p>
+          <a:p>
+            <a:pPr lvl="1">
+              <a:spcBef>
+                <a:spcPts val="200"/>
+              </a:spcBef>
+            </a:pPr>
+            <a:r>
+              <a:rPr lang="en-US" dirty="0">
+                <a:solidFill>
+                  <a:srgbClr val="202020"/>
+                </a:solidFill>
+              </a:rPr>
+              <a:t>Dynamic code analysis </a:t>
+            </a:r>
+            <a:r>
+              <a:rPr lang="en-US" dirty="0"/>
+              <a:t>(P, S, G)</a:t>
+            </a:r>
+            <a:endParaRPr lang="en-US" b="0" i="0" dirty="0">
+              <a:solidFill>
+                <a:srgbClr val="202020"/>
+              </a:solidFill>
+              <a:effectLst/>
+            </a:endParaRPr>
+          </a:p>
+        </p:txBody>
+      </p:sp>
+      <p:sp>
+        <p:nvSpPr>
+          <p:cNvPr id="4" name="TextBox 3">
+            <a:extLst>
+              <a:ext uri="{FF2B5EF4-FFF2-40B4-BE49-F238E27FC236}">
+                <a16:creationId xmlns:a16="http://schemas.microsoft.com/office/drawing/2014/main" id="{786BD9C9-5936-4194-9BB3-D880388DA930}"/>
+              </a:ext>
+            </a:extLst>
+          </p:cNvPr>
+          <p:cNvSpPr txBox="1"/>
+          <p:nvPr/>
+        </p:nvSpPr>
+        <p:spPr>
+          <a:xfrm>
+            <a:off x="917589" y="5389659"/>
+            <a:ext cx="4667223" cy="1284454"/>
           </a:xfrm>
           <a:prstGeom prst="rect">
             <a:avLst/>
@@ -5009,12 +7627,30 @@
               </a:lnSpc>
             </a:pPr>
             <a:r>
-              <a:rPr lang="en-US" sz="2400" b="1" i="1" dirty="0">
+              <a:rPr lang="en-US" dirty="0">
                 <a:solidFill>
                   <a:schemeClr val="tx2"/>
                 </a:solidFill>
               </a:rPr>
-              <a:t>This tutorial will focus primarily on scientific software as distinct from more generic software engineering best practices</a:t>
+              <a:t>(P, S, G) denotes additional criteria required at passing, silver, or gold certification levels</a:t>
+            </a:r>
+          </a:p>
+          <a:p>
+            <a:pPr algn="l">
+              <a:lnSpc>
+                <a:spcPct val="90000"/>
+              </a:lnSpc>
+              <a:spcBef>
+                <a:spcPts val="800"/>
+              </a:spcBef>
+            </a:pPr>
+            <a:r>
+              <a:rPr lang="en-US" dirty="0">
+                <a:solidFill>
+                  <a:schemeClr val="tx2"/>
+                </a:solidFill>
+              </a:rPr>
+              <a:t>Each topic area listed will have one or more specific criteria</a:t>
             </a:r>
           </a:p>
         </p:txBody>
@@ -5022,7 +7658,7 @@
     </p:spTree>
     <p:extLst>
       <p:ext uri="{BB962C8B-B14F-4D97-AF65-F5344CB8AC3E}">
-        <p14:creationId xmlns:p14="http://schemas.microsoft.com/office/powerpoint/2010/main" val="769054030"/>
+        <p14:creationId xmlns:p14="http://schemas.microsoft.com/office/powerpoint/2010/main" val="2835419516"/>
       </p:ext>
     </p:extLst>
   </p:cSld>
@@ -5032,7 +7668,612 @@
 </p:sld>
 </file>
 
-<file path=ppt/slides/slide12.xml><?xml version="1.0" encoding="utf-8"?>
+<file path=ppt/slides/slide18.xml><?xml version="1.0" encoding="utf-8"?>
+<p:sld xmlns:a="http://schemas.openxmlformats.org/drawingml/2006/main" xmlns:r="http://schemas.openxmlformats.org/officeDocument/2006/relationships" xmlns:p="http://schemas.openxmlformats.org/presentationml/2006/main">
+  <p:cSld>
+    <p:spTree>
+      <p:nvGrpSpPr>
+        <p:cNvPr id="1" name=""/>
+        <p:cNvGrpSpPr/>
+        <p:nvPr/>
+      </p:nvGrpSpPr>
+      <p:grpSpPr>
+        <a:xfrm>
+          <a:off x="0" y="0"/>
+          <a:ext cx="0" cy="0"/>
+          <a:chOff x="0" y="0"/>
+          <a:chExt cx="0" cy="0"/>
+        </a:xfrm>
+      </p:grpSpPr>
+      <p:sp>
+        <p:nvSpPr>
+          <p:cNvPr id="7" name="Title 6">
+            <a:extLst>
+              <a:ext uri="{FF2B5EF4-FFF2-40B4-BE49-F238E27FC236}">
+                <a16:creationId xmlns:a16="http://schemas.microsoft.com/office/drawing/2014/main" id="{46B5367B-EA59-4086-BB11-6B6F46882D5B}"/>
+              </a:ext>
+            </a:extLst>
+          </p:cNvPr>
+          <p:cNvSpPr>
+            <a:spLocks noGrp="1"/>
+          </p:cNvSpPr>
+          <p:nvPr>
+            <p:ph type="title"/>
+          </p:nvPr>
+        </p:nvSpPr>
+        <p:spPr/>
+        <p:txBody>
+          <a:bodyPr/>
+          <a:lstStyle/>
+          <a:p>
+            <a:r>
+              <a:rPr lang="en-US" dirty="0"/>
+              <a:t>Software Engineering Advice Often Needs Adaptation for Scientific Software</a:t>
+            </a:r>
+          </a:p>
+        </p:txBody>
+      </p:sp>
+      <p:sp>
+        <p:nvSpPr>
+          <p:cNvPr id="8" name="Content Placeholder 7">
+            <a:extLst>
+              <a:ext uri="{FF2B5EF4-FFF2-40B4-BE49-F238E27FC236}">
+                <a16:creationId xmlns:a16="http://schemas.microsoft.com/office/drawing/2014/main" id="{671C1039-A0A9-43ED-8E9D-9FF3530D2E77}"/>
+              </a:ext>
+            </a:extLst>
+          </p:cNvPr>
+          <p:cNvSpPr>
+            <a:spLocks noGrp="1"/>
+          </p:cNvSpPr>
+          <p:nvPr>
+            <p:ph idx="1"/>
+          </p:nvPr>
+        </p:nvSpPr>
+        <p:spPr>
+          <a:xfrm>
+            <a:off x="365760" y="1302233"/>
+            <a:ext cx="11369809" cy="4047778"/>
+          </a:xfrm>
+        </p:spPr>
+        <p:txBody>
+          <a:bodyPr/>
+          <a:lstStyle/>
+          <a:p>
+            <a:r>
+              <a:rPr lang="en-US" dirty="0"/>
+              <a:t>The CII Best Practices are a good example of software engineering advice “in the wild”</a:t>
+            </a:r>
+          </a:p>
+          <a:p>
+            <a:r>
+              <a:rPr lang="en-US" dirty="0"/>
+              <a:t>Experiences reported in the wild often don’t consider the special nature of scientific software</a:t>
+            </a:r>
+          </a:p>
+          <a:p>
+            <a:r>
+              <a:rPr lang="en-US" dirty="0"/>
+              <a:t>But that doesn’t mean we should ignore all of the software engineering experience</a:t>
+            </a:r>
+          </a:p>
+          <a:p>
+            <a:pPr lvl="1"/>
+            <a:r>
+              <a:rPr lang="en-US" dirty="0"/>
+              <a:t>Many useful concepts, approaches, and tools we can just </a:t>
+            </a:r>
+            <a:r>
+              <a:rPr lang="en-US" u="sng" dirty="0"/>
+              <a:t>adopt</a:t>
+            </a:r>
+          </a:p>
+          <a:p>
+            <a:r>
+              <a:rPr lang="en-US" dirty="0"/>
+              <a:t>Some approaches may need to be </a:t>
+            </a:r>
+            <a:r>
+              <a:rPr lang="en-US" u="sng" dirty="0"/>
+              <a:t>adapted</a:t>
+            </a:r>
+            <a:r>
+              <a:rPr lang="en-US" dirty="0"/>
+              <a:t> to work for scientific software</a:t>
+            </a:r>
+          </a:p>
+          <a:p>
+            <a:pPr lvl="1"/>
+            <a:r>
+              <a:rPr lang="en-US" dirty="0"/>
+              <a:t>Find out how colleagues have addressed the challenges you’re facing</a:t>
+            </a:r>
+          </a:p>
+          <a:p>
+            <a:pPr lvl="2"/>
+            <a:r>
+              <a:rPr lang="en-US" dirty="0"/>
+              <a:t>Probably you will find multiple ways</a:t>
+            </a:r>
+          </a:p>
+          <a:p>
+            <a:pPr lvl="1"/>
+            <a:r>
+              <a:rPr lang="en-US" dirty="0"/>
+              <a:t>In the end, some approaches may not work well</a:t>
+            </a:r>
+          </a:p>
+          <a:p>
+            <a:r>
+              <a:rPr lang="en-US" dirty="0"/>
+              <a:t>Don’t be afraid to experiment with adaptations</a:t>
+            </a:r>
+          </a:p>
+          <a:p>
+            <a:pPr lvl="1"/>
+            <a:r>
+              <a:rPr lang="en-US" dirty="0"/>
+              <a:t>Consider using the PSIP process (coming up)</a:t>
+            </a:r>
+          </a:p>
+        </p:txBody>
+      </p:sp>
+    </p:spTree>
+    <p:extLst>
+      <p:ext uri="{BB962C8B-B14F-4D97-AF65-F5344CB8AC3E}">
+        <p14:creationId xmlns:p14="http://schemas.microsoft.com/office/powerpoint/2010/main" val="3492468545"/>
+      </p:ext>
+    </p:extLst>
+  </p:cSld>
+  <p:clrMapOvr>
+    <a:masterClrMapping/>
+  </p:clrMapOvr>
+</p:sld>
+</file>
+
+<file path=ppt/slides/slide19.xml><?xml version="1.0" encoding="utf-8"?>
+<p:sld xmlns:a="http://schemas.openxmlformats.org/drawingml/2006/main" xmlns:r="http://schemas.openxmlformats.org/officeDocument/2006/relationships" xmlns:p="http://schemas.openxmlformats.org/presentationml/2006/main">
+  <p:cSld>
+    <p:spTree>
+      <p:nvGrpSpPr>
+        <p:cNvPr id="1" name=""/>
+        <p:cNvGrpSpPr/>
+        <p:nvPr/>
+      </p:nvGrpSpPr>
+      <p:grpSpPr>
+        <a:xfrm>
+          <a:off x="0" y="0"/>
+          <a:ext cx="0" cy="0"/>
+          <a:chOff x="0" y="0"/>
+          <a:chExt cx="0" cy="0"/>
+        </a:xfrm>
+      </p:grpSpPr>
+      <p:sp>
+        <p:nvSpPr>
+          <p:cNvPr id="2" name="Title 1">
+            <a:extLst>
+              <a:ext uri="{FF2B5EF4-FFF2-40B4-BE49-F238E27FC236}">
+                <a16:creationId xmlns:a16="http://schemas.microsoft.com/office/drawing/2014/main" id="{102B5533-2544-4B25-B864-D92F26777297}"/>
+              </a:ext>
+            </a:extLst>
+          </p:cNvPr>
+          <p:cNvSpPr>
+            <a:spLocks noGrp="1"/>
+          </p:cNvSpPr>
+          <p:nvPr>
+            <p:ph type="title"/>
+          </p:nvPr>
+        </p:nvSpPr>
+        <p:spPr>
+          <a:xfrm>
+            <a:off x="365760" y="411480"/>
+            <a:ext cx="11470990" cy="914400"/>
+          </a:xfrm>
+        </p:spPr>
+        <p:txBody>
+          <a:bodyPr/>
+          <a:lstStyle/>
+          <a:p>
+            <a:r>
+              <a:rPr lang="en-US" dirty="0"/>
+              <a:t>How Much (Time, Effort) Should I Spend on Software Engineering?</a:t>
+            </a:r>
+          </a:p>
+        </p:txBody>
+      </p:sp>
+      <p:sp>
+        <p:nvSpPr>
+          <p:cNvPr id="3" name="Content Placeholder 2">
+            <a:extLst>
+              <a:ext uri="{FF2B5EF4-FFF2-40B4-BE49-F238E27FC236}">
+                <a16:creationId xmlns:a16="http://schemas.microsoft.com/office/drawing/2014/main" id="{23892D31-E3B6-4AF6-8DD2-7D4F084DC5C0}"/>
+              </a:ext>
+            </a:extLst>
+          </p:cNvPr>
+          <p:cNvSpPr>
+            <a:spLocks noGrp="1"/>
+          </p:cNvSpPr>
+          <p:nvPr>
+            <p:ph idx="1"/>
+          </p:nvPr>
+        </p:nvSpPr>
+        <p:spPr>
+          <a:xfrm>
+            <a:off x="1999068" y="1737360"/>
+            <a:ext cx="8103194" cy="4047778"/>
+          </a:xfrm>
+        </p:spPr>
+        <p:txBody>
+          <a:bodyPr/>
+          <a:lstStyle/>
+          <a:p>
+            <a:pPr marL="0" indent="0">
+              <a:lnSpc>
+                <a:spcPct val="100000"/>
+              </a:lnSpc>
+              <a:buNone/>
+            </a:pPr>
+            <a:r>
+              <a:rPr lang="en-US" sz="2800" dirty="0"/>
+              <a:t>Your project should include “just enough” software engineering so that you can meet your short-term and longer-term scientific goals effectively</a:t>
+            </a:r>
+          </a:p>
+        </p:txBody>
+      </p:sp>
+    </p:spTree>
+    <p:extLst>
+      <p:ext uri="{BB962C8B-B14F-4D97-AF65-F5344CB8AC3E}">
+        <p14:creationId xmlns:p14="http://schemas.microsoft.com/office/powerpoint/2010/main" val="4038519453"/>
+      </p:ext>
+    </p:extLst>
+  </p:cSld>
+  <p:clrMapOvr>
+    <a:masterClrMapping/>
+  </p:clrMapOvr>
+</p:sld>
+</file>
+
+<file path=ppt/slides/slide2.xml><?xml version="1.0" encoding="utf-8"?>
+<p:sld xmlns:a="http://schemas.openxmlformats.org/drawingml/2006/main" xmlns:r="http://schemas.openxmlformats.org/officeDocument/2006/relationships" xmlns:p="http://schemas.openxmlformats.org/presentationml/2006/main">
+  <p:cSld>
+    <p:spTree>
+      <p:nvGrpSpPr>
+        <p:cNvPr id="1" name=""/>
+        <p:cNvGrpSpPr/>
+        <p:nvPr/>
+      </p:nvGrpSpPr>
+      <p:grpSpPr>
+        <a:xfrm>
+          <a:off x="0" y="0"/>
+          <a:ext cx="0" cy="0"/>
+          <a:chOff x="0" y="0"/>
+          <a:chExt cx="0" cy="0"/>
+        </a:xfrm>
+      </p:grpSpPr>
+      <p:sp>
+        <p:nvSpPr>
+          <p:cNvPr id="2" name="Title 1">
+            <a:extLst>
+              <a:ext uri="{FF2B5EF4-FFF2-40B4-BE49-F238E27FC236}">
+                <a16:creationId xmlns:a16="http://schemas.microsoft.com/office/drawing/2014/main" id="{6442C24D-D970-4D40-8F14-D70C10A96304}"/>
+              </a:ext>
+            </a:extLst>
+          </p:cNvPr>
+          <p:cNvSpPr>
+            <a:spLocks noGrp="1"/>
+          </p:cNvSpPr>
+          <p:nvPr>
+            <p:ph type="title"/>
+          </p:nvPr>
+        </p:nvSpPr>
+        <p:spPr>
+          <a:xfrm>
+            <a:off x="363096" y="112911"/>
+            <a:ext cx="11372473" cy="914400"/>
+          </a:xfrm>
+        </p:spPr>
+        <p:txBody>
+          <a:bodyPr/>
+          <a:lstStyle/>
+          <a:p>
+            <a:r>
+              <a:rPr lang="en-US" dirty="0"/>
+              <a:t>License, Citation and Acknowledgements</a:t>
+            </a:r>
+          </a:p>
+        </p:txBody>
+      </p:sp>
+      <p:sp>
+        <p:nvSpPr>
+          <p:cNvPr id="3" name="Content Placeholder 2">
+            <a:extLst>
+              <a:ext uri="{FF2B5EF4-FFF2-40B4-BE49-F238E27FC236}">
+                <a16:creationId xmlns:a16="http://schemas.microsoft.com/office/drawing/2014/main" id="{0385A3AB-B258-4D59-B407-F7D57545A163}"/>
+              </a:ext>
+            </a:extLst>
+          </p:cNvPr>
+          <p:cNvSpPr>
+            <a:spLocks noGrp="1"/>
+          </p:cNvSpPr>
+          <p:nvPr>
+            <p:ph idx="1"/>
+          </p:nvPr>
+        </p:nvSpPr>
+        <p:spPr>
+          <a:xfrm>
+            <a:off x="409507" y="570111"/>
+            <a:ext cx="11369809" cy="4047778"/>
+          </a:xfrm>
+        </p:spPr>
+        <p:txBody>
+          <a:bodyPr/>
+          <a:lstStyle/>
+          <a:p>
+            <a:pPr marL="0" indent="0">
+              <a:buNone/>
+            </a:pPr>
+            <a:r>
+              <a:rPr lang="en-US" sz="2000" b="1" dirty="0"/>
+              <a:t>License and Citation</a:t>
+            </a:r>
+          </a:p>
+          <a:p>
+            <a:pPr>
+              <a:spcBef>
+                <a:spcPts val="400"/>
+              </a:spcBef>
+            </a:pPr>
+            <a:r>
+              <a:rPr lang="en-US" sz="1600" dirty="0"/>
+              <a:t>This work is licensed under a </a:t>
+            </a:r>
+            <a:r>
+              <a:rPr lang="en-US" sz="1600" dirty="0">
+                <a:hlinkClick r:id="rId2"/>
+              </a:rPr>
+              <a:t>Creative</a:t>
+            </a:r>
+            <a:r>
+              <a:rPr lang="en-US" sz="1600" dirty="0">
+                <a:hlinkClick r:id="rId3"/>
+              </a:rPr>
+              <a:t> Commons Attribution 4.0 International License</a:t>
+            </a:r>
+            <a:r>
+              <a:rPr lang="en-US" sz="1600" dirty="0"/>
+              <a:t> (CC BY 4.0).</a:t>
+            </a:r>
+          </a:p>
+          <a:p>
+            <a:pPr>
+              <a:spcBef>
+                <a:spcPts val="400"/>
+              </a:spcBef>
+            </a:pPr>
+            <a:r>
+              <a:rPr lang="en-US" sz="1600" b="1" dirty="0"/>
+              <a:t>The requested citation the overall tutorial is: David E. Bernholdt, Anshu Dubey, Rinku K. Gupta, and David M. Rogers, Better Scientific Software tutorial, in Improving Scientific Software conference, online, 2021. DOI: </a:t>
+            </a:r>
+            <a:r>
+              <a:rPr lang="en-US" sz="1600" b="1" dirty="0">
+                <a:hlinkClick r:id="rId4"/>
+              </a:rPr>
+              <a:t>10.6084/m9.figshare.14256257</a:t>
+            </a:r>
+            <a:endParaRPr lang="en-US" sz="1600" b="1" dirty="0"/>
+          </a:p>
+          <a:p>
+            <a:pPr>
+              <a:spcBef>
+                <a:spcPts val="400"/>
+              </a:spcBef>
+            </a:pPr>
+            <a:r>
+              <a:rPr lang="en-US" sz="1600" dirty="0"/>
+              <a:t>Individual modules may be cited as </a:t>
+            </a:r>
+            <a:r>
+              <a:rPr lang="en-US" sz="1600" i="1" dirty="0"/>
+              <a:t>Speaker, Module Title</a:t>
+            </a:r>
+            <a:r>
+              <a:rPr lang="en-US" sz="1600" dirty="0"/>
+              <a:t>, in Better Scientific Software tutorial…</a:t>
+            </a:r>
+          </a:p>
+          <a:p>
+            <a:pPr marL="0" indent="0">
+              <a:spcBef>
+                <a:spcPts val="800"/>
+              </a:spcBef>
+              <a:buNone/>
+            </a:pPr>
+            <a:r>
+              <a:rPr lang="en-US" sz="2000" b="1" dirty="0"/>
+              <a:t>Acknowledgements</a:t>
+            </a:r>
+          </a:p>
+          <a:p>
+            <a:pPr>
+              <a:spcBef>
+                <a:spcPts val="400"/>
+              </a:spcBef>
+            </a:pPr>
+            <a:r>
+              <a:rPr lang="en-US" sz="1400" dirty="0"/>
+              <a:t>Additional contributors include: Mike </a:t>
+            </a:r>
+            <a:r>
+              <a:rPr lang="en-US" sz="1400" dirty="0" err="1"/>
+              <a:t>Heroux</a:t>
+            </a:r>
+            <a:r>
+              <a:rPr lang="en-US" sz="1400" dirty="0"/>
+              <a:t>, Alicia </a:t>
+            </a:r>
+            <a:r>
+              <a:rPr lang="en-US" sz="1400" dirty="0" err="1"/>
+              <a:t>Klinvex</a:t>
+            </a:r>
+            <a:r>
+              <a:rPr lang="en-US" sz="1400" dirty="0"/>
+              <a:t>, Mark Miller, Jared O’Neal, Katherine Riley, David Rogers, Deborah Stevens, James </a:t>
+            </a:r>
+            <a:r>
+              <a:rPr lang="en-US" sz="1400" dirty="0" err="1"/>
+              <a:t>Willenbring</a:t>
+            </a:r>
+            <a:endParaRPr lang="en-US" sz="1400" dirty="0"/>
+          </a:p>
+          <a:p>
+            <a:pPr>
+              <a:spcBef>
+                <a:spcPts val="400"/>
+              </a:spcBef>
+            </a:pPr>
+            <a:r>
+              <a:rPr lang="en-US" sz="1400" dirty="0"/>
+              <a:t>This work was supported by the U.S. Department of Energy Office of Science, Office of Advanced Scientific Computing Research (ASCR), and by the </a:t>
+            </a:r>
+            <a:r>
+              <a:rPr lang="en-US" sz="1400" dirty="0" err="1"/>
+              <a:t>Exascale</a:t>
+            </a:r>
+            <a:r>
+              <a:rPr lang="en-US" sz="1400" dirty="0"/>
+              <a:t> Computing Project (17-SC-20-SC), a collaborative effort of the U.S. Department of Energy Office of Science and the National Nuclear Security Administration</a:t>
+            </a:r>
+            <a:r>
+              <a:rPr lang="en-US" sz="1400" i="1" dirty="0"/>
+              <a:t>.</a:t>
+            </a:r>
+            <a:endParaRPr lang="en-US" sz="1400" dirty="0"/>
+          </a:p>
+          <a:p>
+            <a:pPr>
+              <a:spcBef>
+                <a:spcPts val="400"/>
+              </a:spcBef>
+            </a:pPr>
+            <a:r>
+              <a:rPr lang="en-US" sz="1400" dirty="0"/>
+              <a:t>This work was performed in part at the Argonne National Laboratory, which is managed by </a:t>
+            </a:r>
+            <a:r>
+              <a:rPr lang="en-US" sz="1400" dirty="0" err="1"/>
+              <a:t>UChicago</a:t>
+            </a:r>
+            <a:r>
+              <a:rPr lang="en-US" sz="1400" dirty="0"/>
+              <a:t> Argonne, LLC for the U.S. Department of Energy under Contract No. DE-AC02-06CH11357.</a:t>
+            </a:r>
+          </a:p>
+          <a:p>
+            <a:pPr>
+              <a:spcBef>
+                <a:spcPts val="400"/>
+              </a:spcBef>
+            </a:pPr>
+            <a:r>
+              <a:rPr lang="en-US" sz="1400" dirty="0"/>
+              <a:t>This work was performed in part at the Oak Ridge National Laboratory, which is managed by UT-Battelle, LLC for the U.S. Department of Energy under Contract No. DE-AC05-00OR22725.</a:t>
+            </a:r>
+          </a:p>
+          <a:p>
+            <a:pPr>
+              <a:spcBef>
+                <a:spcPts val="400"/>
+              </a:spcBef>
+            </a:pPr>
+            <a:r>
+              <a:rPr lang="en-US" sz="1400" dirty="0"/>
+              <a:t>This work was performed in part at the Lawrence Livermore National Laboratory, which is managed by Lawrence Livermore National Security, LLC for the U.S. Department of Energy under Contract No. DE-AC52-07NA27344.</a:t>
+            </a:r>
+          </a:p>
+          <a:p>
+            <a:pPr>
+              <a:spcBef>
+                <a:spcPts val="400"/>
+              </a:spcBef>
+            </a:pPr>
+            <a:r>
+              <a:rPr lang="en-US" sz="1400" dirty="0"/>
+              <a:t>This work was performed in part at the Los Alamos National Laboratory, which is managed by Triad National Security, LLC for the U.S. Department of Energy under Contract No.89233218CNA000001</a:t>
+            </a:r>
+          </a:p>
+          <a:p>
+            <a:pPr>
+              <a:spcBef>
+                <a:spcPts val="400"/>
+              </a:spcBef>
+            </a:pPr>
+            <a:r>
+              <a:rPr lang="en-US" sz="1400" dirty="0"/>
+              <a:t>This work was performed in part at Sandia National Laboratories. Sandia National Laboratories is a multi-mission laboratory managed and operated by National Technology and Engineering Solutions of Sandia, LLC., a wholly owned subsidiary of Honeywell International, Inc., for the U.S. Department of Energy’s National Nuclear Security Administration under contract DE-NA0003525.</a:t>
+            </a:r>
+          </a:p>
+        </p:txBody>
+      </p:sp>
+      <p:pic>
+        <p:nvPicPr>
+          <p:cNvPr id="4" name="Picture 2" descr="https://licensebuttons.net/l/by/4.0/88x31.png">
+            <a:extLst>
+              <a:ext uri="{FF2B5EF4-FFF2-40B4-BE49-F238E27FC236}">
+                <a16:creationId xmlns:a16="http://schemas.microsoft.com/office/drawing/2014/main" id="{61840015-22A0-4634-A2DE-AA05F998FD3A}"/>
+              </a:ext>
+            </a:extLst>
+          </p:cNvPr>
+          <p:cNvPicPr>
+            <a:picLocks noChangeAspect="1" noChangeArrowheads="1"/>
+          </p:cNvPicPr>
+          <p:nvPr/>
+        </p:nvPicPr>
+        <p:blipFill>
+          <a:blip r:embed="rId5">
+            <a:extLst>
+              <a:ext uri="{28A0092B-C50C-407E-A947-70E740481C1C}">
+                <a14:useLocalDpi xmlns:a14="http://schemas.microsoft.com/office/drawing/2010/main" val="0"/>
+              </a:ext>
+            </a:extLst>
+          </a:blip>
+          <a:srcRect/>
+          <a:stretch>
+            <a:fillRect/>
+          </a:stretch>
+        </p:blipFill>
+        <p:spPr bwMode="auto">
+          <a:xfrm>
+            <a:off x="10249254" y="570111"/>
+            <a:ext cx="1661258" cy="585216"/>
+          </a:xfrm>
+          <a:prstGeom prst="rect">
+            <a:avLst/>
+          </a:prstGeom>
+          <a:noFill/>
+          <a:extLst>
+            <a:ext uri="{909E8E84-426E-40DD-AFC4-6F175D3DCCD1}">
+              <a14:hiddenFill xmlns:a14="http://schemas.microsoft.com/office/drawing/2010/main">
+                <a:solidFill>
+                  <a:srgbClr val="FFFFFF"/>
+                </a:solidFill>
+              </a14:hiddenFill>
+            </a:ext>
+          </a:extLst>
+        </p:spPr>
+      </p:pic>
+    </p:spTree>
+    <p:extLst>
+      <p:ext uri="{BB962C8B-B14F-4D97-AF65-F5344CB8AC3E}">
+        <p14:creationId xmlns:p14="http://schemas.microsoft.com/office/powerpoint/2010/main" val="978726433"/>
+      </p:ext>
+    </p:extLst>
+  </p:cSld>
+  <p:clrMapOvr>
+    <a:masterClrMapping/>
+  </p:clrMapOvr>
+</p:sld>
+</file>
+
+<file path=ppt/slides/slide20.xml><?xml version="1.0" encoding="utf-8"?>
 <p:sld xmlns:a="http://schemas.openxmlformats.org/drawingml/2006/main" xmlns:r="http://schemas.openxmlformats.org/officeDocument/2006/relationships" xmlns:p="http://schemas.openxmlformats.org/presentationml/2006/main">
   <p:cSld>
     <p:spTree>
@@ -6062,7 +9303,7 @@
 </p:sld>
 </file>
 
-<file path=ppt/slides/slide2.xml><?xml version="1.0" encoding="utf-8"?>
+<file path=ppt/slides/slide21.xml><?xml version="1.0" encoding="utf-8"?>
 <p:sld xmlns:a="http://schemas.openxmlformats.org/drawingml/2006/main" xmlns:r="http://schemas.openxmlformats.org/officeDocument/2006/relationships" xmlns:p="http://schemas.openxmlformats.org/presentationml/2006/main">
   <p:cSld>
     <p:spTree>
@@ -6084,7 +9325,7 @@
           <p:cNvPr id="2" name="Title 1">
             <a:extLst>
               <a:ext uri="{FF2B5EF4-FFF2-40B4-BE49-F238E27FC236}">
-                <a16:creationId xmlns:a16="http://schemas.microsoft.com/office/drawing/2014/main" id="{6442C24D-D970-4D40-8F14-D70C10A96304}"/>
+                <a16:creationId xmlns:a16="http://schemas.microsoft.com/office/drawing/2014/main" id="{E3B31B43-E1A4-4F73-9503-0C600612AB47}"/>
               </a:ext>
             </a:extLst>
           </p:cNvPr>
@@ -6095,19 +9336,14 @@
             <p:ph type="title"/>
           </p:nvPr>
         </p:nvSpPr>
-        <p:spPr>
-          <a:xfrm>
-            <a:off x="363096" y="112911"/>
-            <a:ext cx="11372473" cy="914400"/>
-          </a:xfrm>
-        </p:spPr>
+        <p:spPr/>
         <p:txBody>
           <a:bodyPr/>
           <a:lstStyle/>
           <a:p>
             <a:r>
               <a:rPr lang="en-US" dirty="0"/>
-              <a:t>License, Citation and Acknowledgements</a:t>
+              <a:t>About Today’s Tutorial</a:t>
             </a:r>
           </a:p>
         </p:txBody>
@@ -6117,7 +9353,7 @@
           <p:cNvPr id="3" name="Content Placeholder 2">
             <a:extLst>
               <a:ext uri="{FF2B5EF4-FFF2-40B4-BE49-F238E27FC236}">
-                <a16:creationId xmlns:a16="http://schemas.microsoft.com/office/drawing/2014/main" id="{0385A3AB-B258-4D59-B407-F7D57545A163}"/>
+                <a16:creationId xmlns:a16="http://schemas.microsoft.com/office/drawing/2014/main" id="{BEFA0AFE-14CA-49B6-98B0-E8202E175802}"/>
               </a:ext>
             </a:extLst>
           </p:cNvPr>
@@ -6128,272 +9364,77 @@
             <p:ph idx="1"/>
           </p:nvPr>
         </p:nvSpPr>
-        <p:spPr>
-          <a:xfrm>
-            <a:off x="409507" y="570111"/>
-            <a:ext cx="11369809" cy="4047778"/>
-          </a:xfrm>
-        </p:spPr>
+        <p:spPr/>
         <p:txBody>
           <a:bodyPr/>
           <a:lstStyle/>
           <a:p>
-            <a:pPr marL="0" indent="0">
-              <a:buNone/>
-            </a:pPr>
-            <a:r>
-              <a:rPr lang="en-US" sz="2000" b="1" dirty="0"/>
-              <a:t>License and Citation</a:t>
-            </a:r>
-          </a:p>
-          <a:p>
-            <a:pPr>
-              <a:spcBef>
-                <a:spcPts val="400"/>
-              </a:spcBef>
-            </a:pPr>
-            <a:r>
-              <a:rPr lang="en-US" sz="1600" dirty="0"/>
-              <a:t>This work is licensed under a </a:t>
-            </a:r>
-            <a:r>
-              <a:rPr lang="en-US" sz="1600" dirty="0">
-                <a:hlinkClick r:id="rId2"/>
-              </a:rPr>
-              <a:t>Creative</a:t>
-            </a:r>
-            <a:r>
-              <a:rPr lang="en-US" sz="1600" dirty="0">
-                <a:hlinkClick r:id="rId3"/>
-              </a:rPr>
-              <a:t> Commons Attribution 4.0 International License</a:t>
-            </a:r>
-            <a:r>
-              <a:rPr lang="en-US" sz="1600" dirty="0"/>
-              <a:t> (CC BY 4.0).</a:t>
-            </a:r>
-          </a:p>
-          <a:p>
-            <a:pPr>
-              <a:spcBef>
-                <a:spcPts val="400"/>
-              </a:spcBef>
-            </a:pPr>
-            <a:r>
-              <a:rPr lang="en-US" sz="1600" b="1" dirty="0"/>
-              <a:t>The requested citation the overall tutorial is: David E. Bernholdt, Anshu Dubey, Rinku K. Gupta, and David M. Rogers, Better Scientific Software tutorial, in Improving Scientific Software conference, online, 2021. DOI: </a:t>
-            </a:r>
-            <a:r>
-              <a:rPr lang="en-US" sz="1600" b="1" dirty="0">
-                <a:hlinkClick r:id="rId4"/>
-              </a:rPr>
-              <a:t>10.6084/m9.figshare.14256257</a:t>
-            </a:r>
-            <a:endParaRPr lang="en-US" sz="1600" b="1" dirty="0"/>
-          </a:p>
-          <a:p>
-            <a:pPr>
-              <a:spcBef>
-                <a:spcPts val="400"/>
-              </a:spcBef>
-            </a:pPr>
-            <a:r>
-              <a:rPr lang="en-US" sz="1600" dirty="0"/>
-              <a:t>Individual modules may be cited as </a:t>
-            </a:r>
-            <a:r>
-              <a:rPr lang="en-US" sz="1600" i="1" dirty="0"/>
-              <a:t>Speaker, Module Title</a:t>
-            </a:r>
-            <a:r>
-              <a:rPr lang="en-US" sz="1600" dirty="0"/>
-              <a:t>, in Better Scientific Software tutorial…</a:t>
-            </a:r>
-          </a:p>
-          <a:p>
-            <a:pPr marL="0" indent="0">
-              <a:spcBef>
-                <a:spcPts val="800"/>
-              </a:spcBef>
-              <a:buNone/>
-            </a:pPr>
-            <a:r>
-              <a:rPr lang="en-US" sz="2000" b="1" dirty="0"/>
-              <a:t>Acknowledgements</a:t>
-            </a:r>
-          </a:p>
-          <a:p>
-            <a:pPr>
-              <a:spcBef>
-                <a:spcPts val="400"/>
-              </a:spcBef>
-            </a:pPr>
-            <a:r>
-              <a:rPr lang="en-US" sz="1400" dirty="0"/>
-              <a:t>Additional contributors include: Mike </a:t>
-            </a:r>
-            <a:r>
-              <a:rPr lang="en-US" sz="1400" dirty="0" err="1"/>
-              <a:t>Heroux</a:t>
-            </a:r>
-            <a:r>
-              <a:rPr lang="en-US" sz="1400" dirty="0"/>
-              <a:t>, Alicia </a:t>
-            </a:r>
-            <a:r>
-              <a:rPr lang="en-US" sz="1400" dirty="0" err="1"/>
-              <a:t>Klinvex</a:t>
-            </a:r>
-            <a:r>
-              <a:rPr lang="en-US" sz="1400" dirty="0"/>
-              <a:t>, Mark Miller, Jared O’Neal, Katherine Riley, David Rogers, Deborah Stevens, James </a:t>
-            </a:r>
-            <a:r>
-              <a:rPr lang="en-US" sz="1400" dirty="0" err="1"/>
-              <a:t>Willenbring</a:t>
-            </a:r>
-            <a:endParaRPr lang="en-US" sz="1400" dirty="0"/>
-          </a:p>
-          <a:p>
-            <a:pPr>
-              <a:spcBef>
-                <a:spcPts val="400"/>
-              </a:spcBef>
-            </a:pPr>
-            <a:r>
-              <a:rPr lang="en-US" sz="1400" dirty="0"/>
-              <a:t>This work was supported by the U.S. Department of Energy Office of Science, Office of Advanced Scientific Computing Research (ASCR), and by the </a:t>
-            </a:r>
-            <a:r>
-              <a:rPr lang="en-US" sz="1400" dirty="0" err="1"/>
-              <a:t>Exascale</a:t>
-            </a:r>
-            <a:r>
-              <a:rPr lang="en-US" sz="1400" dirty="0"/>
-              <a:t> Computing Project (17-SC-20-SC), a collaborative effort of the U.S. Department of Energy Office of Science and the National Nuclear Security Administration</a:t>
-            </a:r>
-            <a:r>
-              <a:rPr lang="en-US" sz="1400" i="1" dirty="0"/>
-              <a:t>.</a:t>
-            </a:r>
-            <a:endParaRPr lang="en-US" sz="1400" dirty="0"/>
-          </a:p>
-          <a:p>
-            <a:pPr>
-              <a:spcBef>
-                <a:spcPts val="400"/>
-              </a:spcBef>
-            </a:pPr>
-            <a:r>
-              <a:rPr lang="en-US" sz="1400" dirty="0"/>
-              <a:t>This work was performed in part at the Argonne National Laboratory, which is managed by </a:t>
-            </a:r>
-            <a:r>
-              <a:rPr lang="en-US" sz="1400" dirty="0" err="1"/>
-              <a:t>UChicago</a:t>
-            </a:r>
-            <a:r>
-              <a:rPr lang="en-US" sz="1400" dirty="0"/>
-              <a:t> Argonne, LLC for the U.S. Department of Energy under Contract No. DE-AC02-06CH11357.</a:t>
-            </a:r>
-          </a:p>
-          <a:p>
-            <a:pPr>
-              <a:spcBef>
-                <a:spcPts val="400"/>
-              </a:spcBef>
-            </a:pPr>
-            <a:r>
-              <a:rPr lang="en-US" sz="1400" dirty="0"/>
-              <a:t>This work was performed in part at the Oak Ridge National Laboratory, which is managed by UT-Battelle, LLC for the U.S. Department of Energy under Contract No. DE-AC05-00OR22725.</a:t>
-            </a:r>
-          </a:p>
-          <a:p>
-            <a:pPr>
-              <a:spcBef>
-                <a:spcPts val="400"/>
-              </a:spcBef>
-            </a:pPr>
-            <a:r>
-              <a:rPr lang="en-US" sz="1400" dirty="0"/>
-              <a:t>This work was performed in part at the Lawrence Livermore National Laboratory, which is managed by Lawrence Livermore National Security, LLC for the U.S. Department of Energy under Contract No. DE-AC52-07NA27344.</a:t>
-            </a:r>
-          </a:p>
-          <a:p>
-            <a:pPr>
-              <a:spcBef>
-                <a:spcPts val="400"/>
-              </a:spcBef>
-            </a:pPr>
-            <a:r>
-              <a:rPr lang="en-US" sz="1400" dirty="0"/>
-              <a:t>This work was performed in part at the Los Alamos National Laboratory, which is managed by Triad National Security, LLC for the U.S. Department of Energy under Contract No.89233218CNA000001</a:t>
-            </a:r>
-          </a:p>
-          <a:p>
-            <a:pPr>
-              <a:spcBef>
-                <a:spcPts val="400"/>
-              </a:spcBef>
-            </a:pPr>
-            <a:r>
-              <a:rPr lang="en-US" sz="1400" dirty="0"/>
-              <a:t>This work was performed in part at Sandia National Laboratories. Sandia National Laboratories is a multi-mission laboratory managed and operated by National Technology and Engineering Solutions of Sandia, LLC., a wholly owned subsidiary of Honeywell International, Inc., for the U.S. Department of Energy’s National Nuclear Security Administration under contract DE-NA0003525.</a:t>
+            <a:r>
+              <a:rPr lang="en-US" dirty="0"/>
+              <a:t>There are many useful topics that could help you improve your scientific software development process</a:t>
+            </a:r>
+          </a:p>
+          <a:p>
+            <a:r>
+              <a:rPr lang="en-US" dirty="0"/>
+              <a:t>We’re going to focus on a few where the software engineering advice in the wild doesn’t address scientific software</a:t>
+            </a:r>
+          </a:p>
+          <a:p>
+            <a:pPr lvl="1"/>
+            <a:r>
+              <a:rPr lang="en-US" dirty="0"/>
+              <a:t>Project management</a:t>
+            </a:r>
+          </a:p>
+          <a:p>
+            <a:pPr lvl="1"/>
+            <a:r>
+              <a:rPr lang="en-US" dirty="0"/>
+              <a:t>Collaboration around software development</a:t>
+            </a:r>
+          </a:p>
+          <a:p>
+            <a:pPr lvl="1"/>
+            <a:r>
+              <a:rPr lang="en-US" dirty="0"/>
+              <a:t>Designing software for flexibility and extensibility</a:t>
+            </a:r>
+          </a:p>
+          <a:p>
+            <a:pPr lvl="1"/>
+            <a:r>
+              <a:rPr lang="en-US" dirty="0"/>
+              <a:t>Testing strategies for complex software systems</a:t>
+            </a:r>
+          </a:p>
+          <a:p>
+            <a:pPr lvl="1"/>
+            <a:r>
+              <a:rPr lang="en-US" dirty="0"/>
+              <a:t>Systematic refactoring of large, complex software systems</a:t>
+            </a:r>
+          </a:p>
+          <a:p>
+            <a:pPr lvl="1"/>
+            <a:r>
+              <a:rPr lang="en-US" dirty="0"/>
+              <a:t>Continuous integration testing</a:t>
+            </a:r>
+          </a:p>
+          <a:p>
+            <a:pPr lvl="1"/>
+            <a:r>
+              <a:rPr lang="en-US" dirty="0"/>
+              <a:t>Reproducibility</a:t>
             </a:r>
           </a:p>
         </p:txBody>
       </p:sp>
-      <p:pic>
-        <p:nvPicPr>
-          <p:cNvPr id="4" name="Picture 2" descr="https://licensebuttons.net/l/by/4.0/88x31.png">
-            <a:extLst>
-              <a:ext uri="{FF2B5EF4-FFF2-40B4-BE49-F238E27FC236}">
-                <a16:creationId xmlns:a16="http://schemas.microsoft.com/office/drawing/2014/main" id="{61840015-22A0-4634-A2DE-AA05F998FD3A}"/>
-              </a:ext>
-            </a:extLst>
-          </p:cNvPr>
-          <p:cNvPicPr>
-            <a:picLocks noChangeAspect="1" noChangeArrowheads="1"/>
-          </p:cNvPicPr>
-          <p:nvPr/>
-        </p:nvPicPr>
-        <p:blipFill>
-          <a:blip r:embed="rId5">
-            <a:extLst>
-              <a:ext uri="{28A0092B-C50C-407E-A947-70E740481C1C}">
-                <a14:useLocalDpi xmlns:a14="http://schemas.microsoft.com/office/drawing/2010/main" val="0"/>
-              </a:ext>
-            </a:extLst>
-          </a:blip>
-          <a:srcRect/>
-          <a:stretch>
-            <a:fillRect/>
-          </a:stretch>
-        </p:blipFill>
-        <p:spPr bwMode="auto">
-          <a:xfrm>
-            <a:off x="10249254" y="570111"/>
-            <a:ext cx="1661258" cy="585216"/>
-          </a:xfrm>
-          <a:prstGeom prst="rect">
-            <a:avLst/>
-          </a:prstGeom>
-          <a:noFill/>
-          <a:extLst>
-            <a:ext uri="{909E8E84-426E-40DD-AFC4-6F175D3DCCD1}">
-              <a14:hiddenFill xmlns:a14="http://schemas.microsoft.com/office/drawing/2010/main">
-                <a:solidFill>
-                  <a:srgbClr val="FFFFFF"/>
-                </a:solidFill>
-              </a14:hiddenFill>
-            </a:ext>
-          </a:extLst>
-        </p:spPr>
-      </p:pic>
     </p:spTree>
     <p:extLst>
       <p:ext uri="{BB962C8B-B14F-4D97-AF65-F5344CB8AC3E}">
-        <p14:creationId xmlns:p14="http://schemas.microsoft.com/office/powerpoint/2010/main" val="978726433"/>
+        <p14:creationId xmlns:p14="http://schemas.microsoft.com/office/powerpoint/2010/main" val="2220558370"/>
       </p:ext>
     </p:extLst>
   </p:cSld>
@@ -7267,13 +10308,7 @@
       </p:grpSpPr>
       <p:sp>
         <p:nvSpPr>
-          <p:cNvPr id="2" name="Title 1">
-            <a:extLst>
-              <a:ext uri="{FF2B5EF4-FFF2-40B4-BE49-F238E27FC236}">
-                <a16:creationId xmlns:a16="http://schemas.microsoft.com/office/drawing/2014/main" id="{4911B305-C6F2-4C36-9A38-F2C17456AE2B}"/>
-              </a:ext>
-            </a:extLst>
-          </p:cNvPr>
+          <p:cNvPr id="2" name="Title 1"/>
           <p:cNvSpPr>
             <a:spLocks noGrp="1"/>
           </p:cNvSpPr>
@@ -7283,8 +10318,8 @@
         </p:nvSpPr>
         <p:spPr>
           <a:xfrm>
-            <a:off x="365761" y="411480"/>
-            <a:ext cx="7749992" cy="914400"/>
+            <a:off x="365760" y="410602"/>
+            <a:ext cx="11375136" cy="510909"/>
           </a:xfrm>
         </p:spPr>
         <p:txBody>
@@ -7293,31 +10328,25 @@
           <a:p>
             <a:r>
               <a:rPr lang="en-US" dirty="0"/>
-              <a:t>Scientific Facilities Provide Valuable Resources</a:t>
+              <a:t>Challenges Developing Scientific Applications Today</a:t>
             </a:r>
           </a:p>
         </p:txBody>
       </p:sp>
       <p:sp>
         <p:nvSpPr>
-          <p:cNvPr id="10" name="Content Placeholder 9">
-            <a:extLst>
-              <a:ext uri="{FF2B5EF4-FFF2-40B4-BE49-F238E27FC236}">
-                <a16:creationId xmlns:a16="http://schemas.microsoft.com/office/drawing/2014/main" id="{DFC96AD3-4FF0-435B-AC4F-F2EE976B850D}"/>
-              </a:ext>
-            </a:extLst>
-          </p:cNvPr>
+          <p:cNvPr id="3" name="Text Placeholder 2"/>
           <p:cNvSpPr>
             <a:spLocks noGrp="1"/>
           </p:cNvSpPr>
           <p:nvPr>
-            <p:ph idx="1"/>
+            <p:ph type="body" idx="1"/>
           </p:nvPr>
         </p:nvSpPr>
         <p:spPr>
           <a:xfrm>
-            <a:off x="365761" y="1535565"/>
-            <a:ext cx="7749994" cy="4047778"/>
+            <a:off x="365760" y="1163920"/>
+            <a:ext cx="5588582" cy="821190"/>
           </a:xfrm>
         </p:spPr>
         <p:txBody>
@@ -7325,177 +10354,168 @@
           <a:lstStyle/>
           <a:p>
             <a:r>
-              <a:rPr lang="en-US" dirty="0"/>
-              <a:t>Major supercomputers often cost O($100M)</a:t>
-            </a:r>
-          </a:p>
-          <a:p>
-            <a:r>
-              <a:rPr lang="en-US" dirty="0"/>
-              <a:t>All cost millions more to operate, annually</a:t>
-            </a:r>
-          </a:p>
-          <a:p>
-            <a:r>
-              <a:rPr lang="en-US" dirty="0"/>
-              <a:t>Significant allocations on large supercomputers can be worth millions</a:t>
-            </a:r>
-          </a:p>
-          <a:p>
-            <a:r>
-              <a:rPr lang="en-US" dirty="0"/>
-              <a:t>Even if you don’t pay the $ you have to spend the time and effort to get the allocation</a:t>
-            </a:r>
-          </a:p>
-          <a:p>
-            <a:r>
-              <a:rPr lang="en-US" b="1" u="sng" dirty="0">
-                <a:solidFill>
-                  <a:schemeClr val="tx2"/>
-                </a:solidFill>
-              </a:rPr>
-              <a:t>Sponsors’ concern</a:t>
-            </a:r>
-            <a:r>
-              <a:rPr lang="en-US" b="1" dirty="0">
-                <a:solidFill>
-                  <a:schemeClr val="tx2"/>
-                </a:solidFill>
-              </a:rPr>
-              <a:t>: Are you being a good steward of the resources?</a:t>
-            </a:r>
-          </a:p>
-          <a:p>
-            <a:r>
-              <a:rPr lang="en-US" b="1" u="sng" dirty="0">
-                <a:solidFill>
-                  <a:schemeClr val="tx2"/>
-                </a:solidFill>
-              </a:rPr>
-              <a:t>Your concern</a:t>
-            </a:r>
-            <a:r>
-              <a:rPr lang="en-US" b="1" dirty="0">
-                <a:solidFill>
-                  <a:schemeClr val="tx2"/>
-                </a:solidFill>
-              </a:rPr>
-              <a:t>: Are you getting the most science possible out of your work (aka scientific productivity)?</a:t>
+              <a:rPr lang="en-US" sz="2800" dirty="0"/>
+              <a:t>Technical</a:t>
             </a:r>
           </a:p>
         </p:txBody>
       </p:sp>
-      <p:pic>
-        <p:nvPicPr>
-          <p:cNvPr id="8" name="Picture 7">
-            <a:extLst>
-              <a:ext uri="{FF2B5EF4-FFF2-40B4-BE49-F238E27FC236}">
-                <a16:creationId xmlns:a16="http://schemas.microsoft.com/office/drawing/2014/main" id="{CBF1AD80-AE63-444B-8CCE-A328E711D223}"/>
-              </a:ext>
-            </a:extLst>
-          </p:cNvPr>
-          <p:cNvPicPr>
-            <a:picLocks noChangeAspect="1"/>
-          </p:cNvPicPr>
-          <p:nvPr/>
-        </p:nvPicPr>
-        <p:blipFill>
-          <a:blip r:embed="rId2"/>
-          <a:stretch>
-            <a:fillRect/>
-          </a:stretch>
-        </p:blipFill>
+      <p:sp>
+        <p:nvSpPr>
+          <p:cNvPr id="7" name="Content Placeholder 6"/>
+          <p:cNvSpPr>
+            <a:spLocks noGrp="1"/>
+          </p:cNvSpPr>
+          <p:nvPr>
+            <p:ph sz="half" idx="2"/>
+          </p:nvPr>
+        </p:nvSpPr>
         <p:spPr>
           <a:xfrm>
-            <a:off x="8190744" y="2236185"/>
-            <a:ext cx="3703320" cy="1851660"/>
+            <a:off x="365760" y="2043782"/>
+            <a:ext cx="5588582" cy="3702110"/>
           </a:xfrm>
-          <a:prstGeom prst="rect">
-            <a:avLst/>
-          </a:prstGeom>
         </p:spPr>
-      </p:pic>
-      <p:pic>
-        <p:nvPicPr>
-          <p:cNvPr id="9" name="Picture 4" descr="Image result for olcf frontier images">
-            <a:extLst>
-              <a:ext uri="{FF2B5EF4-FFF2-40B4-BE49-F238E27FC236}">
-                <a16:creationId xmlns:a16="http://schemas.microsoft.com/office/drawing/2014/main" id="{96E8923D-49A5-47B3-89A0-1F0743A5BE5A}"/>
-              </a:ext>
-            </a:extLst>
-          </p:cNvPr>
-          <p:cNvPicPr>
-            <a:picLocks noChangeAspect="1" noChangeArrowheads="1"/>
-          </p:cNvPicPr>
-          <p:nvPr/>
-        </p:nvPicPr>
-        <p:blipFill>
-          <a:blip r:embed="rId3" cstate="print">
-            <a:extLst>
-              <a:ext uri="{28A0092B-C50C-407E-A947-70E740481C1C}">
-                <a14:useLocalDpi xmlns:a14="http://schemas.microsoft.com/office/drawing/2010/main" val="0"/>
-              </a:ext>
-            </a:extLst>
-          </a:blip>
-          <a:srcRect/>
-          <a:stretch>
-            <a:fillRect/>
-          </a:stretch>
-        </p:blipFill>
-        <p:spPr bwMode="auto">
-          <a:xfrm>
-            <a:off x="8115754" y="739566"/>
-            <a:ext cx="3707315" cy="1611330"/>
-          </a:xfrm>
-          <a:prstGeom prst="rect">
-            <a:avLst/>
-          </a:prstGeom>
-          <a:noFill/>
-          <a:extLst>
-            <a:ext uri="{909E8E84-426E-40DD-AFC4-6F175D3DCCD1}">
-              <a14:hiddenFill xmlns:a14="http://schemas.microsoft.com/office/drawing/2010/main">
-                <a:solidFill>
-                  <a:srgbClr val="FFFFFF"/>
-                </a:solidFill>
-              </a14:hiddenFill>
-            </a:ext>
-          </a:extLst>
-        </p:spPr>
-      </p:pic>
-      <p:pic>
-        <p:nvPicPr>
-          <p:cNvPr id="7" name="Content Placeholder 3">
-            <a:extLst>
-              <a:ext uri="{FF2B5EF4-FFF2-40B4-BE49-F238E27FC236}">
-                <a16:creationId xmlns:a16="http://schemas.microsoft.com/office/drawing/2014/main" id="{3352E1D0-7C38-486F-8113-805BA100DA8B}"/>
-              </a:ext>
-            </a:extLst>
-          </p:cNvPr>
-          <p:cNvPicPr>
-            <a:picLocks noChangeAspect="1"/>
-          </p:cNvPicPr>
-          <p:nvPr/>
-        </p:nvPicPr>
-        <p:blipFill>
-          <a:blip r:embed="rId4"/>
-          <a:stretch>
-            <a:fillRect/>
-          </a:stretch>
-        </p:blipFill>
+        <p:txBody>
+          <a:bodyPr>
+            <a:normAutofit lnSpcReduction="10000"/>
+          </a:bodyPr>
+          <a:lstStyle/>
+          <a:p>
+            <a:r>
+              <a:rPr lang="en-US" sz="2400" dirty="0"/>
+              <a:t>All parts of the model and software system can be under research</a:t>
+            </a:r>
+          </a:p>
+          <a:p>
+            <a:r>
+              <a:rPr lang="en-US" sz="2400" dirty="0"/>
+              <a:t>Requirements change throughout the lifecycle as knowledge grows</a:t>
+            </a:r>
+          </a:p>
+          <a:p>
+            <a:r>
+              <a:rPr lang="en-US" sz="2400" dirty="0"/>
+              <a:t>Verification complicated by floating point representation</a:t>
+            </a:r>
+          </a:p>
+          <a:p>
+            <a:r>
+              <a:rPr lang="en-US" sz="2400" dirty="0"/>
+              <a:t>Real world is messy, so is the software</a:t>
+            </a:r>
+          </a:p>
+          <a:p>
+            <a:r>
+              <a:rPr lang="en-US" sz="2400" dirty="0"/>
+              <a:t>Increasing architectural diversity</a:t>
+            </a:r>
+          </a:p>
+          <a:p>
+            <a:endParaRPr lang="en-US" sz="2400" dirty="0"/>
+          </a:p>
+          <a:p>
+            <a:endParaRPr lang="en-US" sz="2400" dirty="0"/>
+          </a:p>
+          <a:p>
+            <a:endParaRPr lang="en-US" sz="2400" dirty="0"/>
+          </a:p>
+        </p:txBody>
+      </p:sp>
+      <p:sp>
+        <p:nvSpPr>
+          <p:cNvPr id="6" name="Text Placeholder 5"/>
+          <p:cNvSpPr>
+            <a:spLocks noGrp="1"/>
+          </p:cNvSpPr>
+          <p:nvPr>
+            <p:ph type="body" sz="quarter" idx="3"/>
+          </p:nvPr>
+        </p:nvSpPr>
         <p:spPr>
           <a:xfrm>
-            <a:off x="8190744" y="3973133"/>
-            <a:ext cx="3703320" cy="1902581"/>
+            <a:off x="6191755" y="1163920"/>
+            <a:ext cx="5531934" cy="821190"/>
           </a:xfrm>
-          <a:prstGeom prst="rect">
-            <a:avLst/>
-          </a:prstGeom>
         </p:spPr>
-      </p:pic>
+        <p:txBody>
+          <a:bodyPr/>
+          <a:lstStyle/>
+          <a:p>
+            <a:r>
+              <a:rPr lang="en-US" sz="2800" dirty="0"/>
+              <a:t>Sociological</a:t>
+            </a:r>
+          </a:p>
+        </p:txBody>
+      </p:sp>
+      <p:sp>
+        <p:nvSpPr>
+          <p:cNvPr id="8" name="Content Placeholder 7"/>
+          <p:cNvSpPr>
+            <a:spLocks noGrp="1"/>
+          </p:cNvSpPr>
+          <p:nvPr>
+            <p:ph sz="quarter" idx="4"/>
+          </p:nvPr>
+        </p:nvSpPr>
+        <p:spPr>
+          <a:xfrm>
+            <a:off x="6191755" y="2043782"/>
+            <a:ext cx="5531934" cy="3702110"/>
+          </a:xfrm>
+        </p:spPr>
+        <p:txBody>
+          <a:bodyPr/>
+          <a:lstStyle/>
+          <a:p>
+            <a:r>
+              <a:rPr lang="en-US" sz="2400" dirty="0"/>
+              <a:t>Competing priorities and incentives</a:t>
+            </a:r>
+          </a:p>
+          <a:p>
+            <a:pPr lvl="1"/>
+            <a:r>
+              <a:rPr lang="en-US" sz="2200" dirty="0"/>
+              <a:t>Sponsors often care more about scientific publications than software per se</a:t>
+            </a:r>
+          </a:p>
+          <a:p>
+            <a:pPr lvl="1"/>
+            <a:r>
+              <a:rPr lang="en-US" sz="2200" dirty="0"/>
+              <a:t>Balancing development and maintenance</a:t>
+            </a:r>
+          </a:p>
+          <a:p>
+            <a:r>
+              <a:rPr lang="en-US" sz="2400" dirty="0"/>
+              <a:t>Limited resources </a:t>
+            </a:r>
+          </a:p>
+          <a:p>
+            <a:r>
+              <a:rPr lang="en-US" sz="2400" dirty="0"/>
+              <a:t>Need for interdisciplinary interactions</a:t>
+            </a:r>
+          </a:p>
+          <a:p>
+            <a:pPr lvl="1"/>
+            <a:r>
+              <a:rPr lang="en-US" sz="2200" dirty="0"/>
+              <a:t>Many different kinds of expertise to be successful</a:t>
+            </a:r>
+          </a:p>
+          <a:p>
+            <a:endParaRPr lang="en-US" sz="2400" dirty="0"/>
+          </a:p>
+        </p:txBody>
+      </p:sp>
     </p:spTree>
     <p:extLst>
       <p:ext uri="{BB962C8B-B14F-4D97-AF65-F5344CB8AC3E}">
-        <p14:creationId xmlns:p14="http://schemas.microsoft.com/office/powerpoint/2010/main" val="3897380864"/>
+        <p14:creationId xmlns:p14="http://schemas.microsoft.com/office/powerpoint/2010/main" val="3957161676"/>
       </p:ext>
     </p:extLst>
   </p:cSld>
@@ -8301,7 +11321,7 @@
                   <a:schemeClr val="bg1"/>
                 </a:solidFill>
               </a:rPr>
-              <a:t>The cost implied cost of additional rework caused by choosing an easy (limited) solution now instead of </a:t>
+              <a:t>The implied cost of additional rework caused by choosing an easy (limited) solution now instead of </a:t>
             </a:r>
             <a:br>
               <a:rPr lang="en-US" sz="2400" dirty="0">
@@ -8364,7 +11384,13 @@
       </p:grpSpPr>
       <p:sp>
         <p:nvSpPr>
-          <p:cNvPr id="2" name="Title 1"/>
+          <p:cNvPr id="2" name="Title 1">
+            <a:extLst>
+              <a:ext uri="{FF2B5EF4-FFF2-40B4-BE49-F238E27FC236}">
+                <a16:creationId xmlns:a16="http://schemas.microsoft.com/office/drawing/2014/main" id="{4911B305-C6F2-4C36-9A38-F2C17456AE2B}"/>
+              </a:ext>
+            </a:extLst>
+          </p:cNvPr>
           <p:cNvSpPr>
             <a:spLocks noGrp="1"/>
           </p:cNvSpPr>
@@ -8374,8 +11400,8 @@
         </p:nvSpPr>
         <p:spPr>
           <a:xfrm>
-            <a:off x="365760" y="410602"/>
-            <a:ext cx="11375136" cy="510909"/>
+            <a:off x="365761" y="411480"/>
+            <a:ext cx="7749992" cy="914400"/>
           </a:xfrm>
         </p:spPr>
         <p:txBody>
@@ -8384,25 +11410,31 @@
           <a:p>
             <a:r>
               <a:rPr lang="en-US" dirty="0"/>
-              <a:t>Challenges Developing Scientific Applications Today</a:t>
+              <a:t>Scientific Facilities Provide Valuable Resources</a:t>
             </a:r>
           </a:p>
         </p:txBody>
       </p:sp>
       <p:sp>
         <p:nvSpPr>
-          <p:cNvPr id="3" name="Text Placeholder 2"/>
+          <p:cNvPr id="10" name="Content Placeholder 9">
+            <a:extLst>
+              <a:ext uri="{FF2B5EF4-FFF2-40B4-BE49-F238E27FC236}">
+                <a16:creationId xmlns:a16="http://schemas.microsoft.com/office/drawing/2014/main" id="{DFC96AD3-4FF0-435B-AC4F-F2EE976B850D}"/>
+              </a:ext>
+            </a:extLst>
+          </p:cNvPr>
           <p:cNvSpPr>
             <a:spLocks noGrp="1"/>
           </p:cNvSpPr>
           <p:nvPr>
-            <p:ph type="body" idx="1"/>
+            <p:ph idx="1"/>
           </p:nvPr>
         </p:nvSpPr>
         <p:spPr>
           <a:xfrm>
-            <a:off x="365760" y="1163920"/>
-            <a:ext cx="5588582" cy="821190"/>
+            <a:off x="365761" y="1535565"/>
+            <a:ext cx="7749994" cy="4047778"/>
           </a:xfrm>
         </p:spPr>
         <p:txBody>
@@ -8410,161 +11442,177 @@
           <a:lstStyle/>
           <a:p>
             <a:r>
-              <a:rPr lang="en-US" sz="2800" dirty="0"/>
-              <a:t>Technical</a:t>
+              <a:rPr lang="en-US" dirty="0"/>
+              <a:t>Major supercomputers often cost O($100M)</a:t>
+            </a:r>
+          </a:p>
+          <a:p>
+            <a:r>
+              <a:rPr lang="en-US" dirty="0"/>
+              <a:t>All cost millions more to operate, annually</a:t>
+            </a:r>
+          </a:p>
+          <a:p>
+            <a:r>
+              <a:rPr lang="en-US" dirty="0"/>
+              <a:t>Significant allocations on large supercomputers can be worth millions</a:t>
+            </a:r>
+          </a:p>
+          <a:p>
+            <a:r>
+              <a:rPr lang="en-US" dirty="0"/>
+              <a:t>Even if you don’t pay the $ you have to spend the time and effort to get the allocation</a:t>
+            </a:r>
+          </a:p>
+          <a:p>
+            <a:r>
+              <a:rPr lang="en-US" b="1" u="sng" dirty="0">
+                <a:solidFill>
+                  <a:schemeClr val="tx2"/>
+                </a:solidFill>
+              </a:rPr>
+              <a:t>Sponsors’ concern</a:t>
+            </a:r>
+            <a:r>
+              <a:rPr lang="en-US" b="1" dirty="0">
+                <a:solidFill>
+                  <a:schemeClr val="tx2"/>
+                </a:solidFill>
+              </a:rPr>
+              <a:t>: Are you being a good steward of the resources?</a:t>
+            </a:r>
+          </a:p>
+          <a:p>
+            <a:r>
+              <a:rPr lang="en-US" b="1" u="sng" dirty="0">
+                <a:solidFill>
+                  <a:schemeClr val="tx2"/>
+                </a:solidFill>
+              </a:rPr>
+              <a:t>Your concern</a:t>
+            </a:r>
+            <a:r>
+              <a:rPr lang="en-US" b="1" dirty="0">
+                <a:solidFill>
+                  <a:schemeClr val="tx2"/>
+                </a:solidFill>
+              </a:rPr>
+              <a:t>: Are you getting the most science possible out of your work (aka scientific productivity)?</a:t>
             </a:r>
           </a:p>
         </p:txBody>
       </p:sp>
-      <p:sp>
-        <p:nvSpPr>
-          <p:cNvPr id="7" name="Content Placeholder 6"/>
-          <p:cNvSpPr>
-            <a:spLocks noGrp="1"/>
-          </p:cNvSpPr>
-          <p:nvPr>
-            <p:ph sz="half" idx="2"/>
-          </p:nvPr>
-        </p:nvSpPr>
+      <p:pic>
+        <p:nvPicPr>
+          <p:cNvPr id="8" name="Picture 7">
+            <a:extLst>
+              <a:ext uri="{FF2B5EF4-FFF2-40B4-BE49-F238E27FC236}">
+                <a16:creationId xmlns:a16="http://schemas.microsoft.com/office/drawing/2014/main" id="{CBF1AD80-AE63-444B-8CCE-A328E711D223}"/>
+              </a:ext>
+            </a:extLst>
+          </p:cNvPr>
+          <p:cNvPicPr>
+            <a:picLocks noChangeAspect="1"/>
+          </p:cNvPicPr>
+          <p:nvPr/>
+        </p:nvPicPr>
+        <p:blipFill>
+          <a:blip r:embed="rId2"/>
+          <a:stretch>
+            <a:fillRect/>
+          </a:stretch>
+        </p:blipFill>
         <p:spPr>
           <a:xfrm>
-            <a:off x="365760" y="2043782"/>
-            <a:ext cx="5588582" cy="3702110"/>
+            <a:off x="8190744" y="2236185"/>
+            <a:ext cx="3703320" cy="1851660"/>
           </a:xfrm>
+          <a:prstGeom prst="rect">
+            <a:avLst/>
+          </a:prstGeom>
         </p:spPr>
-        <p:txBody>
-          <a:bodyPr>
-            <a:normAutofit lnSpcReduction="10000"/>
-          </a:bodyPr>
-          <a:lstStyle/>
-          <a:p>
-            <a:r>
-              <a:rPr lang="en-US" sz="2400" dirty="0"/>
-              <a:t>All parts of the model and software system can be under research</a:t>
-            </a:r>
-          </a:p>
-          <a:p>
-            <a:r>
-              <a:rPr lang="en-US" sz="2400" dirty="0"/>
-              <a:t>Requirements change throughout the lifecycle as knowledge grows</a:t>
-            </a:r>
-          </a:p>
-          <a:p>
-            <a:r>
-              <a:rPr lang="en-US" sz="2400" dirty="0"/>
-              <a:t>Verification complicated by floating point representation</a:t>
-            </a:r>
-          </a:p>
-          <a:p>
-            <a:r>
-              <a:rPr lang="en-US" sz="2400" dirty="0"/>
-              <a:t>Real world is messy, so is the software</a:t>
-            </a:r>
-          </a:p>
-          <a:p>
-            <a:r>
-              <a:rPr lang="en-US" sz="2400" dirty="0"/>
-              <a:t>Increasing architectural diversity</a:t>
-            </a:r>
-          </a:p>
-          <a:p>
-            <a:endParaRPr lang="en-US" sz="2400" dirty="0"/>
-          </a:p>
-          <a:p>
-            <a:endParaRPr lang="en-US" sz="2400" dirty="0"/>
-          </a:p>
-          <a:p>
-            <a:endParaRPr lang="en-US" sz="2400" dirty="0"/>
-          </a:p>
-        </p:txBody>
-      </p:sp>
-      <p:sp>
-        <p:nvSpPr>
-          <p:cNvPr id="6" name="Text Placeholder 5"/>
-          <p:cNvSpPr>
-            <a:spLocks noGrp="1"/>
-          </p:cNvSpPr>
-          <p:nvPr>
-            <p:ph type="body" sz="quarter" idx="3"/>
-          </p:nvPr>
-        </p:nvSpPr>
+      </p:pic>
+      <p:pic>
+        <p:nvPicPr>
+          <p:cNvPr id="9" name="Picture 4" descr="Image result for olcf frontier images">
+            <a:extLst>
+              <a:ext uri="{FF2B5EF4-FFF2-40B4-BE49-F238E27FC236}">
+                <a16:creationId xmlns:a16="http://schemas.microsoft.com/office/drawing/2014/main" id="{96E8923D-49A5-47B3-89A0-1F0743A5BE5A}"/>
+              </a:ext>
+            </a:extLst>
+          </p:cNvPr>
+          <p:cNvPicPr>
+            <a:picLocks noChangeAspect="1" noChangeArrowheads="1"/>
+          </p:cNvPicPr>
+          <p:nvPr/>
+        </p:nvPicPr>
+        <p:blipFill>
+          <a:blip r:embed="rId3" cstate="print">
+            <a:extLst>
+              <a:ext uri="{28A0092B-C50C-407E-A947-70E740481C1C}">
+                <a14:useLocalDpi xmlns:a14="http://schemas.microsoft.com/office/drawing/2010/main" val="0"/>
+              </a:ext>
+            </a:extLst>
+          </a:blip>
+          <a:srcRect/>
+          <a:stretch>
+            <a:fillRect/>
+          </a:stretch>
+        </p:blipFill>
+        <p:spPr bwMode="auto">
+          <a:xfrm>
+            <a:off x="8115754" y="739566"/>
+            <a:ext cx="3707315" cy="1611330"/>
+          </a:xfrm>
+          <a:prstGeom prst="rect">
+            <a:avLst/>
+          </a:prstGeom>
+          <a:noFill/>
+          <a:extLst>
+            <a:ext uri="{909E8E84-426E-40DD-AFC4-6F175D3DCCD1}">
+              <a14:hiddenFill xmlns:a14="http://schemas.microsoft.com/office/drawing/2010/main">
+                <a:solidFill>
+                  <a:srgbClr val="FFFFFF"/>
+                </a:solidFill>
+              </a14:hiddenFill>
+            </a:ext>
+          </a:extLst>
+        </p:spPr>
+      </p:pic>
+      <p:pic>
+        <p:nvPicPr>
+          <p:cNvPr id="7" name="Content Placeholder 3">
+            <a:extLst>
+              <a:ext uri="{FF2B5EF4-FFF2-40B4-BE49-F238E27FC236}">
+                <a16:creationId xmlns:a16="http://schemas.microsoft.com/office/drawing/2014/main" id="{3352E1D0-7C38-486F-8113-805BA100DA8B}"/>
+              </a:ext>
+            </a:extLst>
+          </p:cNvPr>
+          <p:cNvPicPr>
+            <a:picLocks noChangeAspect="1"/>
+          </p:cNvPicPr>
+          <p:nvPr/>
+        </p:nvPicPr>
+        <p:blipFill>
+          <a:blip r:embed="rId4"/>
+          <a:stretch>
+            <a:fillRect/>
+          </a:stretch>
+        </p:blipFill>
         <p:spPr>
           <a:xfrm>
-            <a:off x="6191755" y="1163920"/>
-            <a:ext cx="5531934" cy="821190"/>
+            <a:off x="8190744" y="3973133"/>
+            <a:ext cx="3703320" cy="1902581"/>
           </a:xfrm>
+          <a:prstGeom prst="rect">
+            <a:avLst/>
+          </a:prstGeom>
         </p:spPr>
-        <p:txBody>
-          <a:bodyPr/>
-          <a:lstStyle/>
-          <a:p>
-            <a:r>
-              <a:rPr lang="en-US" sz="2800" dirty="0"/>
-              <a:t>Sociological</a:t>
-            </a:r>
-          </a:p>
-        </p:txBody>
-      </p:sp>
-      <p:sp>
-        <p:nvSpPr>
-          <p:cNvPr id="8" name="Content Placeholder 7"/>
-          <p:cNvSpPr>
-            <a:spLocks noGrp="1"/>
-          </p:cNvSpPr>
-          <p:nvPr>
-            <p:ph sz="quarter" idx="4"/>
-          </p:nvPr>
-        </p:nvSpPr>
-        <p:spPr>
-          <a:xfrm>
-            <a:off x="6191755" y="2043782"/>
-            <a:ext cx="5531934" cy="3702110"/>
-          </a:xfrm>
-        </p:spPr>
-        <p:txBody>
-          <a:bodyPr/>
-          <a:lstStyle/>
-          <a:p>
-            <a:r>
-              <a:rPr lang="en-US" sz="2400" dirty="0"/>
-              <a:t>Competing priorities and incentives</a:t>
-            </a:r>
-          </a:p>
-          <a:p>
-            <a:pPr lvl="1"/>
-            <a:r>
-              <a:rPr lang="en-US" sz="2200" dirty="0"/>
-              <a:t>Sponsors often care more about scientific publications than software per se</a:t>
-            </a:r>
-          </a:p>
-          <a:p>
-            <a:r>
-              <a:rPr lang="en-US" sz="2400" dirty="0"/>
-              <a:t>Limited resources </a:t>
-            </a:r>
-          </a:p>
-          <a:p>
-            <a:r>
-              <a:rPr lang="en-US" sz="2400" dirty="0"/>
-              <a:t>Need for interdisciplinary interactions</a:t>
-            </a:r>
-          </a:p>
-          <a:p>
-            <a:pPr lvl="1"/>
-            <a:r>
-              <a:rPr lang="en-US" sz="2200" dirty="0"/>
-              <a:t>Many different kinds of expertise to be successful</a:t>
-            </a:r>
-          </a:p>
-          <a:p>
-            <a:endParaRPr lang="en-US" sz="2400" dirty="0"/>
-          </a:p>
-        </p:txBody>
-      </p:sp>
+      </p:pic>
     </p:spTree>
     <p:extLst>
       <p:ext uri="{BB962C8B-B14F-4D97-AF65-F5344CB8AC3E}">
-        <p14:creationId xmlns:p14="http://schemas.microsoft.com/office/powerpoint/2010/main" val="3957161676"/>
+        <p14:creationId xmlns:p14="http://schemas.microsoft.com/office/powerpoint/2010/main" val="3897380864"/>
       </p:ext>
     </p:extLst>
   </p:cSld>
@@ -9487,12 +12535,9 @@
 </file>
 
 <file path=customXml/item1.xml><?xml version="1.0" encoding="utf-8"?>
-<?mso-contentType ?>
-<FormTemplates xmlns="http://schemas.microsoft.com/sharepoint/v3/contenttype/forms">
-  <Display>DocumentLibraryForm</Display>
-  <Edit>DocumentLibraryForm</Edit>
-  <New>DocumentLibraryForm</New>
-</FormTemplates>
+<p:properties xmlns:p="http://schemas.microsoft.com/office/2006/metadata/properties" xmlns:xsi="http://www.w3.org/2001/XMLSchema-instance" xmlns:pc="http://schemas.microsoft.com/office/infopath/2007/PartnerControls">
+  <documentManagement/>
+</p:properties>
 </file>
 
 <file path=customXml/item2.xml><?xml version="1.0" encoding="utf-8"?>
@@ -9545,15 +12590,25 @@
 </file>
 
 <file path=customXml/item3.xml><?xml version="1.0" encoding="utf-8"?>
-<p:properties xmlns:p="http://schemas.microsoft.com/office/2006/metadata/properties" xmlns:xsi="http://www.w3.org/2001/XMLSchema-instance" xmlns:pc="http://schemas.microsoft.com/office/infopath/2007/PartnerControls">
-  <documentManagement/>
-</p:properties>
+<?mso-contentType ?>
+<FormTemplates xmlns="http://schemas.microsoft.com/sharepoint/v3/contenttype/forms">
+  <Display>DocumentLibraryForm</Display>
+  <Edit>DocumentLibraryForm</Edit>
+  <New>DocumentLibraryForm</New>
+</FormTemplates>
 </file>
 
 <file path=customXml/itemProps1.xml><?xml version="1.0" encoding="utf-8"?>
-<ds:datastoreItem xmlns:ds="http://schemas.openxmlformats.org/officeDocument/2006/customXml" ds:itemID="{19E20559-B232-4371-8690-E3D8007EDB82}">
+<ds:datastoreItem xmlns:ds="http://schemas.openxmlformats.org/officeDocument/2006/customXml" ds:itemID="{A50EC660-24D0-43A0-AE5E-E274115E726B}">
   <ds:schemaRefs>
-    <ds:schemaRef ds:uri="http://schemas.microsoft.com/sharepoint/v3/contenttype/forms"/>
+    <ds:schemaRef ds:uri="http://purl.org/dc/elements/1.1/"/>
+    <ds:schemaRef ds:uri="http://schemas.microsoft.com/office/2006/metadata/properties"/>
+    <ds:schemaRef ds:uri="http://purl.org/dc/terms/"/>
+    <ds:schemaRef ds:uri="http://schemas.openxmlformats.org/package/2006/metadata/core-properties"/>
+    <ds:schemaRef ds:uri="http://schemas.microsoft.com/office/2006/documentManagement/types"/>
+    <ds:schemaRef ds:uri="http://www.w3.org/XML/1998/namespace"/>
+    <ds:schemaRef ds:uri="http://purl.org/dc/dcmitype/"/>
+    <ds:schemaRef ds:uri="http://schemas.microsoft.com/office/infopath/2007/PartnerControls"/>
   </ds:schemaRefs>
 </ds:datastoreItem>
 </file>
@@ -9574,16 +12629,9 @@
 </file>
 
 <file path=customXml/itemProps3.xml><?xml version="1.0" encoding="utf-8"?>
-<ds:datastoreItem xmlns:ds="http://schemas.openxmlformats.org/officeDocument/2006/customXml" ds:itemID="{A50EC660-24D0-43A0-AE5E-E274115E726B}">
+<ds:datastoreItem xmlns:ds="http://schemas.openxmlformats.org/officeDocument/2006/customXml" ds:itemID="{19E20559-B232-4371-8690-E3D8007EDB82}">
   <ds:schemaRefs>
-    <ds:schemaRef ds:uri="http://purl.org/dc/elements/1.1/"/>
-    <ds:schemaRef ds:uri="http://schemas.microsoft.com/office/2006/metadata/properties"/>
-    <ds:schemaRef ds:uri="http://purl.org/dc/terms/"/>
-    <ds:schemaRef ds:uri="http://schemas.openxmlformats.org/package/2006/metadata/core-properties"/>
-    <ds:schemaRef ds:uri="http://schemas.microsoft.com/office/2006/documentManagement/types"/>
-    <ds:schemaRef ds:uri="http://www.w3.org/XML/1998/namespace"/>
-    <ds:schemaRef ds:uri="http://purl.org/dc/dcmitype/"/>
-    <ds:schemaRef ds:uri="http://schemas.microsoft.com/office/infopath/2007/PartnerControls"/>
+    <ds:schemaRef ds:uri="http://schemas.microsoft.com/sharepoint/v3/contenttype/forms"/>
   </ds:schemaRefs>
 </ds:datastoreItem>
 </file>
</xml_diff>

<commit_message>
Minor change on overview
</commit_message>
<xml_diff>
--- a/overview.pptx
+++ b/overview.pptx
@@ -277,7 +277,7 @@
           <a:p>
             <a:fld id="{0B842F42-2CE9-4E35-95C1-410DC08A50B1}" type="datetimeFigureOut">
               <a:rPr lang="en-US" smtClean="0"/>
-              <a:t>9/2/2021</a:t>
+              <a:t>9/17/21</a:t>
             </a:fld>
             <a:endParaRPr lang="en-US"/>
           </a:p>
@@ -442,7 +442,7 @@
           <a:p>
             <a:fld id="{6F282904-F315-4730-8D91-37D99E141A6F}" type="datetimeFigureOut">
               <a:rPr lang="en-US" smtClean="0"/>
-              <a:t>9/2/2021</a:t>
+              <a:t>9/17/21</a:t>
             </a:fld>
             <a:endParaRPr lang="en-US"/>
           </a:p>
@@ -755,6 +755,93 @@
           <a:p>
             <a:r>
               <a:rPr lang="en-US" dirty="0"/>
+              <a:t>Fundamental message</a:t>
+            </a:r>
+          </a:p>
+        </p:txBody>
+      </p:sp>
+      <p:sp>
+        <p:nvSpPr>
+          <p:cNvPr id="4" name="Slide Number Placeholder 3"/>
+          <p:cNvSpPr>
+            <a:spLocks noGrp="1"/>
+          </p:cNvSpPr>
+          <p:nvPr>
+            <p:ph type="sldNum" sz="quarter" idx="5"/>
+          </p:nvPr>
+        </p:nvSpPr>
+        <p:spPr/>
+        <p:txBody>
+          <a:bodyPr/>
+          <a:lstStyle/>
+          <a:p>
+            <a:fld id="{54E672D7-8E2D-4611-973D-F4591A707C34}" type="slidenum">
+              <a:rPr lang="en-US" smtClean="0"/>
+              <a:t>3</a:t>
+            </a:fld>
+            <a:endParaRPr lang="en-US"/>
+          </a:p>
+        </p:txBody>
+      </p:sp>
+    </p:spTree>
+    <p:extLst>
+      <p:ext uri="{BB962C8B-B14F-4D97-AF65-F5344CB8AC3E}">
+        <p14:creationId xmlns:p14="http://schemas.microsoft.com/office/powerpoint/2010/main" val="4262156251"/>
+      </p:ext>
+    </p:extLst>
+  </p:cSld>
+  <p:clrMapOvr>
+    <a:masterClrMapping/>
+  </p:clrMapOvr>
+</p:notes>
+</file>
+
+<file path=ppt/notesSlides/notesSlide2.xml><?xml version="1.0" encoding="utf-8"?>
+<p:notes xmlns:a="http://schemas.openxmlformats.org/drawingml/2006/main" xmlns:r="http://schemas.openxmlformats.org/officeDocument/2006/relationships" xmlns:p="http://schemas.openxmlformats.org/presentationml/2006/main">
+  <p:cSld>
+    <p:spTree>
+      <p:nvGrpSpPr>
+        <p:cNvPr id="1" name=""/>
+        <p:cNvGrpSpPr/>
+        <p:nvPr/>
+      </p:nvGrpSpPr>
+      <p:grpSpPr>
+        <a:xfrm>
+          <a:off x="0" y="0"/>
+          <a:ext cx="0" cy="0"/>
+          <a:chOff x="0" y="0"/>
+          <a:chExt cx="0" cy="0"/>
+        </a:xfrm>
+      </p:grpSpPr>
+      <p:sp>
+        <p:nvSpPr>
+          <p:cNvPr id="2" name="Slide Image Placeholder 1"/>
+          <p:cNvSpPr>
+            <a:spLocks noGrp="1" noRot="1" noChangeAspect="1"/>
+          </p:cNvSpPr>
+          <p:nvPr>
+            <p:ph type="sldImg"/>
+          </p:nvPr>
+        </p:nvSpPr>
+        <p:spPr/>
+      </p:sp>
+      <p:sp>
+        <p:nvSpPr>
+          <p:cNvPr id="3" name="Notes Placeholder 2"/>
+          <p:cNvSpPr>
+            <a:spLocks noGrp="1"/>
+          </p:cNvSpPr>
+          <p:nvPr>
+            <p:ph type="body" idx="1"/>
+          </p:nvPr>
+        </p:nvSpPr>
+        <p:spPr/>
+        <p:txBody>
+          <a:bodyPr/>
+          <a:lstStyle/>
+          <a:p>
+            <a:r>
+              <a:rPr lang="en-US" dirty="0"/>
               <a:t>Numerical models</a:t>
             </a:r>
           </a:p>
@@ -796,7 +883,7 @@
 </p:notes>
 </file>
 
-<file path=ppt/notesSlides/notesSlide2.xml><?xml version="1.0" encoding="utf-8"?>
+<file path=ppt/notesSlides/notesSlide3.xml><?xml version="1.0" encoding="utf-8"?>
 <p:notes xmlns:a="http://schemas.openxmlformats.org/drawingml/2006/main" xmlns:r="http://schemas.openxmlformats.org/officeDocument/2006/relationships" xmlns:p="http://schemas.openxmlformats.org/presentationml/2006/main">
   <p:cSld>
     <p:spTree>
@@ -12242,7 +12329,7 @@
             <a:pPr lvl="1"/>
             <a:r>
               <a:rPr lang="en-US" sz="2200" dirty="0"/>
-              <a:t>Balancing development and maintenance</a:t>
+              <a:t>Balancing development and maintenance with research</a:t>
             </a:r>
           </a:p>
           <a:p>
@@ -14292,6 +14379,21 @@
 </file>
 
 <file path=customXml/item1.xml><?xml version="1.0" encoding="utf-8"?>
+<?mso-contentType ?>
+<FormTemplates xmlns="http://schemas.microsoft.com/sharepoint/v3/contenttype/forms">
+  <Display>DocumentLibraryForm</Display>
+  <Edit>DocumentLibraryForm</Edit>
+  <New>DocumentLibraryForm</New>
+</FormTemplates>
+</file>
+
+<file path=customXml/item2.xml><?xml version="1.0" encoding="utf-8"?>
+<p:properties xmlns:p="http://schemas.microsoft.com/office/2006/metadata/properties" xmlns:xsi="http://www.w3.org/2001/XMLSchema-instance" xmlns:pc="http://schemas.microsoft.com/office/infopath/2007/PartnerControls">
+  <documentManagement/>
+</p:properties>
+</file>
+
+<file path=customXml/item3.xml><?xml version="1.0" encoding="utf-8"?>
 <ct:contentTypeSchema xmlns:ct="http://schemas.microsoft.com/office/2006/metadata/contentType" xmlns:ma="http://schemas.microsoft.com/office/2006/metadata/properties/metaAttributes" ct:_="" ma:_="" ma:contentTypeName="Document" ma:contentTypeID="0x010100565464437F680748A68B85EB6594EA7D" ma:contentTypeVersion="0" ma:contentTypeDescription="Create a new document." ma:contentTypeScope="" ma:versionID="fe3f4dd58d5914c51cfc6deaa8ad845c">
   <xsd:schema xmlns:xsd="http://www.w3.org/2001/XMLSchema" xmlns:p="http://schemas.microsoft.com/office/2006/metadata/properties" targetNamespace="http://schemas.microsoft.com/office/2006/metadata/properties" ma:root="true" ma:fieldsID="4aeb20c0e3442673af7ee10786458764">
     <xsd:element name="properties">
@@ -14340,32 +14442,10 @@
 </ct:contentTypeSchema>
 </file>
 
-<file path=customXml/item2.xml><?xml version="1.0" encoding="utf-8"?>
-<p:properties xmlns:p="http://schemas.microsoft.com/office/2006/metadata/properties" xmlns:xsi="http://www.w3.org/2001/XMLSchema-instance" xmlns:pc="http://schemas.microsoft.com/office/infopath/2007/PartnerControls">
-  <documentManagement/>
-</p:properties>
-</file>
-
-<file path=customXml/item3.xml><?xml version="1.0" encoding="utf-8"?>
-<?mso-contentType ?>
-<FormTemplates xmlns="http://schemas.microsoft.com/sharepoint/v3/contenttype/forms">
-  <Display>DocumentLibraryForm</Display>
-  <Edit>DocumentLibraryForm</Edit>
-  <New>DocumentLibraryForm</New>
-</FormTemplates>
-</file>
-
 <file path=customXml/itemProps1.xml><?xml version="1.0" encoding="utf-8"?>
-<ds:datastoreItem xmlns:ds="http://schemas.openxmlformats.org/officeDocument/2006/customXml" ds:itemID="{E8DB7DEB-074E-4EE8-9B6E-FD277323109C}">
+<ds:datastoreItem xmlns:ds="http://schemas.openxmlformats.org/officeDocument/2006/customXml" ds:itemID="{19E20559-B232-4371-8690-E3D8007EDB82}">
   <ds:schemaRefs>
-    <ds:schemaRef ds:uri="http://schemas.microsoft.com/office/2006/metadata/contentType"/>
-    <ds:schemaRef ds:uri="http://schemas.microsoft.com/office/2006/metadata/properties/metaAttributes"/>
-    <ds:schemaRef ds:uri="http://www.w3.org/2001/XMLSchema"/>
-    <ds:schemaRef ds:uri="http://schemas.microsoft.com/office/2006/metadata/properties"/>
-    <ds:schemaRef ds:uri="http://schemas.openxmlformats.org/package/2006/metadata/core-properties"/>
-    <ds:schemaRef ds:uri="http://purl.org/dc/elements/1.1/"/>
-    <ds:schemaRef ds:uri="http://purl.org/dc/terms/"/>
-    <ds:schemaRef ds:uri="http://schemas.microsoft.com/office/internal/2005/internalDocumentation"/>
+    <ds:schemaRef ds:uri="http://schemas.microsoft.com/sharepoint/v3/contenttype/forms"/>
   </ds:schemaRefs>
 </ds:datastoreItem>
 </file>
@@ -14386,9 +14466,16 @@
 </file>
 
 <file path=customXml/itemProps3.xml><?xml version="1.0" encoding="utf-8"?>
-<ds:datastoreItem xmlns:ds="http://schemas.openxmlformats.org/officeDocument/2006/customXml" ds:itemID="{19E20559-B232-4371-8690-E3D8007EDB82}">
+<ds:datastoreItem xmlns:ds="http://schemas.openxmlformats.org/officeDocument/2006/customXml" ds:itemID="{E8DB7DEB-074E-4EE8-9B6E-FD277323109C}">
   <ds:schemaRefs>
-    <ds:schemaRef ds:uri="http://schemas.microsoft.com/sharepoint/v3/contenttype/forms"/>
+    <ds:schemaRef ds:uri="http://schemas.microsoft.com/office/2006/metadata/contentType"/>
+    <ds:schemaRef ds:uri="http://schemas.microsoft.com/office/2006/metadata/properties/metaAttributes"/>
+    <ds:schemaRef ds:uri="http://www.w3.org/2001/XMLSchema"/>
+    <ds:schemaRef ds:uri="http://schemas.microsoft.com/office/2006/metadata/properties"/>
+    <ds:schemaRef ds:uri="http://schemas.openxmlformats.org/package/2006/metadata/core-properties"/>
+    <ds:schemaRef ds:uri="http://purl.org/dc/elements/1.1/"/>
+    <ds:schemaRef ds:uri="http://purl.org/dc/terms/"/>
+    <ds:schemaRef ds:uri="http://schemas.microsoft.com/office/internal/2005/internalDocumentation"/>
   </ds:schemaRefs>
 </ds:datastoreItem>
 </file>
</xml_diff>

<commit_message>
Add LANL release number
</commit_message>
<xml_diff>
--- a/overview.pptx
+++ b/overview.pptx
@@ -277,7 +277,7 @@
           <a:p>
             <a:fld id="{0B842F42-2CE9-4E35-95C1-410DC08A50B1}" type="datetimeFigureOut">
               <a:rPr lang="en-US" smtClean="0"/>
-              <a:t>10/3/2021</a:t>
+              <a:t>10/4/2021</a:t>
             </a:fld>
             <a:endParaRPr lang="en-US"/>
           </a:p>
@@ -442,7 +442,7 @@
           <a:p>
             <a:fld id="{6F282904-F315-4730-8D91-37D99E141A6F}" type="datetimeFigureOut">
               <a:rPr lang="en-US" smtClean="0"/>
-              <a:t>10/3/2021</a:t>
+              <a:t>10/4/2021</a:t>
             </a:fld>
             <a:endParaRPr lang="en-US"/>
           </a:p>
@@ -4433,6 +4433,42 @@
               <a:rPr lang="en-US" sz="2000" dirty="0"/>
               <a:t>Contributors: David E. Bernholdt (ORNL), Anshu Dubey (ANL), Patricia A. Grubel (LANL), Katherine M. Riley (ANL)</a:t>
             </a:r>
+          </a:p>
+        </p:txBody>
+      </p:sp>
+      <p:sp>
+        <p:nvSpPr>
+          <p:cNvPr id="6" name="TextBox 5">
+            <a:extLst>
+              <a:ext uri="{FF2B5EF4-FFF2-40B4-BE49-F238E27FC236}">
+                <a16:creationId xmlns:a16="http://schemas.microsoft.com/office/drawing/2014/main" id="{2957E4F5-261D-4139-8685-A19C87EC40CF}"/>
+              </a:ext>
+            </a:extLst>
+          </p:cNvPr>
+          <p:cNvSpPr txBox="1"/>
+          <p:nvPr/>
+        </p:nvSpPr>
+        <p:spPr>
+          <a:xfrm>
+            <a:off x="10855922" y="5899980"/>
+            <a:ext cx="1332903" cy="276999"/>
+          </a:xfrm>
+          <a:prstGeom prst="rect">
+            <a:avLst/>
+          </a:prstGeom>
+          <a:noFill/>
+        </p:spPr>
+        <p:txBody>
+          <a:bodyPr wrap="square">
+            <a:spAutoFit/>
+          </a:bodyPr>
+          <a:lstStyle/>
+          <a:p>
+            <a:r>
+              <a:rPr lang="en-US" sz="1200"/>
+              <a:t>LA-UR-21-29819</a:t>
+            </a:r>
+            <a:endParaRPr lang="en-US" sz="1200" dirty="0"/>
           </a:p>
         </p:txBody>
       </p:sp>
@@ -14563,6 +14599,21 @@
 </file>
 
 <file path=customXml/item1.xml><?xml version="1.0" encoding="utf-8"?>
+<?mso-contentType ?>
+<FormTemplates xmlns="http://schemas.microsoft.com/sharepoint/v3/contenttype/forms">
+  <Display>DocumentLibraryForm</Display>
+  <Edit>DocumentLibraryForm</Edit>
+  <New>DocumentLibraryForm</New>
+</FormTemplates>
+</file>
+
+<file path=customXml/item2.xml><?xml version="1.0" encoding="utf-8"?>
+<p:properties xmlns:p="http://schemas.microsoft.com/office/2006/metadata/properties" xmlns:xsi="http://www.w3.org/2001/XMLSchema-instance" xmlns:pc="http://schemas.microsoft.com/office/infopath/2007/PartnerControls">
+  <documentManagement/>
+</p:properties>
+</file>
+
+<file path=customXml/item3.xml><?xml version="1.0" encoding="utf-8"?>
 <ct:contentTypeSchema xmlns:ct="http://schemas.microsoft.com/office/2006/metadata/contentType" xmlns:ma="http://schemas.microsoft.com/office/2006/metadata/properties/metaAttributes" ct:_="" ma:_="" ma:contentTypeName="Document" ma:contentTypeID="0x010100565464437F680748A68B85EB6594EA7D" ma:contentTypeVersion="0" ma:contentTypeDescription="Create a new document." ma:contentTypeScope="" ma:versionID="fe3f4dd58d5914c51cfc6deaa8ad845c">
   <xsd:schema xmlns:xsd="http://www.w3.org/2001/XMLSchema" xmlns:p="http://schemas.microsoft.com/office/2006/metadata/properties" targetNamespace="http://schemas.microsoft.com/office/2006/metadata/properties" ma:root="true" ma:fieldsID="4aeb20c0e3442673af7ee10786458764">
     <xsd:element name="properties">
@@ -14611,32 +14662,10 @@
 </ct:contentTypeSchema>
 </file>
 
-<file path=customXml/item2.xml><?xml version="1.0" encoding="utf-8"?>
-<p:properties xmlns:p="http://schemas.microsoft.com/office/2006/metadata/properties" xmlns:xsi="http://www.w3.org/2001/XMLSchema-instance" xmlns:pc="http://schemas.microsoft.com/office/infopath/2007/PartnerControls">
-  <documentManagement/>
-</p:properties>
-</file>
-
-<file path=customXml/item3.xml><?xml version="1.0" encoding="utf-8"?>
-<?mso-contentType ?>
-<FormTemplates xmlns="http://schemas.microsoft.com/sharepoint/v3/contenttype/forms">
-  <Display>DocumentLibraryForm</Display>
-  <Edit>DocumentLibraryForm</Edit>
-  <New>DocumentLibraryForm</New>
-</FormTemplates>
-</file>
-
 <file path=customXml/itemProps1.xml><?xml version="1.0" encoding="utf-8"?>
-<ds:datastoreItem xmlns:ds="http://schemas.openxmlformats.org/officeDocument/2006/customXml" ds:itemID="{E8DB7DEB-074E-4EE8-9B6E-FD277323109C}">
+<ds:datastoreItem xmlns:ds="http://schemas.openxmlformats.org/officeDocument/2006/customXml" ds:itemID="{19E20559-B232-4371-8690-E3D8007EDB82}">
   <ds:schemaRefs>
-    <ds:schemaRef ds:uri="http://schemas.microsoft.com/office/2006/metadata/contentType"/>
-    <ds:schemaRef ds:uri="http://schemas.microsoft.com/office/2006/metadata/properties/metaAttributes"/>
-    <ds:schemaRef ds:uri="http://www.w3.org/2001/XMLSchema"/>
-    <ds:schemaRef ds:uri="http://schemas.microsoft.com/office/2006/metadata/properties"/>
-    <ds:schemaRef ds:uri="http://schemas.openxmlformats.org/package/2006/metadata/core-properties"/>
-    <ds:schemaRef ds:uri="http://purl.org/dc/elements/1.1/"/>
-    <ds:schemaRef ds:uri="http://purl.org/dc/terms/"/>
-    <ds:schemaRef ds:uri="http://schemas.microsoft.com/office/internal/2005/internalDocumentation"/>
+    <ds:schemaRef ds:uri="http://schemas.microsoft.com/sharepoint/v3/contenttype/forms"/>
   </ds:schemaRefs>
 </ds:datastoreItem>
 </file>
@@ -14657,9 +14686,16 @@
 </file>
 
 <file path=customXml/itemProps3.xml><?xml version="1.0" encoding="utf-8"?>
-<ds:datastoreItem xmlns:ds="http://schemas.openxmlformats.org/officeDocument/2006/customXml" ds:itemID="{19E20559-B232-4371-8690-E3D8007EDB82}">
+<ds:datastoreItem xmlns:ds="http://schemas.openxmlformats.org/officeDocument/2006/customXml" ds:itemID="{E8DB7DEB-074E-4EE8-9B6E-FD277323109C}">
   <ds:schemaRefs>
-    <ds:schemaRef ds:uri="http://schemas.microsoft.com/sharepoint/v3/contenttype/forms"/>
+    <ds:schemaRef ds:uri="http://schemas.microsoft.com/office/2006/metadata/contentType"/>
+    <ds:schemaRef ds:uri="http://schemas.microsoft.com/office/2006/metadata/properties/metaAttributes"/>
+    <ds:schemaRef ds:uri="http://www.w3.org/2001/XMLSchema"/>
+    <ds:schemaRef ds:uri="http://schemas.microsoft.com/office/2006/metadata/properties"/>
+    <ds:schemaRef ds:uri="http://schemas.openxmlformats.org/package/2006/metadata/core-properties"/>
+    <ds:schemaRef ds:uri="http://purl.org/dc/elements/1.1/"/>
+    <ds:schemaRef ds:uri="http://purl.org/dc/terms/"/>
+    <ds:schemaRef ds:uri="http://schemas.microsoft.com/office/internal/2005/internalDocumentation"/>
   </ds:schemaRefs>
 </ds:datastoreItem>
 </file>
</xml_diff>

<commit_message>
Add revised agenda to overview
</commit_message>
<xml_diff>
--- a/overview.pptx
+++ b/overview.pptx
@@ -32,7 +32,7 @@
     <p:sldId id="1857" r:id="rId23"/>
     <p:sldId id="1845" r:id="rId24"/>
     <p:sldId id="1858" r:id="rId25"/>
-    <p:sldId id="260" r:id="rId26"/>
+    <p:sldId id="1861" r:id="rId26"/>
     <p:sldId id="1860" r:id="rId27"/>
   </p:sldIdLst>
   <p:sldSz cx="12188825" cy="6858000"/>
@@ -277,7 +277,7 @@
           <a:p>
             <a:fld id="{0B842F42-2CE9-4E35-95C1-410DC08A50B1}" type="datetimeFigureOut">
               <a:rPr lang="en-US" smtClean="0"/>
-              <a:t>10/4/2021</a:t>
+              <a:t>10/13/21</a:t>
             </a:fld>
             <a:endParaRPr lang="en-US"/>
           </a:p>
@@ -442,7 +442,7 @@
           <a:p>
             <a:fld id="{6F282904-F315-4730-8D91-37D99E141A6F}" type="datetimeFigureOut">
               <a:rPr lang="en-US" smtClean="0"/>
-              <a:t>10/4/2021</a:t>
+              <a:t>10/13/21</a:t>
             </a:fld>
             <a:endParaRPr lang="en-US"/>
           </a:p>
@@ -9790,7 +9790,7 @@
         </p:nvGraphicFramePr>
         <p:xfrm>
           <a:off x="365759" y="1030431"/>
-          <a:ext cx="11372473" cy="4815840"/>
+          <a:ext cx="11372473" cy="5242560"/>
         </p:xfrm>
         <a:graphic>
           <a:graphicData uri="http://schemas.openxmlformats.org/drawingml/2006/table">
@@ -9908,7 +9908,7 @@
                         <a:rPr lang="en-US" dirty="0">
                           <a:effectLst/>
                         </a:rPr>
-                        <a:t>8:30 AM</a:t>
+                        <a:t>8:00 AM</a:t>
                       </a:r>
                     </a:p>
                   </a:txBody>
@@ -9974,10 +9974,10 @@
                     <a:p>
                       <a:pPr algn="r"/>
                       <a:r>
-                        <a:rPr lang="en-US">
+                        <a:rPr lang="en-US" dirty="0">
                           <a:effectLst/>
                         </a:rPr>
-                        <a:t>8:40 AM</a:t>
+                        <a:t>8:10 AM</a:t>
                       </a:r>
                     </a:p>
                   </a:txBody>
@@ -10043,10 +10043,10 @@
                     <a:p>
                       <a:pPr algn="r"/>
                       <a:r>
-                        <a:rPr lang="en-US">
+                        <a:rPr lang="en-US" dirty="0">
                           <a:effectLst/>
                         </a:rPr>
-                        <a:t>9:00 AM</a:t>
+                        <a:t>8:30 AM</a:t>
                       </a:r>
                     </a:p>
                   </a:txBody>
@@ -10112,10 +10112,10 @@
                     <a:p>
                       <a:pPr algn="r"/>
                       <a:r>
-                        <a:rPr lang="en-US">
+                        <a:rPr lang="en-US" dirty="0">
                           <a:effectLst/>
                         </a:rPr>
-                        <a:t>9:30 AM</a:t>
+                        <a:t>9:00 AM</a:t>
                       </a:r>
                     </a:p>
                   </a:txBody>
@@ -10181,7 +10181,76 @@
                     <a:p>
                       <a:pPr algn="r"/>
                       <a:r>
-                        <a:rPr lang="en-US">
+                        <a:rPr lang="en-US" dirty="0">
+                          <a:effectLst/>
+                        </a:rPr>
+                        <a:t>9:30 AM</a:t>
+                      </a:r>
+                    </a:p>
+                  </a:txBody>
+                  <a:tcPr marL="114300" marR="114300" marT="76200" marB="76200" anchor="ctr"/>
+                </a:tc>
+                <a:tc>
+                  <a:txBody>
+                    <a:bodyPr/>
+                    <a:lstStyle/>
+                    <a:p>
+                      <a:pPr algn="r"/>
+                      <a:r>
+                        <a:rPr lang="en-US" dirty="0">
+                          <a:effectLst/>
+                        </a:rPr>
+                        <a:t>4</a:t>
+                      </a:r>
+                    </a:p>
+                  </a:txBody>
+                  <a:tcPr marL="114300" marR="114300" marT="76200" marB="76200" anchor="ctr"/>
+                </a:tc>
+                <a:tc>
+                  <a:txBody>
+                    <a:bodyPr/>
+                    <a:lstStyle/>
+                    <a:p>
+                      <a:r>
+                        <a:rPr lang="en-US" dirty="0">
+                          <a:effectLst/>
+                        </a:rPr>
+                        <a:t>Scientific Software Design</a:t>
+                      </a:r>
+                    </a:p>
+                  </a:txBody>
+                  <a:tcPr marL="114300" marR="114300" marT="76200" marB="76200" anchor="ctr"/>
+                </a:tc>
+                <a:tc>
+                  <a:txBody>
+                    <a:bodyPr/>
+                    <a:lstStyle/>
+                    <a:p>
+                      <a:r>
+                        <a:rPr lang="en-US" dirty="0">
+                          <a:effectLst/>
+                        </a:rPr>
+                        <a:t>David E. Bernholdt (ORNL)</a:t>
+                      </a:r>
+                    </a:p>
+                  </a:txBody>
+                  <a:tcPr marL="114300" marR="114300" marT="76200" marB="76200" anchor="ctr"/>
+                </a:tc>
+                <a:extLst>
+                  <a:ext uri="{0D108BD9-81ED-4DB2-BD59-A6C34878D82A}">
+                    <a16:rowId xmlns:a16="http://schemas.microsoft.com/office/drawing/2014/main" val="1954771440"/>
+                  </a:ext>
+                </a:extLst>
+              </a:tr>
+              <a:tr h="370840">
+                <a:tc>
+                  <a:txBody>
+                    <a:bodyPr/>
+                    <a:lstStyle/>
+                    <a:p>
+                      <a:pPr algn="r"/>
+                      <a:r>
+                        <a:rPr lang="en-US" dirty="0">
                           <a:effectLst/>
                         </a:rPr>
                         <a:t>10:00 AM</a:t>
@@ -10226,7 +10295,7 @@
                     <a:bodyPr/>
                     <a:lstStyle/>
                     <a:p>
-                      <a:endParaRPr lang="en-US">
+                      <a:endParaRPr lang="en-US" dirty="0">
                         <a:effectLst/>
                       </a:endParaRPr>
                     </a:p>
@@ -10266,7 +10335,7 @@
                         <a:rPr lang="en-US">
                           <a:effectLst/>
                         </a:rPr>
-                        <a:t>4</a:t>
+                        <a:t>5</a:t>
                       </a:r>
                     </a:p>
                   </a:txBody>
@@ -10339,79 +10408,10 @@
                     <a:p>
                       <a:pPr algn="r"/>
                       <a:r>
-                        <a:rPr lang="en-US">
+                        <a:rPr lang="en-US" dirty="0">
                           <a:effectLst/>
                         </a:rPr>
                         <a:t>10:45 AM</a:t>
-                      </a:r>
-                    </a:p>
-                  </a:txBody>
-                  <a:tcPr marL="114300" marR="114300" marT="76200" marB="76200" anchor="ctr"/>
-                </a:tc>
-                <a:tc>
-                  <a:txBody>
-                    <a:bodyPr/>
-                    <a:lstStyle/>
-                    <a:p>
-                      <a:pPr algn="r"/>
-                      <a:r>
-                        <a:rPr lang="en-US">
-                          <a:effectLst/>
-                        </a:rPr>
-                        <a:t>5</a:t>
-                      </a:r>
-                    </a:p>
-                  </a:txBody>
-                  <a:tcPr marL="114300" marR="114300" marT="76200" marB="76200" anchor="ctr"/>
-                </a:tc>
-                <a:tc>
-                  <a:txBody>
-                    <a:bodyPr/>
-                    <a:lstStyle/>
-                    <a:p>
-                      <a:r>
-                        <a:rPr lang="en-US">
-                          <a:effectLst/>
-                        </a:rPr>
-                        <a:t>Scientific Software Design</a:t>
-                      </a:r>
-                    </a:p>
-                  </a:txBody>
-                  <a:tcPr marL="114300" marR="114300" marT="76200" marB="76200" anchor="ctr"/>
-                </a:tc>
-                <a:tc>
-                  <a:txBody>
-                    <a:bodyPr/>
-                    <a:lstStyle/>
-                    <a:p>
-                      <a:r>
-                        <a:rPr lang="en-US">
-                          <a:effectLst/>
-                        </a:rPr>
-                        <a:t>David E. Bernholdt (ORNL)</a:t>
-                      </a:r>
-                    </a:p>
-                  </a:txBody>
-                  <a:tcPr marL="114300" marR="114300" marT="76200" marB="76200" anchor="ctr"/>
-                </a:tc>
-                <a:extLst>
-                  <a:ext uri="{0D108BD9-81ED-4DB2-BD59-A6C34878D82A}">
-                    <a16:rowId xmlns:a16="http://schemas.microsoft.com/office/drawing/2014/main" val="2846871183"/>
-                  </a:ext>
-                </a:extLst>
-              </a:tr>
-              <a:tr h="370840">
-                <a:tc>
-                  <a:txBody>
-                    <a:bodyPr/>
-                    <a:lstStyle/>
-                    <a:p>
-                      <a:pPr algn="r"/>
-                      <a:r>
-                        <a:rPr lang="en-US">
-                          <a:effectLst/>
-                        </a:rPr>
-                        <a:t>11:15 AM</a:t>
                       </a:r>
                     </a:p>
                   </a:txBody>
@@ -10454,7 +10454,7 @@
                     <a:lstStyle/>
                     <a:p>
                       <a:r>
-                        <a:rPr lang="en-US">
+                        <a:rPr lang="en-US" dirty="0">
                           <a:effectLst/>
                         </a:rPr>
                         <a:t>David E. Bernholdt (ORNL)</a:t>
@@ -10466,6 +10466,69 @@
                 <a:extLst>
                   <a:ext uri="{0D108BD9-81ED-4DB2-BD59-A6C34878D82A}">
                     <a16:rowId xmlns:a16="http://schemas.microsoft.com/office/drawing/2014/main" val="110245607"/>
+                  </a:ext>
+                </a:extLst>
+              </a:tr>
+              <a:tr h="370840">
+                <a:tc>
+                  <a:txBody>
+                    <a:bodyPr/>
+                    <a:lstStyle/>
+                    <a:p>
+                      <a:pPr algn="r"/>
+                      <a:r>
+                        <a:rPr lang="en-US" dirty="0">
+                          <a:effectLst/>
+                        </a:rPr>
+                        <a:t>11:30 AM</a:t>
+                      </a:r>
+                    </a:p>
+                  </a:txBody>
+                  <a:tcPr marL="114300" marR="114300" marT="76200" marB="76200" anchor="ctr"/>
+                </a:tc>
+                <a:tc>
+                  <a:txBody>
+                    <a:bodyPr/>
+                    <a:lstStyle/>
+                    <a:p>
+                      <a:pPr algn="r"/>
+                      <a:endParaRPr lang="en-US" dirty="0">
+                        <a:effectLst/>
+                      </a:endParaRPr>
+                    </a:p>
+                  </a:txBody>
+                  <a:tcPr marL="114300" marR="114300" marT="76200" marB="76200" anchor="ctr"/>
+                </a:tc>
+                <a:tc>
+                  <a:txBody>
+                    <a:bodyPr/>
+                    <a:lstStyle/>
+                    <a:p>
+                      <a:r>
+                        <a:rPr lang="en-US" dirty="0">
+                          <a:effectLst/>
+                        </a:rPr>
+                        <a:t>Hands-on &amp; Discussion</a:t>
+                      </a:r>
+                    </a:p>
+                  </a:txBody>
+                  <a:tcPr marL="114300" marR="114300" marT="76200" marB="76200" anchor="ctr"/>
+                </a:tc>
+                <a:tc>
+                  <a:txBody>
+                    <a:bodyPr/>
+                    <a:lstStyle/>
+                    <a:p>
+                      <a:endParaRPr lang="en-US" dirty="0">
+                        <a:effectLst/>
+                      </a:endParaRPr>
+                    </a:p>
+                  </a:txBody>
+                  <a:tcPr marL="114300" marR="114300" marT="76200" marB="76200" anchor="ctr"/>
+                </a:tc>
+                <a:extLst>
+                  <a:ext uri="{0D108BD9-81ED-4DB2-BD59-A6C34878D82A}">
+                    <a16:rowId xmlns:a16="http://schemas.microsoft.com/office/drawing/2014/main" val="1951011699"/>
                   </a:ext>
                 </a:extLst>
               </a:tr>
@@ -10565,90 +10628,23 @@
           </a:bodyPr>
           <a:lstStyle/>
           <a:p>
-            <a:pPr marL="0" marR="0" lvl="0" indent="0" algn="l" defTabSz="914400" rtl="0" eaLnBrk="1" fontAlgn="base" latinLnBrk="0" hangingPunct="1">
-              <a:lnSpc>
-                <a:spcPct val="100000"/>
-              </a:lnSpc>
-              <a:spcBef>
-                <a:spcPct val="0"/>
-              </a:spcBef>
-              <a:spcAft>
-                <a:spcPct val="0"/>
-              </a:spcAft>
-              <a:buClrTx/>
-              <a:buSzTx/>
-              <a:buFontTx/>
-              <a:buNone/>
-              <a:tabLst/>
-              <a:defRPr/>
-            </a:pPr>
-            <a:r>
-              <a:rPr kumimoji="0" lang="en-US" sz="1800" b="0" i="0" u="none" strike="noStrike" kern="1200" cap="none" spc="0" normalizeH="0" baseline="0" noProof="0" dirty="0">
-                <a:ln>
-                  <a:noFill/>
-                </a:ln>
-                <a:solidFill>
-                  <a:prstClr val="black"/>
-                </a:solidFill>
-                <a:effectLst/>
-                <a:uLnTx/>
-                <a:uFillTx/>
-                <a:latin typeface="Arial" charset="0"/>
-                <a:ea typeface="+mn-ea"/>
-                <a:cs typeface="Arial" charset="0"/>
-              </a:rPr>
+            <a:pPr algn="l"/>
+            <a:r>
+              <a:rPr lang="en-US" dirty="0"/>
               <a:t>The agenda is also available on the tutorial web page.  Visit </a:t>
             </a:r>
             <a:r>
-              <a:rPr kumimoji="0" lang="en-US" sz="1800" b="1" i="0" u="none" strike="noStrike" kern="1200" cap="none" spc="0" normalizeH="0" baseline="0" noProof="0" dirty="0">
-                <a:ln>
-                  <a:noFill/>
-                </a:ln>
-                <a:solidFill>
-                  <a:prstClr val="black"/>
-                </a:solidFill>
-                <a:effectLst/>
-                <a:uLnTx/>
-                <a:uFillTx/>
-                <a:latin typeface="Arial" charset="0"/>
-                <a:ea typeface="+mn-ea"/>
-                <a:cs typeface="Arial" charset="0"/>
+              <a:rPr lang="en-US" b="1" dirty="0">
                 <a:hlinkClick r:id="rId2"/>
               </a:rPr>
               <a:t>https://bssw-tutorial.github.io</a:t>
             </a:r>
             <a:r>
-              <a:rPr kumimoji="0" lang="en-US" sz="1800" b="1" i="0" u="none" strike="noStrike" kern="1200" cap="none" spc="0" normalizeH="0" baseline="0" noProof="0" dirty="0">
-                <a:ln>
-                  <a:noFill/>
-                </a:ln>
-                <a:solidFill>
-                  <a:prstClr val="black"/>
-                </a:solidFill>
-                <a:effectLst/>
-                <a:uLnTx/>
-                <a:uFillTx/>
-                <a:latin typeface="Arial" charset="0"/>
-                <a:ea typeface="+mn-ea"/>
-                <a:cs typeface="Arial" charset="0"/>
-              </a:rPr>
+              <a:rPr lang="en-US" b="1" dirty="0"/>
               <a:t> </a:t>
             </a:r>
             <a:r>
-              <a:rPr kumimoji="0" lang="en-US" sz="1800" b="0" i="0" u="none" strike="noStrike" kern="1200" cap="none" spc="0" normalizeH="0" baseline="0" noProof="0" dirty="0">
-                <a:ln>
-                  <a:noFill/>
-                </a:ln>
-                <a:solidFill>
-                  <a:prstClr val="black"/>
-                </a:solidFill>
-                <a:effectLst/>
-                <a:uLnTx/>
-                <a:uFillTx/>
-                <a:latin typeface="Arial" charset="0"/>
-                <a:ea typeface="+mn-ea"/>
-                <a:cs typeface="Arial" charset="0"/>
-              </a:rPr>
+              <a:rPr lang="en-US" dirty="0"/>
               <a:t>and click on the link for today’s tutorial</a:t>
             </a:r>
           </a:p>
@@ -10657,7 +10653,7 @@
     </p:spTree>
     <p:extLst>
       <p:ext uri="{BB962C8B-B14F-4D97-AF65-F5344CB8AC3E}">
-        <p14:creationId xmlns:p14="http://schemas.microsoft.com/office/powerpoint/2010/main" val="2525433365"/>
+        <p14:creationId xmlns:p14="http://schemas.microsoft.com/office/powerpoint/2010/main" val="1787293826"/>
       </p:ext>
     </p:extLst>
   </p:cSld>
@@ -14599,21 +14595,6 @@
 </file>
 
 <file path=customXml/item1.xml><?xml version="1.0" encoding="utf-8"?>
-<?mso-contentType ?>
-<FormTemplates xmlns="http://schemas.microsoft.com/sharepoint/v3/contenttype/forms">
-  <Display>DocumentLibraryForm</Display>
-  <Edit>DocumentLibraryForm</Edit>
-  <New>DocumentLibraryForm</New>
-</FormTemplates>
-</file>
-
-<file path=customXml/item2.xml><?xml version="1.0" encoding="utf-8"?>
-<p:properties xmlns:p="http://schemas.microsoft.com/office/2006/metadata/properties" xmlns:xsi="http://www.w3.org/2001/XMLSchema-instance" xmlns:pc="http://schemas.microsoft.com/office/infopath/2007/PartnerControls">
-  <documentManagement/>
-</p:properties>
-</file>
-
-<file path=customXml/item3.xml><?xml version="1.0" encoding="utf-8"?>
 <ct:contentTypeSchema xmlns:ct="http://schemas.microsoft.com/office/2006/metadata/contentType" xmlns:ma="http://schemas.microsoft.com/office/2006/metadata/properties/metaAttributes" ct:_="" ma:_="" ma:contentTypeName="Document" ma:contentTypeID="0x010100565464437F680748A68B85EB6594EA7D" ma:contentTypeVersion="0" ma:contentTypeDescription="Create a new document." ma:contentTypeScope="" ma:versionID="fe3f4dd58d5914c51cfc6deaa8ad845c">
   <xsd:schema xmlns:xsd="http://www.w3.org/2001/XMLSchema" xmlns:p="http://schemas.microsoft.com/office/2006/metadata/properties" targetNamespace="http://schemas.microsoft.com/office/2006/metadata/properties" ma:root="true" ma:fieldsID="4aeb20c0e3442673af7ee10786458764">
     <xsd:element name="properties">
@@ -14662,10 +14643,32 @@
 </ct:contentTypeSchema>
 </file>
 
+<file path=customXml/item2.xml><?xml version="1.0" encoding="utf-8"?>
+<p:properties xmlns:p="http://schemas.microsoft.com/office/2006/metadata/properties" xmlns:xsi="http://www.w3.org/2001/XMLSchema-instance" xmlns:pc="http://schemas.microsoft.com/office/infopath/2007/PartnerControls">
+  <documentManagement/>
+</p:properties>
+</file>
+
+<file path=customXml/item3.xml><?xml version="1.0" encoding="utf-8"?>
+<?mso-contentType ?>
+<FormTemplates xmlns="http://schemas.microsoft.com/sharepoint/v3/contenttype/forms">
+  <Display>DocumentLibraryForm</Display>
+  <Edit>DocumentLibraryForm</Edit>
+  <New>DocumentLibraryForm</New>
+</FormTemplates>
+</file>
+
 <file path=customXml/itemProps1.xml><?xml version="1.0" encoding="utf-8"?>
-<ds:datastoreItem xmlns:ds="http://schemas.openxmlformats.org/officeDocument/2006/customXml" ds:itemID="{19E20559-B232-4371-8690-E3D8007EDB82}">
+<ds:datastoreItem xmlns:ds="http://schemas.openxmlformats.org/officeDocument/2006/customXml" ds:itemID="{E8DB7DEB-074E-4EE8-9B6E-FD277323109C}">
   <ds:schemaRefs>
-    <ds:schemaRef ds:uri="http://schemas.microsoft.com/sharepoint/v3/contenttype/forms"/>
+    <ds:schemaRef ds:uri="http://schemas.microsoft.com/office/2006/metadata/contentType"/>
+    <ds:schemaRef ds:uri="http://schemas.microsoft.com/office/2006/metadata/properties/metaAttributes"/>
+    <ds:schemaRef ds:uri="http://www.w3.org/2001/XMLSchema"/>
+    <ds:schemaRef ds:uri="http://schemas.microsoft.com/office/2006/metadata/properties"/>
+    <ds:schemaRef ds:uri="http://schemas.openxmlformats.org/package/2006/metadata/core-properties"/>
+    <ds:schemaRef ds:uri="http://purl.org/dc/elements/1.1/"/>
+    <ds:schemaRef ds:uri="http://purl.org/dc/terms/"/>
+    <ds:schemaRef ds:uri="http://schemas.microsoft.com/office/internal/2005/internalDocumentation"/>
   </ds:schemaRefs>
 </ds:datastoreItem>
 </file>
@@ -14686,16 +14689,9 @@
 </file>
 
 <file path=customXml/itemProps3.xml><?xml version="1.0" encoding="utf-8"?>
-<ds:datastoreItem xmlns:ds="http://schemas.openxmlformats.org/officeDocument/2006/customXml" ds:itemID="{E8DB7DEB-074E-4EE8-9B6E-FD277323109C}">
+<ds:datastoreItem xmlns:ds="http://schemas.openxmlformats.org/officeDocument/2006/customXml" ds:itemID="{19E20559-B232-4371-8690-E3D8007EDB82}">
   <ds:schemaRefs>
-    <ds:schemaRef ds:uri="http://schemas.microsoft.com/office/2006/metadata/contentType"/>
-    <ds:schemaRef ds:uri="http://schemas.microsoft.com/office/2006/metadata/properties/metaAttributes"/>
-    <ds:schemaRef ds:uri="http://www.w3.org/2001/XMLSchema"/>
-    <ds:schemaRef ds:uri="http://schemas.microsoft.com/office/2006/metadata/properties"/>
-    <ds:schemaRef ds:uri="http://schemas.openxmlformats.org/package/2006/metadata/core-properties"/>
-    <ds:schemaRef ds:uri="http://purl.org/dc/elements/1.1/"/>
-    <ds:schemaRef ds:uri="http://purl.org/dc/terms/"/>
-    <ds:schemaRef ds:uri="http://schemas.microsoft.com/office/internal/2005/internalDocumentation"/>
+    <ds:schemaRef ds:uri="http://schemas.microsoft.com/sharepoint/v3/contenttype/forms"/>
   </ds:schemaRefs>
 </ds:datastoreItem>
 </file>
</xml_diff>

<commit_message>
Quality control updates for ISS
</commit_message>
<xml_diff>
--- a/overview.pptx
+++ b/overview.pptx
@@ -11333,7 +11333,7 @@
         </p:nvSpPr>
         <p:spPr>
           <a:xfrm>
-            <a:off x="365760" y="5606978"/>
+            <a:off x="461014" y="5606978"/>
             <a:ext cx="11266797" cy="1169041"/>
           </a:xfrm>
           <a:prstGeom prst="roundRect">
@@ -12807,21 +12807,6 @@
 </file>
 
 <file path=customXml/item1.xml><?xml version="1.0" encoding="utf-8"?>
-<p:properties xmlns:p="http://schemas.microsoft.com/office/2006/metadata/properties" xmlns:xsi="http://www.w3.org/2001/XMLSchema-instance" xmlns:pc="http://schemas.microsoft.com/office/infopath/2007/PartnerControls">
-  <documentManagement/>
-</p:properties>
-</file>
-
-<file path=customXml/item2.xml><?xml version="1.0" encoding="utf-8"?>
-<?mso-contentType ?>
-<FormTemplates xmlns="http://schemas.microsoft.com/sharepoint/v3/contenttype/forms">
-  <Display>DocumentLibraryForm</Display>
-  <Edit>DocumentLibraryForm</Edit>
-  <New>DocumentLibraryForm</New>
-</FormTemplates>
-</file>
-
-<file path=customXml/item3.xml><?xml version="1.0" encoding="utf-8"?>
 <ct:contentTypeSchema xmlns:ct="http://schemas.microsoft.com/office/2006/metadata/contentType" xmlns:ma="http://schemas.microsoft.com/office/2006/metadata/properties/metaAttributes" ct:_="" ma:_="" ma:contentTypeName="Document" ma:contentTypeID="0x010100565464437F680748A68B85EB6594EA7D" ma:contentTypeVersion="0" ma:contentTypeDescription="Create a new document." ma:contentTypeScope="" ma:versionID="fe3f4dd58d5914c51cfc6deaa8ad845c">
   <xsd:schema xmlns:xsd="http://www.w3.org/2001/XMLSchema" xmlns:p="http://schemas.microsoft.com/office/2006/metadata/properties" targetNamespace="http://schemas.microsoft.com/office/2006/metadata/properties" ma:root="true" ma:fieldsID="4aeb20c0e3442673af7ee10786458764">
     <xsd:element name="properties">
@@ -12870,17 +12855,32 @@
 </ct:contentTypeSchema>
 </file>
 
+<file path=customXml/item2.xml><?xml version="1.0" encoding="utf-8"?>
+<?mso-contentType ?>
+<FormTemplates xmlns="http://schemas.microsoft.com/sharepoint/v3/contenttype/forms">
+  <Display>DocumentLibraryForm</Display>
+  <Edit>DocumentLibraryForm</Edit>
+  <New>DocumentLibraryForm</New>
+</FormTemplates>
+</file>
+
+<file path=customXml/item3.xml><?xml version="1.0" encoding="utf-8"?>
+<p:properties xmlns:p="http://schemas.microsoft.com/office/2006/metadata/properties" xmlns:xsi="http://www.w3.org/2001/XMLSchema-instance" xmlns:pc="http://schemas.microsoft.com/office/infopath/2007/PartnerControls">
+  <documentManagement/>
+</p:properties>
+</file>
+
 <file path=customXml/itemProps1.xml><?xml version="1.0" encoding="utf-8"?>
-<ds:datastoreItem xmlns:ds="http://schemas.openxmlformats.org/officeDocument/2006/customXml" ds:itemID="{A50EC660-24D0-43A0-AE5E-E274115E726B}">
+<ds:datastoreItem xmlns:ds="http://schemas.openxmlformats.org/officeDocument/2006/customXml" ds:itemID="{E8DB7DEB-074E-4EE8-9B6E-FD277323109C}">
   <ds:schemaRefs>
+    <ds:schemaRef ds:uri="http://schemas.microsoft.com/office/2006/metadata/contentType"/>
+    <ds:schemaRef ds:uri="http://schemas.microsoft.com/office/2006/metadata/properties/metaAttributes"/>
+    <ds:schemaRef ds:uri="http://www.w3.org/2001/XMLSchema"/>
+    <ds:schemaRef ds:uri="http://schemas.microsoft.com/office/2006/metadata/properties"/>
+    <ds:schemaRef ds:uri="http://schemas.openxmlformats.org/package/2006/metadata/core-properties"/>
     <ds:schemaRef ds:uri="http://purl.org/dc/elements/1.1/"/>
-    <ds:schemaRef ds:uri="http://schemas.microsoft.com/office/2006/metadata/properties"/>
     <ds:schemaRef ds:uri="http://purl.org/dc/terms/"/>
-    <ds:schemaRef ds:uri="http://schemas.openxmlformats.org/package/2006/metadata/core-properties"/>
-    <ds:schemaRef ds:uri="http://schemas.microsoft.com/office/2006/documentManagement/types"/>
-    <ds:schemaRef ds:uri="http://www.w3.org/XML/1998/namespace"/>
-    <ds:schemaRef ds:uri="http://purl.org/dc/dcmitype/"/>
-    <ds:schemaRef ds:uri="http://schemas.microsoft.com/office/infopath/2007/PartnerControls"/>
+    <ds:schemaRef ds:uri="http://schemas.microsoft.com/office/internal/2005/internalDocumentation"/>
   </ds:schemaRefs>
 </ds:datastoreItem>
 </file>
@@ -12894,16 +12894,16 @@
 </file>
 
 <file path=customXml/itemProps3.xml><?xml version="1.0" encoding="utf-8"?>
-<ds:datastoreItem xmlns:ds="http://schemas.openxmlformats.org/officeDocument/2006/customXml" ds:itemID="{E8DB7DEB-074E-4EE8-9B6E-FD277323109C}">
+<ds:datastoreItem xmlns:ds="http://schemas.openxmlformats.org/officeDocument/2006/customXml" ds:itemID="{A50EC660-24D0-43A0-AE5E-E274115E726B}">
   <ds:schemaRefs>
-    <ds:schemaRef ds:uri="http://schemas.microsoft.com/office/2006/metadata/contentType"/>
-    <ds:schemaRef ds:uri="http://schemas.microsoft.com/office/2006/metadata/properties/metaAttributes"/>
-    <ds:schemaRef ds:uri="http://www.w3.org/2001/XMLSchema"/>
+    <ds:schemaRef ds:uri="http://purl.org/dc/elements/1.1/"/>
     <ds:schemaRef ds:uri="http://schemas.microsoft.com/office/2006/metadata/properties"/>
+    <ds:schemaRef ds:uri="http://purl.org/dc/terms/"/>
     <ds:schemaRef ds:uri="http://schemas.openxmlformats.org/package/2006/metadata/core-properties"/>
-    <ds:schemaRef ds:uri="http://purl.org/dc/elements/1.1/"/>
-    <ds:schemaRef ds:uri="http://purl.org/dc/terms/"/>
-    <ds:schemaRef ds:uri="http://schemas.microsoft.com/office/internal/2005/internalDocumentation"/>
+    <ds:schemaRef ds:uri="http://schemas.microsoft.com/office/2006/documentManagement/types"/>
+    <ds:schemaRef ds:uri="http://www.w3.org/XML/1998/namespace"/>
+    <ds:schemaRef ds:uri="http://purl.org/dc/dcmitype/"/>
+    <ds:schemaRef ds:uri="http://schemas.microsoft.com/office/infopath/2007/PartnerControls"/>
   </ds:schemaRefs>
 </ds:datastoreItem>
 </file>
</xml_diff>

<commit_message>
Add LA-UR from last time I presented to Overview
</commit_message>
<xml_diff>
--- a/overview.pptx
+++ b/overview.pptx
@@ -275,7 +275,7 @@
           <a:p>
             <a:fld id="{0B842F42-2CE9-4E35-95C1-410DC08A50B1}" type="datetimeFigureOut">
               <a:rPr lang="en-US" smtClean="0"/>
-              <a:t>4/15/2023</a:t>
+              <a:t>7/23/23</a:t>
             </a:fld>
             <a:endParaRPr lang="en-US"/>
           </a:p>
@@ -440,7 +440,7 @@
           <a:p>
             <a:fld id="{6F282904-F315-4730-8D91-37D99E141A6F}" type="datetimeFigureOut">
               <a:rPr lang="en-US" smtClean="0"/>
-              <a:t>4/15/2023</a:t>
+              <a:t>7/23/23</a:t>
             </a:fld>
             <a:endParaRPr lang="en-US"/>
           </a:p>
@@ -4392,22 +4392,18 @@
           <a:p>
             <a:r>
               <a:rPr lang="en-US" u="sng" dirty="0"/>
-              <a:t>David E. Bernholdt</a:t>
-            </a:r>
-            <a:r>
-              <a:rPr lang="en-US" dirty="0"/>
-              <a:t> </a:t>
+              <a:t>Patricia Grubel</a:t>
             </a:r>
             <a:r>
               <a:rPr lang="en-US" sz="2000" dirty="0"/>
-              <a:t>(he/him)</a:t>
+              <a:t>(she/her)</a:t>
             </a:r>
             <a:br>
               <a:rPr lang="en-US" sz="2000" u="sng" dirty="0"/>
             </a:br>
             <a:r>
               <a:rPr lang="en-US" sz="2000" dirty="0"/>
-              <a:t>Oak Ridge National Laboratory</a:t>
+              <a:t>Los Alamos National Laboratory</a:t>
             </a:r>
           </a:p>
           <a:p>
@@ -4425,7 +4421,7 @@
             </a:br>
             <a:r>
               <a:rPr lang="en-US" sz="2000" dirty="0"/>
-              <a:t>@ Improving Scientific Software conference (2023)</a:t>
+              <a:t>@ (2023)</a:t>
             </a:r>
           </a:p>
           <a:p>
@@ -4437,6 +4433,75 @@
             <a:r>
               <a:rPr lang="en-US" sz="2000" dirty="0"/>
               <a:t>Contributors: David E. Bernholdt (ORNL), Anshu Dubey (ANL), Patricia A. Grubel (LANL), Rinku K. Gupta (ANL), Katherine M. Riley (ANL)</a:t>
+            </a:r>
+          </a:p>
+        </p:txBody>
+      </p:sp>
+      <p:sp>
+        <p:nvSpPr>
+          <p:cNvPr id="3" name="TextBox 2">
+            <a:extLst>
+              <a:ext uri="{FF2B5EF4-FFF2-40B4-BE49-F238E27FC236}">
+                <a16:creationId xmlns:a16="http://schemas.microsoft.com/office/drawing/2014/main" id="{A41C10F8-9DFE-5459-5773-128B2010D05A}"/>
+              </a:ext>
+            </a:extLst>
+          </p:cNvPr>
+          <p:cNvSpPr txBox="1"/>
+          <p:nvPr/>
+        </p:nvSpPr>
+        <p:spPr>
+          <a:xfrm>
+            <a:off x="9829800" y="4584825"/>
+            <a:ext cx="6122276" cy="1477328"/>
+          </a:xfrm>
+          <a:prstGeom prst="rect">
+            <a:avLst/>
+          </a:prstGeom>
+          <a:noFill/>
+        </p:spPr>
+        <p:txBody>
+          <a:bodyPr wrap="square">
+            <a:spAutoFit/>
+          </a:bodyPr>
+          <a:lstStyle/>
+          <a:p>
+            <a:br>
+              <a:rPr lang="en-US" dirty="0">
+                <a:effectLst/>
+                <a:latin typeface="Arial" panose="020B0604020202020204" pitchFamily="34" charset="0"/>
+              </a:rPr>
+            </a:br>
+            <a:endParaRPr lang="en-US" dirty="0">
+              <a:effectLst/>
+              <a:latin typeface="Arial" panose="020B0604020202020204" pitchFamily="34" charset="0"/>
+            </a:endParaRPr>
+          </a:p>
+          <a:p>
+            <a:br>
+              <a:rPr lang="en-US" dirty="0">
+                <a:effectLst/>
+                <a:latin typeface="Arial" panose="020B0604020202020204" pitchFamily="34" charset="0"/>
+              </a:rPr>
+            </a:br>
+            <a:endParaRPr lang="en-US" dirty="0">
+              <a:effectLst/>
+              <a:latin typeface="Arial" panose="020B0604020202020204" pitchFamily="34" charset="0"/>
+            </a:endParaRPr>
+          </a:p>
+          <a:p>
+            <a:r>
+              <a:rPr lang="en-US" dirty="0">
+                <a:effectLst/>
+                <a:latin typeface="Arial" panose="020B0604020202020204" pitchFamily="34" charset="0"/>
+              </a:rPr>
+              <a:t> </a:t>
+            </a:r>
+            <a:r>
+              <a:rPr lang="en-US" sz="1400" dirty="0">
+                <a:effectLst/>
+                <a:latin typeface="Arial" panose="020B0604020202020204" pitchFamily="34" charset="0"/>
+              </a:rPr>
+              <a:t>LA-UR-21-29819</a:t>
             </a:r>
           </a:p>
         </p:txBody>
@@ -12856,18 +12921,18 @@
 </file>
 
 <file path=customXml/item2.xml><?xml version="1.0" encoding="utf-8"?>
+<p:properties xmlns:p="http://schemas.microsoft.com/office/2006/metadata/properties" xmlns:xsi="http://www.w3.org/2001/XMLSchema-instance" xmlns:pc="http://schemas.microsoft.com/office/infopath/2007/PartnerControls">
+  <documentManagement/>
+</p:properties>
+</file>
+
+<file path=customXml/item3.xml><?xml version="1.0" encoding="utf-8"?>
 <?mso-contentType ?>
 <FormTemplates xmlns="http://schemas.microsoft.com/sharepoint/v3/contenttype/forms">
   <Display>DocumentLibraryForm</Display>
   <Edit>DocumentLibraryForm</Edit>
   <New>DocumentLibraryForm</New>
 </FormTemplates>
-</file>
-
-<file path=customXml/item3.xml><?xml version="1.0" encoding="utf-8"?>
-<p:properties xmlns:p="http://schemas.microsoft.com/office/2006/metadata/properties" xmlns:xsi="http://www.w3.org/2001/XMLSchema-instance" xmlns:pc="http://schemas.microsoft.com/office/infopath/2007/PartnerControls">
-  <documentManagement/>
-</p:properties>
 </file>
 
 <file path=customXml/itemProps1.xml><?xml version="1.0" encoding="utf-8"?>
@@ -12886,14 +12951,6 @@
 </file>
 
 <file path=customXml/itemProps2.xml><?xml version="1.0" encoding="utf-8"?>
-<ds:datastoreItem xmlns:ds="http://schemas.openxmlformats.org/officeDocument/2006/customXml" ds:itemID="{19E20559-B232-4371-8690-E3D8007EDB82}">
-  <ds:schemaRefs>
-    <ds:schemaRef ds:uri="http://schemas.microsoft.com/sharepoint/v3/contenttype/forms"/>
-  </ds:schemaRefs>
-</ds:datastoreItem>
-</file>
-
-<file path=customXml/itemProps3.xml><?xml version="1.0" encoding="utf-8"?>
 <ds:datastoreItem xmlns:ds="http://schemas.openxmlformats.org/officeDocument/2006/customXml" ds:itemID="{A50EC660-24D0-43A0-AE5E-E274115E726B}">
   <ds:schemaRefs>
     <ds:schemaRef ds:uri="http://purl.org/dc/elements/1.1/"/>
@@ -12906,4 +12963,12 @@
     <ds:schemaRef ds:uri="http://schemas.microsoft.com/office/infopath/2007/PartnerControls"/>
   </ds:schemaRefs>
 </ds:datastoreItem>
+</file>
+
+<file path=customXml/itemProps3.xml><?xml version="1.0" encoding="utf-8"?>
+<ds:datastoreItem xmlns:ds="http://schemas.openxmlformats.org/officeDocument/2006/customXml" ds:itemID="{19E20559-B232-4371-8690-E3D8007EDB82}">
+  <ds:schemaRefs>
+    <ds:schemaRef ds:uri="http://schemas.microsoft.com/sharepoint/v3/contenttype/forms"/>
+  </ds:schemaRefs>
+</ds:datastoreItem>
 </file>
</xml_diff>

<commit_message>
Restore overview and place LA-UR on overview-a
</commit_message>
<xml_diff>
--- a/overview.pptx
+++ b/overview.pptx
@@ -275,7 +275,7 @@
           <a:p>
             <a:fld id="{0B842F42-2CE9-4E35-95C1-410DC08A50B1}" type="datetimeFigureOut">
               <a:rPr lang="en-US" smtClean="0"/>
-              <a:t>7/23/23</a:t>
+              <a:t>4/15/2023</a:t>
             </a:fld>
             <a:endParaRPr lang="en-US"/>
           </a:p>
@@ -440,7 +440,7 @@
           <a:p>
             <a:fld id="{6F282904-F315-4730-8D91-37D99E141A6F}" type="datetimeFigureOut">
               <a:rPr lang="en-US" smtClean="0"/>
-              <a:t>7/23/23</a:t>
+              <a:t>4/15/2023</a:t>
             </a:fld>
             <a:endParaRPr lang="en-US"/>
           </a:p>
@@ -4392,18 +4392,22 @@
           <a:p>
             <a:r>
               <a:rPr lang="en-US" u="sng" dirty="0"/>
-              <a:t>Patricia Grubel</a:t>
+              <a:t>David E. Bernholdt</a:t>
+            </a:r>
+            <a:r>
+              <a:rPr lang="en-US" dirty="0"/>
+              <a:t> </a:t>
             </a:r>
             <a:r>
               <a:rPr lang="en-US" sz="2000" dirty="0"/>
-              <a:t>(she/her)</a:t>
+              <a:t>(he/him)</a:t>
             </a:r>
             <a:br>
               <a:rPr lang="en-US" sz="2000" u="sng" dirty="0"/>
             </a:br>
             <a:r>
               <a:rPr lang="en-US" sz="2000" dirty="0"/>
-              <a:t>Los Alamos National Laboratory</a:t>
+              <a:t>Oak Ridge National Laboratory</a:t>
             </a:r>
           </a:p>
           <a:p>
@@ -4421,7 +4425,7 @@
             </a:br>
             <a:r>
               <a:rPr lang="en-US" sz="2000" dirty="0"/>
-              <a:t>@ (2023)</a:t>
+              <a:t>@ Improving Scientific Software conference (2023)</a:t>
             </a:r>
           </a:p>
           <a:p>
@@ -4433,75 +4437,6 @@
             <a:r>
               <a:rPr lang="en-US" sz="2000" dirty="0"/>
               <a:t>Contributors: David E. Bernholdt (ORNL), Anshu Dubey (ANL), Patricia A. Grubel (LANL), Rinku K. Gupta (ANL), Katherine M. Riley (ANL)</a:t>
-            </a:r>
-          </a:p>
-        </p:txBody>
-      </p:sp>
-      <p:sp>
-        <p:nvSpPr>
-          <p:cNvPr id="3" name="TextBox 2">
-            <a:extLst>
-              <a:ext uri="{FF2B5EF4-FFF2-40B4-BE49-F238E27FC236}">
-                <a16:creationId xmlns:a16="http://schemas.microsoft.com/office/drawing/2014/main" id="{A41C10F8-9DFE-5459-5773-128B2010D05A}"/>
-              </a:ext>
-            </a:extLst>
-          </p:cNvPr>
-          <p:cNvSpPr txBox="1"/>
-          <p:nvPr/>
-        </p:nvSpPr>
-        <p:spPr>
-          <a:xfrm>
-            <a:off x="9829800" y="4584825"/>
-            <a:ext cx="6122276" cy="1477328"/>
-          </a:xfrm>
-          <a:prstGeom prst="rect">
-            <a:avLst/>
-          </a:prstGeom>
-          <a:noFill/>
-        </p:spPr>
-        <p:txBody>
-          <a:bodyPr wrap="square">
-            <a:spAutoFit/>
-          </a:bodyPr>
-          <a:lstStyle/>
-          <a:p>
-            <a:br>
-              <a:rPr lang="en-US" dirty="0">
-                <a:effectLst/>
-                <a:latin typeface="Arial" panose="020B0604020202020204" pitchFamily="34" charset="0"/>
-              </a:rPr>
-            </a:br>
-            <a:endParaRPr lang="en-US" dirty="0">
-              <a:effectLst/>
-              <a:latin typeface="Arial" panose="020B0604020202020204" pitchFamily="34" charset="0"/>
-            </a:endParaRPr>
-          </a:p>
-          <a:p>
-            <a:br>
-              <a:rPr lang="en-US" dirty="0">
-                <a:effectLst/>
-                <a:latin typeface="Arial" panose="020B0604020202020204" pitchFamily="34" charset="0"/>
-              </a:rPr>
-            </a:br>
-            <a:endParaRPr lang="en-US" dirty="0">
-              <a:effectLst/>
-              <a:latin typeface="Arial" panose="020B0604020202020204" pitchFamily="34" charset="0"/>
-            </a:endParaRPr>
-          </a:p>
-          <a:p>
-            <a:r>
-              <a:rPr lang="en-US" dirty="0">
-                <a:effectLst/>
-                <a:latin typeface="Arial" panose="020B0604020202020204" pitchFamily="34" charset="0"/>
-              </a:rPr>
-              <a:t> </a:t>
-            </a:r>
-            <a:r>
-              <a:rPr lang="en-US" sz="1400" dirty="0">
-                <a:effectLst/>
-                <a:latin typeface="Arial" panose="020B0604020202020204" pitchFamily="34" charset="0"/>
-              </a:rPr>
-              <a:t>LA-UR-21-29819</a:t>
             </a:r>
           </a:p>
         </p:txBody>
@@ -12921,18 +12856,18 @@
 </file>
 
 <file path=customXml/item2.xml><?xml version="1.0" encoding="utf-8"?>
-<p:properties xmlns:p="http://schemas.microsoft.com/office/2006/metadata/properties" xmlns:xsi="http://www.w3.org/2001/XMLSchema-instance" xmlns:pc="http://schemas.microsoft.com/office/infopath/2007/PartnerControls">
-  <documentManagement/>
-</p:properties>
-</file>
-
-<file path=customXml/item3.xml><?xml version="1.0" encoding="utf-8"?>
 <?mso-contentType ?>
 <FormTemplates xmlns="http://schemas.microsoft.com/sharepoint/v3/contenttype/forms">
   <Display>DocumentLibraryForm</Display>
   <Edit>DocumentLibraryForm</Edit>
   <New>DocumentLibraryForm</New>
 </FormTemplates>
+</file>
+
+<file path=customXml/item3.xml><?xml version="1.0" encoding="utf-8"?>
+<p:properties xmlns:p="http://schemas.microsoft.com/office/2006/metadata/properties" xmlns:xsi="http://www.w3.org/2001/XMLSchema-instance" xmlns:pc="http://schemas.microsoft.com/office/infopath/2007/PartnerControls">
+  <documentManagement/>
+</p:properties>
 </file>
 
 <file path=customXml/itemProps1.xml><?xml version="1.0" encoding="utf-8"?>
@@ -12951,6 +12886,14 @@
 </file>
 
 <file path=customXml/itemProps2.xml><?xml version="1.0" encoding="utf-8"?>
+<ds:datastoreItem xmlns:ds="http://schemas.openxmlformats.org/officeDocument/2006/customXml" ds:itemID="{19E20559-B232-4371-8690-E3D8007EDB82}">
+  <ds:schemaRefs>
+    <ds:schemaRef ds:uri="http://schemas.microsoft.com/sharepoint/v3/contenttype/forms"/>
+  </ds:schemaRefs>
+</ds:datastoreItem>
+</file>
+
+<file path=customXml/itemProps3.xml><?xml version="1.0" encoding="utf-8"?>
 <ds:datastoreItem xmlns:ds="http://schemas.openxmlformats.org/officeDocument/2006/customXml" ds:itemID="{A50EC660-24D0-43A0-AE5E-E274115E726B}">
   <ds:schemaRefs>
     <ds:schemaRef ds:uri="http://purl.org/dc/elements/1.1/"/>
@@ -12963,12 +12906,4 @@
     <ds:schemaRef ds:uri="http://schemas.microsoft.com/office/infopath/2007/PartnerControls"/>
   </ds:schemaRefs>
 </ds:datastoreItem>
-</file>
-
-<file path=customXml/itemProps3.xml><?xml version="1.0" encoding="utf-8"?>
-<ds:datastoreItem xmlns:ds="http://schemas.openxmlformats.org/officeDocument/2006/customXml" ds:itemID="{19E20559-B232-4371-8690-E3D8007EDB82}">
-  <ds:schemaRefs>
-    <ds:schemaRef ds:uri="http://schemas.microsoft.com/sharepoint/v3/contenttype/forms"/>
-  </ds:schemaRefs>
-</ds:datastoreItem>
 </file>
</xml_diff>

<commit_message>
Change presenter, add LA-UR and add Workflows and Lab Notebooks to subjects we are presenting on overview slide
</commit_message>
<xml_diff>
--- a/overview.pptx
+++ b/overview.pptx
@@ -275,7 +275,7 @@
           <a:p>
             <a:fld id="{0B842F42-2CE9-4E35-95C1-410DC08A50B1}" type="datetimeFigureOut">
               <a:rPr lang="en-US" smtClean="0"/>
-              <a:t>4/15/2023</a:t>
+              <a:t>10/19/23</a:t>
             </a:fld>
             <a:endParaRPr lang="en-US"/>
           </a:p>
@@ -440,7 +440,7 @@
           <a:p>
             <a:fld id="{6F282904-F315-4730-8D91-37D99E141A6F}" type="datetimeFigureOut">
               <a:rPr lang="en-US" smtClean="0"/>
-              <a:t>4/15/2023</a:t>
+              <a:t>10/19/23</a:t>
             </a:fld>
             <a:endParaRPr lang="en-US"/>
           </a:p>
@@ -4385,14 +4385,19 @@
             <p:ph type="subTitle" idx="1"/>
           </p:nvPr>
         </p:nvSpPr>
-        <p:spPr/>
+        <p:spPr>
+          <a:xfrm>
+            <a:off x="3177632" y="2085961"/>
+            <a:ext cx="8292317" cy="3001045"/>
+          </a:xfrm>
+        </p:spPr>
         <p:txBody>
           <a:bodyPr/>
           <a:lstStyle/>
           <a:p>
             <a:r>
               <a:rPr lang="en-US" u="sng" dirty="0"/>
-              <a:t>David E. Bernholdt</a:t>
+              <a:t>Patricia A. Grubel</a:t>
             </a:r>
             <a:r>
               <a:rPr lang="en-US" dirty="0"/>
@@ -4400,14 +4405,23 @@
             </a:r>
             <a:r>
               <a:rPr lang="en-US" sz="2000" dirty="0"/>
-              <a:t>(he/him)</a:t>
+              <a:t>(she/her)</a:t>
             </a:r>
             <a:br>
               <a:rPr lang="en-US" sz="2000" u="sng" dirty="0"/>
             </a:br>
             <a:r>
               <a:rPr lang="en-US" sz="2000" dirty="0"/>
-              <a:t>Oak Ridge National Laboratory</a:t>
+              <a:t>Los Alamos National Laboratory</a:t>
+            </a:r>
+          </a:p>
+          <a:p>
+            <a:br>
+              <a:rPr lang="en-US" sz="2000" dirty="0"/>
+            </a:br>
+            <a:r>
+              <a:rPr lang="en-US" sz="2000" dirty="0"/>
+              <a:t>Better Scientific Software tutorial @ SC23</a:t>
             </a:r>
           </a:p>
           <a:p>
@@ -4418,25 +4432,52 @@
             </a:pPr>
             <a:r>
               <a:rPr lang="en-US" sz="2000" dirty="0"/>
-              <a:t>Better Scientific Software tutorial </a:t>
-            </a:r>
-            <a:br>
-              <a:rPr lang="en-US" sz="2000" dirty="0"/>
-            </a:br>
-            <a:r>
-              <a:rPr lang="en-US" sz="2000" dirty="0"/>
-              <a:t>@ Improving Scientific Software conference (2023)</a:t>
-            </a:r>
-          </a:p>
-          <a:p>
-            <a:pPr>
-              <a:spcBef>
-                <a:spcPts val="2800"/>
-              </a:spcBef>
-            </a:pPr>
-            <a:r>
-              <a:rPr lang="en-US" sz="2000" dirty="0"/>
               <a:t>Contributors: David E. Bernholdt (ORNL), Anshu Dubey (ANL), Patricia A. Grubel (LANL), Rinku K. Gupta (ANL), Katherine M. Riley (ANL)</a:t>
+            </a:r>
+          </a:p>
+        </p:txBody>
+      </p:sp>
+      <p:sp>
+        <p:nvSpPr>
+          <p:cNvPr id="6" name="TextBox 5">
+            <a:extLst>
+              <a:ext uri="{FF2B5EF4-FFF2-40B4-BE49-F238E27FC236}">
+                <a16:creationId xmlns:a16="http://schemas.microsoft.com/office/drawing/2014/main" id="{6DC1C983-6AD6-2882-2670-29FBC9E962D6}"/>
+              </a:ext>
+            </a:extLst>
+          </p:cNvPr>
+          <p:cNvSpPr txBox="1"/>
+          <p:nvPr/>
+        </p:nvSpPr>
+        <p:spPr>
+          <a:xfrm>
+            <a:off x="9795640" y="5718926"/>
+            <a:ext cx="2102069" cy="461665"/>
+          </a:xfrm>
+          <a:prstGeom prst="rect">
+            <a:avLst/>
+          </a:prstGeom>
+          <a:noFill/>
+        </p:spPr>
+        <p:txBody>
+          <a:bodyPr wrap="square" lIns="118872" tIns="91440" rIns="118872" bIns="91440" rtlCol="0" anchor="ctr" anchorCtr="0">
+            <a:spAutoFit/>
+          </a:bodyPr>
+          <a:lstStyle/>
+          <a:p>
+            <a:r>
+              <a:rPr lang="en-US" dirty="0">
+                <a:effectLst/>
+                <a:latin typeface="Arial" panose="020B0604020202020204" pitchFamily="34" charset="0"/>
+              </a:rPr>
+              <a:t> </a:t>
+            </a:r>
+            <a:r>
+              <a:rPr lang="en-US" sz="1200" dirty="0">
+                <a:effectLst/>
+                <a:latin typeface="Arial" panose="020B0604020202020204" pitchFamily="34" charset="0"/>
+              </a:rPr>
+              <a:t>LA-UR-21-29819</a:t>
             </a:r>
           </a:p>
         </p:txBody>
@@ -9643,7 +9684,12 @@
             <p:ph idx="1"/>
           </p:nvPr>
         </p:nvSpPr>
-        <p:spPr/>
+        <p:spPr>
+          <a:xfrm>
+            <a:off x="365760" y="1325880"/>
+            <a:ext cx="11369809" cy="4622975"/>
+          </a:xfrm>
+        </p:spPr>
         <p:txBody>
           <a:bodyPr/>
           <a:lstStyle/>
@@ -9699,6 +9745,20 @@
             <a:r>
               <a:rPr lang="en-US" dirty="0"/>
               <a:t>Reproducibility</a:t>
+            </a:r>
+          </a:p>
+          <a:p>
+            <a:pPr lvl="1"/>
+            <a:r>
+              <a:rPr lang="en-US" dirty="0"/>
+              <a:t>Workflows</a:t>
+            </a:r>
+          </a:p>
+          <a:p>
+            <a:pPr lvl="1"/>
+            <a:r>
+              <a:rPr lang="en-US" dirty="0"/>
+              <a:t>Lab Notebooks for CSE</a:t>
             </a:r>
           </a:p>
         </p:txBody>
@@ -12807,6 +12867,12 @@
 </file>
 
 <file path=customXml/item1.xml><?xml version="1.0" encoding="utf-8"?>
+<p:properties xmlns:p="http://schemas.microsoft.com/office/2006/metadata/properties" xmlns:xsi="http://www.w3.org/2001/XMLSchema-instance" xmlns:pc="http://schemas.microsoft.com/office/infopath/2007/PartnerControls">
+  <documentManagement/>
+</p:properties>
+</file>
+
+<file path=customXml/item2.xml><?xml version="1.0" encoding="utf-8"?>
 <ct:contentTypeSchema xmlns:ct="http://schemas.microsoft.com/office/2006/metadata/contentType" xmlns:ma="http://schemas.microsoft.com/office/2006/metadata/properties/metaAttributes" ct:_="" ma:_="" ma:contentTypeName="Document" ma:contentTypeID="0x010100565464437F680748A68B85EB6594EA7D" ma:contentTypeVersion="0" ma:contentTypeDescription="Create a new document." ma:contentTypeScope="" ma:versionID="fe3f4dd58d5914c51cfc6deaa8ad845c">
   <xsd:schema xmlns:xsd="http://www.w3.org/2001/XMLSchema" xmlns:p="http://schemas.microsoft.com/office/2006/metadata/properties" targetNamespace="http://schemas.microsoft.com/office/2006/metadata/properties" ma:root="true" ma:fieldsID="4aeb20c0e3442673af7ee10786458764">
     <xsd:element name="properties">
@@ -12855,7 +12921,7 @@
 </ct:contentTypeSchema>
 </file>
 
-<file path=customXml/item2.xml><?xml version="1.0" encoding="utf-8"?>
+<file path=customXml/item3.xml><?xml version="1.0" encoding="utf-8"?>
 <?mso-contentType ?>
 <FormTemplates xmlns="http://schemas.microsoft.com/sharepoint/v3/contenttype/forms">
   <Display>DocumentLibraryForm</Display>
@@ -12864,13 +12930,22 @@
 </FormTemplates>
 </file>
 
-<file path=customXml/item3.xml><?xml version="1.0" encoding="utf-8"?>
-<p:properties xmlns:p="http://schemas.microsoft.com/office/2006/metadata/properties" xmlns:xsi="http://www.w3.org/2001/XMLSchema-instance" xmlns:pc="http://schemas.microsoft.com/office/infopath/2007/PartnerControls">
-  <documentManagement/>
-</p:properties>
+<file path=customXml/itemProps1.xml><?xml version="1.0" encoding="utf-8"?>
+<ds:datastoreItem xmlns:ds="http://schemas.openxmlformats.org/officeDocument/2006/customXml" ds:itemID="{A50EC660-24D0-43A0-AE5E-E274115E726B}">
+  <ds:schemaRefs>
+    <ds:schemaRef ds:uri="http://purl.org/dc/elements/1.1/"/>
+    <ds:schemaRef ds:uri="http://schemas.microsoft.com/office/2006/metadata/properties"/>
+    <ds:schemaRef ds:uri="http://purl.org/dc/terms/"/>
+    <ds:schemaRef ds:uri="http://schemas.openxmlformats.org/package/2006/metadata/core-properties"/>
+    <ds:schemaRef ds:uri="http://schemas.microsoft.com/office/2006/documentManagement/types"/>
+    <ds:schemaRef ds:uri="http://www.w3.org/XML/1998/namespace"/>
+    <ds:schemaRef ds:uri="http://purl.org/dc/dcmitype/"/>
+    <ds:schemaRef ds:uri="http://schemas.microsoft.com/office/infopath/2007/PartnerControls"/>
+  </ds:schemaRefs>
+</ds:datastoreItem>
 </file>
 
-<file path=customXml/itemProps1.xml><?xml version="1.0" encoding="utf-8"?>
+<file path=customXml/itemProps2.xml><?xml version="1.0" encoding="utf-8"?>
 <ds:datastoreItem xmlns:ds="http://schemas.openxmlformats.org/officeDocument/2006/customXml" ds:itemID="{E8DB7DEB-074E-4EE8-9B6E-FD277323109C}">
   <ds:schemaRefs>
     <ds:schemaRef ds:uri="http://schemas.microsoft.com/office/2006/metadata/contentType"/>
@@ -12885,25 +12960,10 @@
 </ds:datastoreItem>
 </file>
 
-<file path=customXml/itemProps2.xml><?xml version="1.0" encoding="utf-8"?>
+<file path=customXml/itemProps3.xml><?xml version="1.0" encoding="utf-8"?>
 <ds:datastoreItem xmlns:ds="http://schemas.openxmlformats.org/officeDocument/2006/customXml" ds:itemID="{19E20559-B232-4371-8690-E3D8007EDB82}">
   <ds:schemaRefs>
     <ds:schemaRef ds:uri="http://schemas.microsoft.com/sharepoint/v3/contenttype/forms"/>
   </ds:schemaRefs>
 </ds:datastoreItem>
-</file>
-
-<file path=customXml/itemProps3.xml><?xml version="1.0" encoding="utf-8"?>
-<ds:datastoreItem xmlns:ds="http://schemas.openxmlformats.org/officeDocument/2006/customXml" ds:itemID="{A50EC660-24D0-43A0-AE5E-E274115E726B}">
-  <ds:schemaRefs>
-    <ds:schemaRef ds:uri="http://purl.org/dc/elements/1.1/"/>
-    <ds:schemaRef ds:uri="http://schemas.microsoft.com/office/2006/metadata/properties"/>
-    <ds:schemaRef ds:uri="http://purl.org/dc/terms/"/>
-    <ds:schemaRef ds:uri="http://schemas.openxmlformats.org/package/2006/metadata/core-properties"/>
-    <ds:schemaRef ds:uri="http://schemas.microsoft.com/office/2006/documentManagement/types"/>
-    <ds:schemaRef ds:uri="http://www.w3.org/XML/1998/namespace"/>
-    <ds:schemaRef ds:uri="http://purl.org/dc/dcmitype/"/>
-    <ds:schemaRef ds:uri="http://schemas.microsoft.com/office/infopath/2007/PartnerControls"/>
-  </ds:schemaRefs>
-</ds:datastoreItem>
 </file>
</xml_diff>